<commit_message>
Some additons to the slides and modifications from our read-through
</commit_message>
<xml_diff>
--- a/count_min_sketch_talk.pptx
+++ b/count_min_sketch_talk.pptx
@@ -5,14 +5,17 @@
     <p:sldMasterId id="2147483660" r:id="rId1"/>
   </p:sldMasterIdLst>
   <p:notesMasterIdLst>
-    <p:notesMasterId r:id="rId7"/>
+    <p:notesMasterId r:id="rId10"/>
   </p:notesMasterIdLst>
   <p:sldIdLst>
     <p:sldId id="256" r:id="rId2"/>
-    <p:sldId id="258" r:id="rId3"/>
-    <p:sldId id="259" r:id="rId4"/>
-    <p:sldId id="260" r:id="rId5"/>
-    <p:sldId id="261" r:id="rId6"/>
+    <p:sldId id="262" r:id="rId3"/>
+    <p:sldId id="258" r:id="rId4"/>
+    <p:sldId id="264" r:id="rId5"/>
+    <p:sldId id="259" r:id="rId6"/>
+    <p:sldId id="263" r:id="rId7"/>
+    <p:sldId id="260" r:id="rId8"/>
+    <p:sldId id="261" r:id="rId9"/>
   </p:sldIdLst>
   <p:sldSz cx="12192000" cy="6858000"/>
   <p:notesSz cx="6858000" cy="9144000"/>
@@ -111,6 +114,11 @@
       </a:defRPr>
     </a:lvl9pPr>
   </p:defaultTextStyle>
+  <p:extLst>
+    <p:ext uri="{EFAFB233-063F-42B5-8137-9DF3F51BA10A}">
+      <p15:sldGuideLst xmlns:p15="http://schemas.microsoft.com/office/powerpoint/2012/main"/>
+    </p:ext>
+  </p:extLst>
 </p:presentation>
 </file>
 
@@ -196,7 +204,7 @@
           <a:p>
             <a:fld id="{58895B02-70E6-674C-BD1F-6A7F778A89D9}" type="datetimeFigureOut">
               <a:rPr lang="en-US" smtClean="0"/>
-              <a:t>12/8/16</a:t>
+              <a:t>12/11/16</a:t>
             </a:fld>
             <a:endParaRPr lang="en-US"/>
           </a:p>
@@ -529,7 +537,7 @@
           <a:p>
             <a:fld id="{C0B0A62E-9372-6E43-814B-0B1F17E56B7A}" type="slidenum">
               <a:rPr lang="en-US" smtClean="0"/>
-              <a:t>2</a:t>
+              <a:t>3</a:t>
             </a:fld>
             <a:endParaRPr lang="en-US"/>
           </a:p>
@@ -613,7 +621,7 @@
           <a:p>
             <a:fld id="{C0B0A62E-9372-6E43-814B-0B1F17E56B7A}" type="slidenum">
               <a:rPr lang="en-US" smtClean="0"/>
-              <a:t>3</a:t>
+              <a:t>4</a:t>
             </a:fld>
             <a:endParaRPr lang="en-US"/>
           </a:p>
@@ -622,7 +630,7 @@
     </p:spTree>
     <p:extLst>
       <p:ext uri="{BB962C8B-B14F-4D97-AF65-F5344CB8AC3E}">
-        <p14:creationId xmlns:p14="http://schemas.microsoft.com/office/powerpoint/2010/main" val="1023040026"/>
+        <p14:creationId xmlns:p14="http://schemas.microsoft.com/office/powerpoint/2010/main" val="2028431969"/>
       </p:ext>
     </p:extLst>
   </p:cSld>
@@ -698,6 +706,90 @@
             <a:fld id="{C0B0A62E-9372-6E43-814B-0B1F17E56B7A}" type="slidenum">
               <a:rPr lang="en-US" smtClean="0"/>
               <a:t>5</a:t>
+            </a:fld>
+            <a:endParaRPr lang="en-US"/>
+          </a:p>
+        </p:txBody>
+      </p:sp>
+    </p:spTree>
+    <p:extLst>
+      <p:ext uri="{BB962C8B-B14F-4D97-AF65-F5344CB8AC3E}">
+        <p14:creationId xmlns:p14="http://schemas.microsoft.com/office/powerpoint/2010/main" val="1023040026"/>
+      </p:ext>
+    </p:extLst>
+  </p:cSld>
+  <p:clrMapOvr>
+    <a:masterClrMapping/>
+  </p:clrMapOvr>
+</p:notes>
+</file>
+
+<file path=ppt/notesSlides/notesSlide4.xml><?xml version="1.0" encoding="utf-8"?>
+<p:notes xmlns:a="http://schemas.openxmlformats.org/drawingml/2006/main" xmlns:r="http://schemas.openxmlformats.org/officeDocument/2006/relationships" xmlns:p="http://schemas.openxmlformats.org/presentationml/2006/main">
+  <p:cSld>
+    <p:spTree>
+      <p:nvGrpSpPr>
+        <p:cNvPr id="1" name=""/>
+        <p:cNvGrpSpPr/>
+        <p:nvPr/>
+      </p:nvGrpSpPr>
+      <p:grpSpPr>
+        <a:xfrm>
+          <a:off x="0" y="0"/>
+          <a:ext cx="0" cy="0"/>
+          <a:chOff x="0" y="0"/>
+          <a:chExt cx="0" cy="0"/>
+        </a:xfrm>
+      </p:grpSpPr>
+      <p:sp>
+        <p:nvSpPr>
+          <p:cNvPr id="2" name="Slide Image Placeholder 1"/>
+          <p:cNvSpPr>
+            <a:spLocks noGrp="1" noRot="1" noChangeAspect="1"/>
+          </p:cNvSpPr>
+          <p:nvPr>
+            <p:ph type="sldImg"/>
+          </p:nvPr>
+        </p:nvSpPr>
+        <p:spPr/>
+      </p:sp>
+      <p:sp>
+        <p:nvSpPr>
+          <p:cNvPr id="3" name="Notes Placeholder 2"/>
+          <p:cNvSpPr>
+            <a:spLocks noGrp="1"/>
+          </p:cNvSpPr>
+          <p:nvPr>
+            <p:ph type="body" idx="1"/>
+          </p:nvPr>
+        </p:nvSpPr>
+        <p:spPr/>
+        <p:txBody>
+          <a:bodyPr/>
+          <a:lstStyle/>
+          <a:p>
+            <a:endParaRPr lang="en-US" dirty="0"/>
+          </a:p>
+        </p:txBody>
+      </p:sp>
+      <p:sp>
+        <p:nvSpPr>
+          <p:cNvPr id="4" name="Slide Number Placeholder 3"/>
+          <p:cNvSpPr>
+            <a:spLocks noGrp="1"/>
+          </p:cNvSpPr>
+          <p:nvPr>
+            <p:ph type="sldNum" sz="quarter" idx="10"/>
+          </p:nvPr>
+        </p:nvSpPr>
+        <p:spPr/>
+        <p:txBody>
+          <a:bodyPr/>
+          <a:lstStyle/>
+          <a:p>
+            <a:fld id="{C0B0A62E-9372-6E43-814B-0B1F17E56B7A}" type="slidenum">
+              <a:rPr lang="en-US" smtClean="0"/>
+              <a:t>8</a:t>
             </a:fld>
             <a:endParaRPr lang="en-US"/>
           </a:p>
@@ -942,7 +1034,7 @@
           <a:p>
             <a:fld id="{C03047AA-ACB6-D34A-9274-C4E96F83774F}" type="datetimeFigureOut">
               <a:rPr lang="en-US" smtClean="0"/>
-              <a:t>12/8/16</a:t>
+              <a:t>12/11/16</a:t>
             </a:fld>
             <a:endParaRPr lang="en-US"/>
           </a:p>
@@ -1150,7 +1242,7 @@
           <a:p>
             <a:fld id="{C03047AA-ACB6-D34A-9274-C4E96F83774F}" type="datetimeFigureOut">
               <a:rPr lang="en-US" smtClean="0"/>
-              <a:t>12/8/16</a:t>
+              <a:t>12/11/16</a:t>
             </a:fld>
             <a:endParaRPr lang="en-US"/>
           </a:p>
@@ -1406,7 +1498,7 @@
           <a:p>
             <a:fld id="{C03047AA-ACB6-D34A-9274-C4E96F83774F}" type="datetimeFigureOut">
               <a:rPr lang="en-US" smtClean="0"/>
-              <a:t>12/8/16</a:t>
+              <a:t>12/11/16</a:t>
             </a:fld>
             <a:endParaRPr lang="en-US"/>
           </a:p>
@@ -1580,7 +1672,7 @@
           <a:p>
             <a:fld id="{C03047AA-ACB6-D34A-9274-C4E96F83774F}" type="datetimeFigureOut">
               <a:rPr lang="en-US" smtClean="0"/>
-              <a:t>12/8/16</a:t>
+              <a:t>12/11/16</a:t>
             </a:fld>
             <a:endParaRPr lang="en-US"/>
           </a:p>
@@ -1923,7 +2015,7 @@
           <a:p>
             <a:fld id="{C03047AA-ACB6-D34A-9274-C4E96F83774F}" type="datetimeFigureOut">
               <a:rPr lang="en-US" smtClean="0"/>
-              <a:t>12/8/16</a:t>
+              <a:t>12/11/16</a:t>
             </a:fld>
             <a:endParaRPr lang="en-US"/>
           </a:p>
@@ -2198,7 +2290,7 @@
           <a:p>
             <a:fld id="{C03047AA-ACB6-D34A-9274-C4E96F83774F}" type="datetimeFigureOut">
               <a:rPr lang="en-US" smtClean="0"/>
-              <a:t>12/8/16</a:t>
+              <a:t>12/11/16</a:t>
             </a:fld>
             <a:endParaRPr lang="en-US"/>
           </a:p>
@@ -2577,7 +2669,7 @@
           <a:p>
             <a:fld id="{C03047AA-ACB6-D34A-9274-C4E96F83774F}" type="datetimeFigureOut">
               <a:rPr lang="en-US" smtClean="0"/>
-              <a:t>12/8/16</a:t>
+              <a:t>12/11/16</a:t>
             </a:fld>
             <a:endParaRPr lang="en-US"/>
           </a:p>
@@ -2695,7 +2787,7 @@
           <a:p>
             <a:fld id="{C03047AA-ACB6-D34A-9274-C4E96F83774F}" type="datetimeFigureOut">
               <a:rPr lang="en-US" smtClean="0"/>
-              <a:t>12/8/16</a:t>
+              <a:t>12/11/16</a:t>
             </a:fld>
             <a:endParaRPr lang="en-US"/>
           </a:p>
@@ -2866,7 +2958,7 @@
           <a:p>
             <a:fld id="{C03047AA-ACB6-D34A-9274-C4E96F83774F}" type="datetimeFigureOut">
               <a:rPr lang="en-US" smtClean="0"/>
-              <a:t>12/8/16</a:t>
+              <a:t>12/11/16</a:t>
             </a:fld>
             <a:endParaRPr lang="en-US"/>
           </a:p>
@@ -3220,7 +3312,7 @@
           <a:p>
             <a:fld id="{C03047AA-ACB6-D34A-9274-C4E96F83774F}" type="datetimeFigureOut">
               <a:rPr lang="en-US" smtClean="0"/>
-              <a:t>12/8/16</a:t>
+              <a:t>12/11/16</a:t>
             </a:fld>
             <a:endParaRPr lang="en-US"/>
           </a:p>
@@ -3602,7 +3694,7 @@
           <a:p>
             <a:fld id="{C03047AA-ACB6-D34A-9274-C4E96F83774F}" type="datetimeFigureOut">
               <a:rPr lang="en-US" smtClean="0"/>
-              <a:t>12/8/16</a:t>
+              <a:t>12/11/16</a:t>
             </a:fld>
             <a:endParaRPr lang="en-US"/>
           </a:p>
@@ -3889,7 +3981,7 @@
           <a:p>
             <a:fld id="{C03047AA-ACB6-D34A-9274-C4E96F83774F}" type="datetimeFigureOut">
               <a:rPr lang="en-US" smtClean="0"/>
-              <a:t>12/8/16</a:t>
+              <a:t>12/11/16</a:t>
             </a:fld>
             <a:endParaRPr lang="en-US"/>
           </a:p>
@@ -4490,6 +4582,232 @@
       </p:grpSpPr>
       <p:sp>
         <p:nvSpPr>
+          <p:cNvPr id="2" name="Title 1"/>
+          <p:cNvSpPr>
+            <a:spLocks noGrp="1"/>
+          </p:cNvSpPr>
+          <p:nvPr>
+            <p:ph type="title"/>
+          </p:nvPr>
+        </p:nvSpPr>
+        <p:spPr/>
+        <p:txBody>
+          <a:bodyPr/>
+          <a:lstStyle/>
+          <a:p>
+            <a:r>
+              <a:rPr lang="en-US" dirty="0" smtClean="0"/>
+              <a:t>The Count-Min Sketch and Its Applications</a:t>
+            </a:r>
+            <a:endParaRPr lang="en-US" dirty="0"/>
+          </a:p>
+        </p:txBody>
+      </p:sp>
+      <p:sp>
+        <p:nvSpPr>
+          <p:cNvPr id="3" name="Content Placeholder 2"/>
+          <p:cNvSpPr>
+            <a:spLocks noGrp="1"/>
+          </p:cNvSpPr>
+          <p:nvPr>
+            <p:ph idx="1"/>
+          </p:nvPr>
+        </p:nvSpPr>
+        <p:spPr/>
+        <p:txBody>
+          <a:bodyPr>
+            <a:normAutofit/>
+          </a:bodyPr>
+          <a:lstStyle/>
+          <a:p>
+            <a:pPr>
+              <a:buFont typeface="Arial" charset="0"/>
+              <a:buChar char="•"/>
+            </a:pPr>
+            <a:r>
+              <a:rPr lang="en-US" sz="2800" dirty="0" smtClean="0">
+                <a:solidFill>
+                  <a:srgbClr val="0070C0"/>
+                </a:solidFill>
+              </a:rPr>
+              <a:t> </a:t>
+            </a:r>
+            <a:r>
+              <a:rPr lang="en-US" sz="2800" dirty="0" smtClean="0"/>
+              <a:t>Introduction and Problem Statement</a:t>
+            </a:r>
+          </a:p>
+          <a:p>
+            <a:pPr>
+              <a:buFont typeface="Arial" charset="0"/>
+              <a:buChar char="•"/>
+            </a:pPr>
+            <a:r>
+              <a:rPr lang="en-US" sz="2800" dirty="0">
+                <a:solidFill>
+                  <a:srgbClr val="0070C0"/>
+                </a:solidFill>
+              </a:rPr>
+              <a:t> </a:t>
+            </a:r>
+            <a:r>
+              <a:rPr lang="en-US" sz="2800" dirty="0" smtClean="0">
+                <a:solidFill>
+                  <a:srgbClr val="0070C0"/>
+                </a:solidFill>
+              </a:rPr>
+              <a:t>Count-Min Sketch construction and updates</a:t>
+            </a:r>
+          </a:p>
+          <a:p>
+            <a:pPr>
+              <a:buFont typeface="Arial" charset="0"/>
+              <a:buChar char="•"/>
+            </a:pPr>
+            <a:r>
+              <a:rPr lang="en-US" sz="2800" dirty="0"/>
+              <a:t> </a:t>
+            </a:r>
+            <a:r>
+              <a:rPr lang="en-US" sz="2800" dirty="0" smtClean="0"/>
+              <a:t>Point Queries: algorithm and bounds for the cash-register case</a:t>
+            </a:r>
+          </a:p>
+          <a:p>
+            <a:pPr>
+              <a:buFont typeface="Arial" charset="0"/>
+              <a:buChar char="•"/>
+            </a:pPr>
+            <a:r>
+              <a:rPr lang="en-US" sz="2800" dirty="0"/>
+              <a:t> </a:t>
+            </a:r>
+            <a:r>
+              <a:rPr lang="en-US" sz="2800" dirty="0" smtClean="0"/>
+              <a:t>Inner Product Queries: algorithm and bounds</a:t>
+            </a:r>
+            <a:endParaRPr lang="en-US" sz="2800" dirty="0"/>
+          </a:p>
+          <a:p>
+            <a:pPr>
+              <a:buFont typeface="Arial" charset="0"/>
+              <a:buChar char="•"/>
+            </a:pPr>
+            <a:r>
+              <a:rPr lang="en-US" sz="2800" dirty="0"/>
+              <a:t> </a:t>
+            </a:r>
+            <a:r>
+              <a:rPr lang="en-US" sz="2800" dirty="0" smtClean="0"/>
+              <a:t>Range Queries: algorithm and bounds</a:t>
+            </a:r>
+          </a:p>
+          <a:p>
+            <a:pPr>
+              <a:buFont typeface="Arial" charset="0"/>
+              <a:buChar char="•"/>
+            </a:pPr>
+            <a:r>
+              <a:rPr lang="en-US" sz="2800" dirty="0"/>
+              <a:t> </a:t>
+            </a:r>
+            <a:r>
+              <a:rPr lang="en-US" sz="2800" dirty="0" smtClean="0"/>
+              <a:t>Selected Application: Heavy-Hitters</a:t>
+            </a:r>
+          </a:p>
+        </p:txBody>
+      </p:sp>
+    </p:spTree>
+    <p:extLst>
+      <p:ext uri="{BB962C8B-B14F-4D97-AF65-F5344CB8AC3E}">
+        <p14:creationId xmlns:p14="http://schemas.microsoft.com/office/powerpoint/2010/main" val="309186020"/>
+      </p:ext>
+    </p:extLst>
+  </p:cSld>
+  <p:clrMapOvr>
+    <a:masterClrMapping/>
+  </p:clrMapOvr>
+  <p:timing>
+    <p:tnLst>
+      <p:par>
+        <p:cTn id="1" dur="indefinite" restart="never" nodeType="tmRoot"/>
+      </p:par>
+    </p:tnLst>
+  </p:timing>
+</p:sld>
+</file>
+
+<file path=ppt/slides/slide3.xml><?xml version="1.0" encoding="utf-8"?>
+<p:sld xmlns:a="http://schemas.openxmlformats.org/drawingml/2006/main" xmlns:r="http://schemas.openxmlformats.org/officeDocument/2006/relationships" xmlns:p="http://schemas.openxmlformats.org/presentationml/2006/main">
+  <p:cSld>
+    <p:spTree>
+      <p:nvGrpSpPr>
+        <p:cNvPr id="1" name=""/>
+        <p:cNvGrpSpPr/>
+        <p:nvPr/>
+      </p:nvGrpSpPr>
+      <p:grpSpPr>
+        <a:xfrm>
+          <a:off x="0" y="0"/>
+          <a:ext cx="0" cy="0"/>
+          <a:chOff x="0" y="0"/>
+          <a:chExt cx="0" cy="0"/>
+        </a:xfrm>
+      </p:grpSpPr>
+      <p:sp>
+        <p:nvSpPr>
+          <p:cNvPr id="88" name="TextBox 87"/>
+          <p:cNvSpPr txBox="1"/>
+          <p:nvPr/>
+        </p:nvSpPr>
+        <p:spPr>
+          <a:xfrm>
+            <a:off x="1174173" y="1932918"/>
+            <a:ext cx="8434220" cy="707886"/>
+          </a:xfrm>
+          <a:prstGeom prst="rect">
+            <a:avLst/>
+          </a:prstGeom>
+          <a:noFill/>
+        </p:spPr>
+        <p:txBody>
+          <a:bodyPr wrap="square" rtlCol="0">
+            <a:spAutoFit/>
+          </a:bodyPr>
+          <a:lstStyle/>
+          <a:p>
+            <a:pPr marL="285750" indent="-285750">
+              <a:spcAft>
+                <a:spcPts val="2000"/>
+              </a:spcAft>
+              <a:buFont typeface="Arial" charset="0"/>
+              <a:buChar char="•"/>
+            </a:pPr>
+            <a:r>
+              <a:rPr lang="en-US" sz="2000" dirty="0" smtClean="0">
+                <a:solidFill>
+                  <a:schemeClr val="tx1">
+                    <a:lumMod val="75000"/>
+                    <a:lumOff val="25000"/>
+                  </a:schemeClr>
+                </a:solidFill>
+              </a:rPr>
+              <a:t>                                                         picked independently and uniformly from a 2-universal hash family</a:t>
+            </a:r>
+            <a:endParaRPr lang="en-US" sz="2000" dirty="0">
+              <a:solidFill>
+                <a:schemeClr val="tx1">
+                  <a:lumMod val="75000"/>
+                  <a:lumOff val="25000"/>
+                </a:schemeClr>
+              </a:solidFill>
+            </a:endParaRPr>
+          </a:p>
+        </p:txBody>
+      </p:sp>
+      <p:sp>
+        <p:nvSpPr>
           <p:cNvPr id="4" name="Title 1"/>
           <p:cNvSpPr>
             <a:spLocks noGrp="1"/>
@@ -4519,7 +4837,7 @@
         </p:nvGrpSpPr>
         <p:grpSpPr>
           <a:xfrm>
-            <a:off x="3247795" y="2528964"/>
+            <a:off x="4500278" y="2706871"/>
             <a:ext cx="5108115" cy="2545596"/>
             <a:chOff x="2023871" y="1948455"/>
             <a:chExt cx="5108115" cy="2545596"/>
@@ -5307,8 +5625,8 @@
         </p:blipFill>
         <p:spPr>
           <a:xfrm>
-            <a:off x="1492857" y="2272697"/>
-            <a:ext cx="3198377" cy="477277"/>
+            <a:off x="1443881" y="1878026"/>
+            <a:ext cx="3198377" cy="470769"/>
           </a:xfrm>
           <a:prstGeom prst="rect">
             <a:avLst/>
@@ -5323,7 +5641,7 @@
         </p:nvGrpSpPr>
         <p:grpSpPr>
           <a:xfrm>
-            <a:off x="8453721" y="3268128"/>
+            <a:off x="9910803" y="3333669"/>
             <a:ext cx="451696" cy="1850596"/>
             <a:chOff x="9113002" y="3249976"/>
             <a:chExt cx="451696" cy="1850596"/>
@@ -5557,26 +5875,35 @@
                                   </p:childTnLst>
                                 </p:cTn>
                               </p:par>
-                            </p:childTnLst>
-                          </p:cTn>
-                        </p:par>
-                      </p:childTnLst>
-                    </p:cTn>
-                  </p:par>
-                  <p:par>
-                    <p:cTn id="7" fill="hold">
-                      <p:stCondLst>
-                        <p:cond delay="indefinite"/>
-                      </p:stCondLst>
-                      <p:childTnLst>
-                        <p:par>
-                          <p:cTn id="8" fill="hold">
-                            <p:stCondLst>
-                              <p:cond delay="0"/>
-                            </p:stCondLst>
-                            <p:childTnLst>
                               <p:par>
-                                <p:cTn id="9" presetID="1" presetClass="entr" presetSubtype="0" fill="hold" nodeType="clickEffect">
+                                <p:cTn id="7" presetID="1" presetClass="entr" presetSubtype="0" fill="hold" nodeType="withEffect">
+                                  <p:stCondLst>
+                                    <p:cond delay="0"/>
+                                  </p:stCondLst>
+                                  <p:childTnLst>
+                                    <p:set>
+                                      <p:cBhvr>
+                                        <p:cTn id="8" dur="1" fill="hold">
+                                          <p:stCondLst>
+                                            <p:cond delay="0"/>
+                                          </p:stCondLst>
+                                        </p:cTn>
+                                        <p:tgtEl>
+                                          <p:spTgt spid="87"/>
+                                        </p:tgtEl>
+                                        <p:attrNameLst>
+                                          <p:attrName>style.visibility</p:attrName>
+                                        </p:attrNameLst>
+                                      </p:cBhvr>
+                                      <p:to>
+                                        <p:strVal val="visible"/>
+                                      </p:to>
+                                    </p:set>
+                                  </p:childTnLst>
+                                </p:cTn>
+                              </p:par>
+                              <p:par>
+                                <p:cTn id="9" presetID="1" presetClass="entr" presetSubtype="0" fill="hold" grpId="0" nodeType="withEffect">
                                   <p:stCondLst>
                                     <p:cond delay="0"/>
                                   </p:stCondLst>
@@ -5589,7 +5916,7 @@
                                           </p:stCondLst>
                                         </p:cTn>
                                         <p:tgtEl>
-                                          <p:spTgt spid="87"/>
+                                          <p:spTgt spid="88"/>
                                         </p:tgtEl>
                                         <p:attrNameLst>
                                           <p:attrName>style.visibility</p:attrName>
@@ -5629,11 +5956,14 @@
         </p:cTn>
       </p:par>
     </p:tnLst>
+    <p:bldLst>
+      <p:bldP spid="88" grpId="0"/>
+    </p:bldLst>
   </p:timing>
 </p:sld>
 </file>
 
-<file path=ppt/slides/slide3.xml><?xml version="1.0" encoding="utf-8"?>
+<file path=ppt/slides/slide4.xml><?xml version="1.0" encoding="utf-8"?>
 <p:sld xmlns:a="http://schemas.openxmlformats.org/drawingml/2006/main" xmlns:r="http://schemas.openxmlformats.org/officeDocument/2006/relationships" xmlns:p="http://schemas.openxmlformats.org/presentationml/2006/main">
   <p:cSld>
     <p:spTree>
@@ -5652,13 +5982,103 @@
       </p:grpSpPr>
       <p:sp>
         <p:nvSpPr>
+          <p:cNvPr id="4" name="Title 1"/>
+          <p:cNvSpPr>
+            <a:spLocks noGrp="1"/>
+          </p:cNvSpPr>
+          <p:nvPr>
+            <p:ph type="title"/>
+          </p:nvPr>
+        </p:nvSpPr>
+        <p:spPr/>
+        <p:txBody>
+          <a:bodyPr lIns="9144"/>
+          <a:lstStyle/>
+          <a:p>
+            <a:r>
+              <a:rPr lang="en-US" dirty="0" smtClean="0"/>
+              <a:t>Count-Min Sketch Updates</a:t>
+            </a:r>
+            <a:endParaRPr lang="en-US" dirty="0"/>
+          </a:p>
+        </p:txBody>
+      </p:sp>
+      <p:pic>
+        <p:nvPicPr>
+          <p:cNvPr id="37" name="Picture 36"/>
+          <p:cNvPicPr>
+            <a:picLocks noChangeAspect="1"/>
+          </p:cNvPicPr>
+          <p:nvPr/>
+        </p:nvPicPr>
+        <p:blipFill>
+          <a:blip r:embed="rId3">
+            <a:extLst>
+              <a:ext uri="{28A0092B-C50C-407E-A947-70E740481C1C}">
+                <a14:useLocalDpi xmlns:a14="http://schemas.microsoft.com/office/drawing/2010/main" val="0"/>
+              </a:ext>
+            </a:extLst>
+          </a:blip>
+          <a:stretch>
+            <a:fillRect/>
+          </a:stretch>
+        </p:blipFill>
+        <p:spPr>
+          <a:xfrm>
+            <a:off x="1097280" y="2018946"/>
+            <a:ext cx="8976992" cy="2032209"/>
+          </a:xfrm>
+          <a:prstGeom prst="rect">
+            <a:avLst/>
+          </a:prstGeom>
+        </p:spPr>
+      </p:pic>
+    </p:spTree>
+    <p:extLst>
+      <p:ext uri="{BB962C8B-B14F-4D97-AF65-F5344CB8AC3E}">
+        <p14:creationId xmlns:p14="http://schemas.microsoft.com/office/powerpoint/2010/main" val="1312606679"/>
+      </p:ext>
+    </p:extLst>
+  </p:cSld>
+  <p:clrMapOvr>
+    <a:masterClrMapping/>
+  </p:clrMapOvr>
+  <p:timing>
+    <p:tnLst>
+      <p:par>
+        <p:cTn id="1" dur="indefinite" restart="never" nodeType="tmRoot"/>
+      </p:par>
+    </p:tnLst>
+  </p:timing>
+</p:sld>
+</file>
+
+<file path=ppt/slides/slide5.xml><?xml version="1.0" encoding="utf-8"?>
+<p:sld xmlns:a="http://schemas.openxmlformats.org/drawingml/2006/main" xmlns:r="http://schemas.openxmlformats.org/officeDocument/2006/relationships" xmlns:p="http://schemas.openxmlformats.org/presentationml/2006/main">
+  <p:cSld>
+    <p:spTree>
+      <p:nvGrpSpPr>
+        <p:cNvPr id="1" name=""/>
+        <p:cNvGrpSpPr/>
+        <p:nvPr/>
+      </p:nvGrpSpPr>
+      <p:grpSpPr>
+        <a:xfrm>
+          <a:off x="0" y="0"/>
+          <a:ext cx="0" cy="0"/>
+          <a:chOff x="0" y="0"/>
+          <a:chExt cx="0" cy="0"/>
+        </a:xfrm>
+      </p:grpSpPr>
+      <p:sp>
+        <p:nvSpPr>
           <p:cNvPr id="78" name="Rectangle 77"/>
           <p:cNvSpPr/>
           <p:nvPr/>
         </p:nvSpPr>
         <p:spPr>
           <a:xfrm>
-            <a:off x="5050155" y="3321422"/>
+            <a:off x="4727334" y="3584779"/>
             <a:ext cx="3305755" cy="368168"/>
           </a:xfrm>
           <a:prstGeom prst="rect">
@@ -5717,7 +6137,7 @@
         </p:nvSpPr>
         <p:spPr>
           <a:xfrm>
-            <a:off x="6511110" y="3321416"/>
+            <a:off x="6188289" y="3584773"/>
             <a:ext cx="364451" cy="357794"/>
           </a:xfrm>
           <a:prstGeom prst="rect">
@@ -5780,7 +6200,7 @@
         </p:nvSpPr>
         <p:spPr>
           <a:xfrm>
-            <a:off x="5050144" y="4708233"/>
+            <a:off x="4727323" y="4971590"/>
             <a:ext cx="3305755" cy="359094"/>
           </a:xfrm>
           <a:prstGeom prst="rect">
@@ -5839,7 +6259,7 @@
         </p:nvSpPr>
         <p:spPr>
           <a:xfrm>
-            <a:off x="5050152" y="4384547"/>
+            <a:off x="4727331" y="4647904"/>
             <a:ext cx="3305755" cy="347806"/>
           </a:xfrm>
           <a:prstGeom prst="rect">
@@ -5898,7 +6318,7 @@
         </p:nvSpPr>
         <p:spPr>
           <a:xfrm>
-            <a:off x="5050153" y="4032532"/>
+            <a:off x="4727332" y="4295889"/>
             <a:ext cx="3305755" cy="359094"/>
           </a:xfrm>
           <a:prstGeom prst="rect">
@@ -5957,7 +6377,7 @@
         </p:nvSpPr>
         <p:spPr>
           <a:xfrm>
-            <a:off x="5050154" y="3679210"/>
+            <a:off x="4727333" y="3942567"/>
             <a:ext cx="3305752" cy="359094"/>
           </a:xfrm>
           <a:prstGeom prst="rect">
@@ -6041,7 +6461,7 @@
           <a:p>
             <a:r>
               <a:rPr lang="en-US" dirty="0" smtClean="0"/>
-              <a:t>Count Min Sketch Updates</a:t>
+              <a:t>Count-Min Sketch Updates</a:t>
             </a:r>
             <a:endParaRPr lang="en-US" dirty="0"/>
           </a:p>
@@ -6055,7 +6475,7 @@
         </p:nvGrpSpPr>
         <p:grpSpPr>
           <a:xfrm>
-            <a:off x="5376438" y="3321416"/>
+            <a:off x="5053617" y="3584773"/>
             <a:ext cx="2627968" cy="1753144"/>
             <a:chOff x="4152514" y="2740907"/>
             <a:chExt cx="2627968" cy="1911164"/>
@@ -6350,7 +6770,7 @@
         </p:nvCxnSpPr>
         <p:spPr>
           <a:xfrm flipV="1">
-            <a:off x="5050153" y="3175885"/>
+            <a:off x="4727332" y="3439242"/>
             <a:ext cx="3305755" cy="4403"/>
           </a:xfrm>
           <a:prstGeom prst="line">
@@ -6387,7 +6807,7 @@
         </p:nvCxnSpPr>
         <p:spPr>
           <a:xfrm flipH="1" flipV="1">
-            <a:off x="4858255" y="3339976"/>
+            <a:off x="4549722" y="3603333"/>
             <a:ext cx="0" cy="1725461"/>
           </a:xfrm>
           <a:prstGeom prst="line">
@@ -6438,7 +6858,7 @@
         </p:blipFill>
         <p:spPr>
           <a:xfrm>
-            <a:off x="5682327" y="2528964"/>
+            <a:off x="5359506" y="2792321"/>
             <a:ext cx="1687386" cy="641086"/>
           </a:xfrm>
           <a:prstGeom prst="rect">
@@ -6468,7 +6888,7 @@
         </p:blipFill>
         <p:spPr>
           <a:xfrm>
-            <a:off x="3247795" y="4022232"/>
+            <a:off x="2924974" y="4285589"/>
             <a:ext cx="1568404" cy="519471"/>
           </a:xfrm>
           <a:prstGeom prst="rect">
@@ -6486,7 +6906,7 @@
         </p:nvCxnSpPr>
         <p:spPr>
           <a:xfrm flipH="1">
-            <a:off x="6791140" y="2918039"/>
+            <a:off x="6468319" y="3181396"/>
             <a:ext cx="2353495" cy="497673"/>
           </a:xfrm>
           <a:prstGeom prst="straightConnector1">
@@ -6522,7 +6942,7 @@
         </p:nvSpPr>
         <p:spPr>
           <a:xfrm>
-            <a:off x="9144635" y="2625651"/>
+            <a:off x="8821814" y="2889008"/>
             <a:ext cx="976549" cy="584775"/>
           </a:xfrm>
           <a:prstGeom prst="rect">
@@ -6600,7 +7020,7 @@
         </p:nvSpPr>
         <p:spPr>
           <a:xfrm>
-            <a:off x="-1046480" y="2078959"/>
+            <a:off x="-1583614" y="2207546"/>
             <a:ext cx="1173719" cy="584775"/>
           </a:xfrm>
           <a:prstGeom prst="rect">
@@ -6678,7 +7098,7 @@
         </p:nvSpPr>
         <p:spPr>
           <a:xfrm>
-            <a:off x="9144640" y="3204710"/>
+            <a:off x="8821819" y="3468067"/>
             <a:ext cx="976549" cy="584775"/>
           </a:xfrm>
           <a:prstGeom prst="rect">
@@ -6748,7 +7168,7 @@
         </p:nvSpPr>
         <p:spPr>
           <a:xfrm>
-            <a:off x="9144635" y="3783768"/>
+            <a:off x="8821814" y="4047125"/>
             <a:ext cx="976549" cy="584775"/>
           </a:xfrm>
           <a:prstGeom prst="rect">
@@ -6818,7 +7238,7 @@
         </p:nvSpPr>
         <p:spPr>
           <a:xfrm>
-            <a:off x="9144629" y="4319876"/>
+            <a:off x="8821808" y="4583233"/>
             <a:ext cx="976549" cy="584775"/>
           </a:xfrm>
           <a:prstGeom prst="rect">
@@ -6888,7 +7308,7 @@
         </p:nvSpPr>
         <p:spPr>
           <a:xfrm>
-            <a:off x="9139409" y="4895013"/>
+            <a:off x="8816588" y="5158370"/>
             <a:ext cx="976549" cy="584775"/>
           </a:xfrm>
           <a:prstGeom prst="rect">
@@ -6958,7 +7378,7 @@
         </p:nvSpPr>
         <p:spPr>
           <a:xfrm>
-            <a:off x="7634293" y="3678147"/>
+            <a:off x="7311472" y="3941504"/>
             <a:ext cx="368105" cy="363458"/>
           </a:xfrm>
           <a:prstGeom prst="rect">
@@ -7021,7 +7441,7 @@
         </p:nvSpPr>
         <p:spPr>
           <a:xfrm>
-            <a:off x="5764537" y="4039366"/>
+            <a:off x="5441716" y="4302723"/>
             <a:ext cx="378704" cy="352259"/>
           </a:xfrm>
           <a:prstGeom prst="rect">
@@ -7084,7 +7504,7 @@
         </p:nvSpPr>
         <p:spPr>
           <a:xfrm>
-            <a:off x="6506115" y="4391624"/>
+            <a:off x="6183294" y="4654981"/>
             <a:ext cx="372531" cy="340729"/>
           </a:xfrm>
           <a:prstGeom prst="rect">
@@ -7147,7 +7567,7 @@
         </p:nvSpPr>
         <p:spPr>
           <a:xfrm>
-            <a:off x="7989496" y="4732353"/>
+            <a:off x="7666675" y="4995710"/>
             <a:ext cx="366403" cy="330425"/>
           </a:xfrm>
           <a:prstGeom prst="rect">
@@ -7210,7 +7630,7 @@
         </p:nvCxnSpPr>
         <p:spPr>
           <a:xfrm flipH="1">
-            <a:off x="6079751" y="4111135"/>
+            <a:off x="5756930" y="4374492"/>
             <a:ext cx="3113893" cy="116890"/>
           </a:xfrm>
           <a:prstGeom prst="straightConnector1">
@@ -7246,7 +7666,7 @@
         </p:nvCxnSpPr>
         <p:spPr>
           <a:xfrm flipH="1">
-            <a:off x="7888422" y="3616478"/>
+            <a:off x="7565601" y="3879835"/>
             <a:ext cx="1256213" cy="163465"/>
           </a:xfrm>
           <a:prstGeom prst="straightConnector1">
@@ -7282,7 +7702,7 @@
         </p:nvCxnSpPr>
         <p:spPr>
           <a:xfrm flipH="1">
-            <a:off x="6798961" y="4558450"/>
+            <a:off x="6476140" y="4821807"/>
             <a:ext cx="2393747" cy="19702"/>
           </a:xfrm>
           <a:prstGeom prst="straightConnector1">
@@ -7318,7 +7738,7 @@
         </p:nvCxnSpPr>
         <p:spPr>
           <a:xfrm flipH="1" flipV="1">
-            <a:off x="8270851" y="4996502"/>
+            <a:off x="7948030" y="5259859"/>
             <a:ext cx="893910" cy="177878"/>
           </a:xfrm>
           <a:prstGeom prst="straightConnector1">
@@ -8157,7 +8577,7 @@
 </p:sld>
 </file>
 
-<file path=ppt/slides/slide4.xml><?xml version="1.0" encoding="utf-8"?>
+<file path=ppt/slides/slide6.xml><?xml version="1.0" encoding="utf-8"?>
 <p:sld xmlns:a="http://schemas.openxmlformats.org/drawingml/2006/main" xmlns:r="http://schemas.openxmlformats.org/officeDocument/2006/relationships" xmlns:p="http://schemas.openxmlformats.org/presentationml/2006/main">
   <p:cSld>
     <p:spTree>
@@ -8191,7 +8611,168 @@
           <a:p>
             <a:r>
               <a:rPr lang="en-US" dirty="0" smtClean="0"/>
-              <a:t>Point Queries</a:t>
+              <a:t>The Count-Min Sketch and Its Applications</a:t>
+            </a:r>
+            <a:endParaRPr lang="en-US" dirty="0"/>
+          </a:p>
+        </p:txBody>
+      </p:sp>
+      <p:sp>
+        <p:nvSpPr>
+          <p:cNvPr id="3" name="Content Placeholder 2"/>
+          <p:cNvSpPr>
+            <a:spLocks noGrp="1"/>
+          </p:cNvSpPr>
+          <p:nvPr>
+            <p:ph idx="1"/>
+          </p:nvPr>
+        </p:nvSpPr>
+        <p:spPr/>
+        <p:txBody>
+          <a:bodyPr>
+            <a:normAutofit/>
+          </a:bodyPr>
+          <a:lstStyle/>
+          <a:p>
+            <a:pPr>
+              <a:buFont typeface="Arial" charset="0"/>
+              <a:buChar char="•"/>
+            </a:pPr>
+            <a:r>
+              <a:rPr lang="en-US" sz="2800" dirty="0">
+                <a:solidFill>
+                  <a:schemeClr val="tx1"/>
+                </a:solidFill>
+              </a:rPr>
+              <a:t> </a:t>
+            </a:r>
+            <a:r>
+              <a:rPr lang="en-US" sz="2800" dirty="0" smtClean="0">
+                <a:solidFill>
+                  <a:schemeClr val="tx1"/>
+                </a:solidFill>
+              </a:rPr>
+              <a:t>Count-Min Sketch construction and updates</a:t>
+            </a:r>
+          </a:p>
+          <a:p>
+            <a:pPr>
+              <a:buFont typeface="Arial" charset="0"/>
+              <a:buChar char="•"/>
+            </a:pPr>
+            <a:r>
+              <a:rPr lang="en-US" sz="2800" dirty="0"/>
+              <a:t> </a:t>
+            </a:r>
+            <a:r>
+              <a:rPr lang="en-US" sz="2800" dirty="0" smtClean="0">
+                <a:solidFill>
+                  <a:srgbClr val="0070C0"/>
+                </a:solidFill>
+              </a:rPr>
+              <a:t>Point Queries: algorithm and bounds for the cash-register case</a:t>
+            </a:r>
+          </a:p>
+          <a:p>
+            <a:pPr>
+              <a:buFont typeface="Arial" charset="0"/>
+              <a:buChar char="•"/>
+            </a:pPr>
+            <a:r>
+              <a:rPr lang="en-US" sz="2800" dirty="0"/>
+              <a:t> </a:t>
+            </a:r>
+            <a:r>
+              <a:rPr lang="en-US" sz="2800" dirty="0" smtClean="0"/>
+              <a:t>Inner Product Queries: algorithm and bounds</a:t>
+            </a:r>
+            <a:endParaRPr lang="en-US" sz="2800" dirty="0"/>
+          </a:p>
+          <a:p>
+            <a:pPr>
+              <a:buFont typeface="Arial" charset="0"/>
+              <a:buChar char="•"/>
+            </a:pPr>
+            <a:r>
+              <a:rPr lang="en-US" sz="2800" dirty="0"/>
+              <a:t> </a:t>
+            </a:r>
+            <a:r>
+              <a:rPr lang="en-US" sz="2800" dirty="0" smtClean="0"/>
+              <a:t>Range Queries: algorithm and bounds</a:t>
+            </a:r>
+          </a:p>
+          <a:p>
+            <a:pPr>
+              <a:buFont typeface="Arial" charset="0"/>
+              <a:buChar char="•"/>
+            </a:pPr>
+            <a:r>
+              <a:rPr lang="en-US" sz="2800" dirty="0"/>
+              <a:t> </a:t>
+            </a:r>
+            <a:r>
+              <a:rPr lang="en-US" sz="2800" dirty="0" smtClean="0"/>
+              <a:t>Selected Application: Heavy-Hitters</a:t>
+            </a:r>
+          </a:p>
+        </p:txBody>
+      </p:sp>
+    </p:spTree>
+    <p:extLst>
+      <p:ext uri="{BB962C8B-B14F-4D97-AF65-F5344CB8AC3E}">
+        <p14:creationId xmlns:p14="http://schemas.microsoft.com/office/powerpoint/2010/main" val="1313201075"/>
+      </p:ext>
+    </p:extLst>
+  </p:cSld>
+  <p:clrMapOvr>
+    <a:masterClrMapping/>
+  </p:clrMapOvr>
+  <p:timing>
+    <p:tnLst>
+      <p:par>
+        <p:cTn id="1" dur="indefinite" restart="never" nodeType="tmRoot"/>
+      </p:par>
+    </p:tnLst>
+  </p:timing>
+</p:sld>
+</file>
+
+<file path=ppt/slides/slide7.xml><?xml version="1.0" encoding="utf-8"?>
+<p:sld xmlns:a="http://schemas.openxmlformats.org/drawingml/2006/main" xmlns:r="http://schemas.openxmlformats.org/officeDocument/2006/relationships" xmlns:p="http://schemas.openxmlformats.org/presentationml/2006/main">
+  <p:cSld>
+    <p:spTree>
+      <p:nvGrpSpPr>
+        <p:cNvPr id="1" name=""/>
+        <p:cNvGrpSpPr/>
+        <p:nvPr/>
+      </p:nvGrpSpPr>
+      <p:grpSpPr>
+        <a:xfrm>
+          <a:off x="0" y="0"/>
+          <a:ext cx="0" cy="0"/>
+          <a:chOff x="0" y="0"/>
+          <a:chExt cx="0" cy="0"/>
+        </a:xfrm>
+      </p:grpSpPr>
+      <p:sp>
+        <p:nvSpPr>
+          <p:cNvPr id="2" name="Title 1"/>
+          <p:cNvSpPr>
+            <a:spLocks noGrp="1"/>
+          </p:cNvSpPr>
+          <p:nvPr>
+            <p:ph type="title"/>
+          </p:nvPr>
+        </p:nvSpPr>
+        <p:spPr/>
+        <p:txBody>
+          <a:bodyPr/>
+          <a:lstStyle/>
+          <a:p>
+            <a:r>
+              <a:rPr lang="en-US" dirty="0" smtClean="0"/>
+              <a:t>Point Queries Algorithm</a:t>
             </a:r>
             <a:endParaRPr lang="en-US" dirty="0"/>
           </a:p>
@@ -8300,14 +8881,127 @@
   <p:timing>
     <p:tnLst>
       <p:par>
-        <p:cTn id="1" dur="indefinite" restart="never" nodeType="tmRoot"/>
+        <p:cTn id="1" dur="indefinite" restart="never" nodeType="tmRoot">
+          <p:childTnLst>
+            <p:seq concurrent="1" nextAc="seek">
+              <p:cTn id="2" dur="indefinite" nodeType="mainSeq">
+                <p:childTnLst>
+                  <p:par>
+                    <p:cTn id="3" fill="hold">
+                      <p:stCondLst>
+                        <p:cond delay="indefinite"/>
+                      </p:stCondLst>
+                      <p:childTnLst>
+                        <p:par>
+                          <p:cTn id="4" fill="hold">
+                            <p:stCondLst>
+                              <p:cond delay="0"/>
+                            </p:stCondLst>
+                            <p:childTnLst>
+                              <p:par>
+                                <p:cTn id="5" presetID="1" presetClass="entr" presetSubtype="0" fill="hold" nodeType="clickEffect">
+                                  <p:stCondLst>
+                                    <p:cond delay="0"/>
+                                  </p:stCondLst>
+                                  <p:childTnLst>
+                                    <p:set>
+                                      <p:cBhvr>
+                                        <p:cTn id="6" dur="1" fill="hold">
+                                          <p:stCondLst>
+                                            <p:cond delay="0"/>
+                                          </p:stCondLst>
+                                        </p:cTn>
+                                        <p:tgtEl>
+                                          <p:spTgt spid="8"/>
+                                        </p:tgtEl>
+                                        <p:attrNameLst>
+                                          <p:attrName>style.visibility</p:attrName>
+                                        </p:attrNameLst>
+                                      </p:cBhvr>
+                                      <p:to>
+                                        <p:strVal val="visible"/>
+                                      </p:to>
+                                    </p:set>
+                                  </p:childTnLst>
+                                </p:cTn>
+                              </p:par>
+                            </p:childTnLst>
+                          </p:cTn>
+                        </p:par>
+                      </p:childTnLst>
+                    </p:cTn>
+                  </p:par>
+                  <p:par>
+                    <p:cTn id="7" fill="hold">
+                      <p:stCondLst>
+                        <p:cond delay="indefinite"/>
+                      </p:stCondLst>
+                      <p:childTnLst>
+                        <p:par>
+                          <p:cTn id="8" fill="hold">
+                            <p:stCondLst>
+                              <p:cond delay="0"/>
+                            </p:stCondLst>
+                            <p:childTnLst>
+                              <p:par>
+                                <p:cTn id="9" presetID="1" presetClass="entr" presetSubtype="0" fill="hold" nodeType="clickEffect">
+                                  <p:stCondLst>
+                                    <p:cond delay="0"/>
+                                  </p:stCondLst>
+                                  <p:childTnLst>
+                                    <p:set>
+                                      <p:cBhvr>
+                                        <p:cTn id="10" dur="1" fill="hold">
+                                          <p:stCondLst>
+                                            <p:cond delay="0"/>
+                                          </p:stCondLst>
+                                        </p:cTn>
+                                        <p:tgtEl>
+                                          <p:spTgt spid="9"/>
+                                        </p:tgtEl>
+                                        <p:attrNameLst>
+                                          <p:attrName>style.visibility</p:attrName>
+                                        </p:attrNameLst>
+                                      </p:cBhvr>
+                                      <p:to>
+                                        <p:strVal val="visible"/>
+                                      </p:to>
+                                    </p:set>
+                                  </p:childTnLst>
+                                </p:cTn>
+                              </p:par>
+                            </p:childTnLst>
+                          </p:cTn>
+                        </p:par>
+                      </p:childTnLst>
+                    </p:cTn>
+                  </p:par>
+                </p:childTnLst>
+              </p:cTn>
+              <p:prevCondLst>
+                <p:cond evt="onPrev" delay="0">
+                  <p:tgtEl>
+                    <p:sldTgt/>
+                  </p:tgtEl>
+                </p:cond>
+              </p:prevCondLst>
+              <p:nextCondLst>
+                <p:cond evt="onNext" delay="0">
+                  <p:tgtEl>
+                    <p:sldTgt/>
+                  </p:tgtEl>
+                </p:cond>
+              </p:nextCondLst>
+            </p:seq>
+          </p:childTnLst>
+        </p:cTn>
       </p:par>
     </p:tnLst>
   </p:timing>
 </p:sld>
 </file>
 
-<file path=ppt/slides/slide5.xml><?xml version="1.0" encoding="utf-8"?>
+<file path=ppt/slides/slide8.xml><?xml version="1.0" encoding="utf-8"?>
 <p:sld xmlns:a="http://schemas.openxmlformats.org/drawingml/2006/main" xmlns:r="http://schemas.openxmlformats.org/officeDocument/2006/relationships" xmlns:p="http://schemas.openxmlformats.org/presentationml/2006/main">
   <p:cSld>
     <p:spTree>
@@ -8332,7 +9026,7 @@
         </p:nvSpPr>
         <p:spPr>
           <a:xfrm>
-            <a:off x="5050155" y="3321422"/>
+            <a:off x="4432305" y="3321422"/>
             <a:ext cx="3305755" cy="368168"/>
           </a:xfrm>
           <a:prstGeom prst="rect">
@@ -8373,7 +9067,7 @@
                   <a:schemeClr val="tx1"/>
                 </a:solidFill>
               </a:rPr>
-              <a:t>  0     0     0     0     0     0     0     0    0</a:t>
+              <a:t> 23   18  35    1    48   90  63   27   3</a:t>
             </a:r>
             <a:endParaRPr lang="en-US" dirty="0">
               <a:solidFill>
@@ -8385,76 +9079,13 @@
       </p:sp>
       <p:sp>
         <p:nvSpPr>
-          <p:cNvPr id="27" name="Rectangle 26"/>
-          <p:cNvSpPr/>
-          <p:nvPr/>
-        </p:nvSpPr>
-        <p:spPr>
-          <a:xfrm>
-            <a:off x="6511110" y="3321416"/>
-            <a:ext cx="364451" cy="357794"/>
-          </a:xfrm>
-          <a:prstGeom prst="rect">
-            <a:avLst/>
-          </a:prstGeom>
-          <a:ln>
-            <a:solidFill>
-              <a:schemeClr val="tx1"/>
-            </a:solidFill>
-          </a:ln>
-        </p:spPr>
-        <p:style>
-          <a:lnRef idx="2">
-            <a:schemeClr val="accent6"/>
-          </a:lnRef>
-          <a:fillRef idx="1">
-            <a:schemeClr val="lt1"/>
-          </a:fillRef>
-          <a:effectRef idx="0">
-            <a:schemeClr val="accent6"/>
-          </a:effectRef>
-          <a:fontRef idx="minor">
-            <a:schemeClr val="dk1"/>
-          </a:fontRef>
-        </p:style>
-        <p:txBody>
-          <a:bodyPr lIns="0" tIns="0" rIns="0" bIns="45720" rtlCol="0" anchor="ctr"/>
-          <a:lstStyle/>
-          <a:p>
-            <a:pPr algn="ctr"/>
-            <a:r>
-              <a:rPr lang="en-US" dirty="0" err="1" smtClean="0">
-                <a:solidFill>
-                  <a:srgbClr val="0070C0"/>
-                </a:solidFill>
-              </a:rPr>
-              <a:t>c</a:t>
-            </a:r>
-            <a:r>
-              <a:rPr lang="en-US" baseline="-25000" dirty="0" err="1" smtClean="0">
-                <a:solidFill>
-                  <a:srgbClr val="0070C0"/>
-                </a:solidFill>
-              </a:rPr>
-              <a:t>t</a:t>
-            </a:r>
-            <a:endParaRPr lang="en-US" dirty="0">
-              <a:solidFill>
-                <a:srgbClr val="0070C0"/>
-              </a:solidFill>
-            </a:endParaRPr>
-          </a:p>
-        </p:txBody>
-      </p:sp>
-      <p:sp>
-        <p:nvSpPr>
           <p:cNvPr id="67" name="Rectangle 66"/>
           <p:cNvSpPr/>
           <p:nvPr/>
         </p:nvSpPr>
         <p:spPr>
           <a:xfrm>
-            <a:off x="5050144" y="4708233"/>
+            <a:off x="4432294" y="4708233"/>
             <a:ext cx="3305755" cy="359094"/>
           </a:xfrm>
           <a:prstGeom prst="rect">
@@ -8495,7 +9126,39 @@
                   <a:schemeClr val="tx1"/>
                 </a:solidFill>
               </a:rPr>
-              <a:t>  0     0     0     0     0     0     0     0    0</a:t>
+              <a:t> </a:t>
+            </a:r>
+            <a:r>
+              <a:rPr lang="en-US" dirty="0" smtClean="0">
+                <a:solidFill>
+                  <a:schemeClr val="tx1"/>
+                </a:solidFill>
+              </a:rPr>
+              <a:t>19  </a:t>
+            </a:r>
+            <a:r>
+              <a:rPr lang="en-US" dirty="0" smtClean="0">
+                <a:solidFill>
+                  <a:schemeClr val="tx1"/>
+                </a:solidFill>
+              </a:rPr>
+              <a:t>21   </a:t>
+            </a:r>
+            <a:r>
+              <a:rPr lang="en-US" dirty="0" smtClean="0">
+                <a:solidFill>
+                  <a:schemeClr val="tx1"/>
+                </a:solidFill>
+              </a:rPr>
+              <a:t>68   </a:t>
+            </a:r>
+            <a:r>
+              <a:rPr lang="en-US" dirty="0" smtClean="0">
+                <a:solidFill>
+                  <a:schemeClr val="tx1"/>
+                </a:solidFill>
+              </a:rPr>
+              <a:t>66   42  80   95   4    18</a:t>
             </a:r>
             <a:endParaRPr lang="en-US" dirty="0">
               <a:solidFill>
@@ -8513,7 +9176,7 @@
         </p:nvSpPr>
         <p:spPr>
           <a:xfrm>
-            <a:off x="5050152" y="4384547"/>
+            <a:off x="4432302" y="4384547"/>
             <a:ext cx="3305755" cy="347806"/>
           </a:xfrm>
           <a:prstGeom prst="rect">
@@ -8554,7 +9217,7 @@
                   <a:schemeClr val="tx1"/>
                 </a:solidFill>
               </a:rPr>
-              <a:t>  0     0     0     0     0     0     0     0    0</a:t>
+              <a:t> 73   26  22   32   14  88   78   31  12</a:t>
             </a:r>
             <a:endParaRPr lang="en-US" dirty="0">
               <a:solidFill>
@@ -8572,7 +9235,7 @@
         </p:nvSpPr>
         <p:spPr>
           <a:xfrm>
-            <a:off x="5050153" y="4032532"/>
+            <a:off x="4432303" y="4032532"/>
             <a:ext cx="3305755" cy="359094"/>
           </a:xfrm>
           <a:prstGeom prst="rect">
@@ -8613,7 +9276,7 @@
                   <a:schemeClr val="tx1"/>
                 </a:solidFill>
               </a:rPr>
-              <a:t>  0     0     0     0     0     0     0     0    0</a:t>
+              <a:t> 98   2     8    52    0    37   25  17    7</a:t>
             </a:r>
             <a:endParaRPr lang="en-US" dirty="0">
               <a:solidFill>
@@ -8631,7 +9294,7 @@
         </p:nvSpPr>
         <p:spPr>
           <a:xfrm>
-            <a:off x="5050154" y="3679210"/>
+            <a:off x="4432304" y="3679210"/>
             <a:ext cx="3305752" cy="359094"/>
           </a:xfrm>
           <a:prstGeom prst="rect">
@@ -8672,52 +9335,13 @@
                   <a:schemeClr val="tx1"/>
                 </a:solidFill>
               </a:rPr>
-              <a:t>  0     0     0     0     0     0     0     0</a:t>
-            </a:r>
-            <a:r>
-              <a:rPr lang="en-US" baseline="-25000" dirty="0" smtClean="0">
-                <a:solidFill>
-                  <a:schemeClr val="tx1"/>
-                </a:solidFill>
-              </a:rPr>
-              <a:t> </a:t>
-            </a:r>
-            <a:r>
-              <a:rPr lang="en-US" dirty="0" smtClean="0">
-                <a:solidFill>
-                  <a:schemeClr val="tx1"/>
-                </a:solidFill>
-              </a:rPr>
-              <a:t>    0</a:t>
+              <a:t> 19  20   73   15  19    9    84   36  11  </a:t>
             </a:r>
             <a:endParaRPr lang="en-US" dirty="0">
               <a:solidFill>
                 <a:schemeClr val="tx1"/>
               </a:solidFill>
             </a:endParaRPr>
-          </a:p>
-        </p:txBody>
-      </p:sp>
-      <p:sp>
-        <p:nvSpPr>
-          <p:cNvPr id="4" name="Title 1"/>
-          <p:cNvSpPr>
-            <a:spLocks noGrp="1"/>
-          </p:cNvSpPr>
-          <p:nvPr>
-            <p:ph type="title"/>
-          </p:nvPr>
-        </p:nvSpPr>
-        <p:spPr/>
-        <p:txBody>
-          <a:bodyPr lIns="9144"/>
-          <a:lstStyle/>
-          <a:p>
-            <a:r>
-              <a:rPr lang="en-US" dirty="0" smtClean="0"/>
-              <a:t>Count Min Sketch Updates</a:t>
-            </a:r>
-            <a:endParaRPr lang="en-US" dirty="0"/>
           </a:p>
         </p:txBody>
       </p:sp>
@@ -8729,7 +9353,7 @@
         </p:nvGrpSpPr>
         <p:grpSpPr>
           <a:xfrm>
-            <a:off x="5376438" y="3321416"/>
+            <a:off x="4758588" y="3321416"/>
             <a:ext cx="2627968" cy="1753144"/>
             <a:chOff x="4152514" y="2740907"/>
             <a:chExt cx="2627968" cy="1911164"/>
@@ -9016,83 +9640,375 @@
           </p:style>
         </p:cxnSp>
       </p:grpSp>
-      <p:cxnSp>
-        <p:nvCxnSpPr>
-          <p:cNvPr id="42" name="Straight Connector 41"/>
-          <p:cNvCxnSpPr/>
+      <p:sp>
+        <p:nvSpPr>
+          <p:cNvPr id="41" name="TextBox 40"/>
+          <p:cNvSpPr txBox="1"/>
           <p:nvPr/>
-        </p:nvCxnSpPr>
+        </p:nvSpPr>
         <p:spPr>
-          <a:xfrm flipV="1">
-            <a:off x="5050153" y="3175885"/>
-            <a:ext cx="3305755" cy="4403"/>
+          <a:xfrm>
+            <a:off x="8526785" y="2625651"/>
+            <a:ext cx="3394904" cy="584775"/>
           </a:xfrm>
-          <a:prstGeom prst="line">
+          <a:prstGeom prst="rect">
             <a:avLst/>
           </a:prstGeom>
-          <a:ln w="19050">
-            <a:solidFill>
-              <a:schemeClr val="dk1"/>
-            </a:solidFill>
-            <a:headEnd type="triangle" w="lg" len="sm"/>
-            <a:tailEnd type="triangle" w="lg" len="sm"/>
-          </a:ln>
+          <a:noFill/>
         </p:spPr>
-        <p:style>
-          <a:lnRef idx="1">
-            <a:schemeClr val="dk1"/>
-          </a:lnRef>
-          <a:fillRef idx="0">
-            <a:schemeClr val="dk1"/>
-          </a:fillRef>
-          <a:effectRef idx="0">
-            <a:schemeClr val="dk1"/>
-          </a:effectRef>
-          <a:fontRef idx="minor">
-            <a:schemeClr val="tx1"/>
-          </a:fontRef>
-        </p:style>
-      </p:cxnSp>
-      <p:cxnSp>
-        <p:nvCxnSpPr>
-          <p:cNvPr id="53" name="Straight Connector 52"/>
-          <p:cNvCxnSpPr/>
+        <p:txBody>
+          <a:bodyPr wrap="none" rtlCol="0">
+            <a:spAutoFit/>
+          </a:bodyPr>
+          <a:lstStyle/>
+          <a:p>
+            <a:r>
+              <a:rPr lang="en-US" sz="3200" dirty="0" smtClean="0">
+                <a:solidFill>
+                  <a:srgbClr val="0070C0"/>
+                </a:solidFill>
+              </a:rPr>
+              <a:t>count[1, h</a:t>
+            </a:r>
+            <a:r>
+              <a:rPr lang="en-US" sz="3200" baseline="-25000" dirty="0" smtClean="0">
+                <a:solidFill>
+                  <a:srgbClr val="0070C0"/>
+                </a:solidFill>
+              </a:rPr>
+              <a:t>1</a:t>
+            </a:r>
+            <a:r>
+              <a:rPr lang="en-US" sz="3200" dirty="0" smtClean="0">
+                <a:solidFill>
+                  <a:srgbClr val="0070C0"/>
+                </a:solidFill>
+              </a:rPr>
+              <a:t>(</a:t>
+            </a:r>
+            <a:r>
+              <a:rPr lang="en-US" sz="3200" dirty="0" err="1" smtClean="0">
+                <a:solidFill>
+                  <a:srgbClr val="0070C0"/>
+                </a:solidFill>
+              </a:rPr>
+              <a:t>i</a:t>
+            </a:r>
+            <a:r>
+              <a:rPr lang="en-US" sz="3200" dirty="0" smtClean="0">
+                <a:solidFill>
+                  <a:srgbClr val="0070C0"/>
+                </a:solidFill>
+              </a:rPr>
+              <a:t>)] = 35</a:t>
+            </a:r>
+            <a:endParaRPr lang="en-US" sz="3200" dirty="0">
+              <a:solidFill>
+                <a:srgbClr val="0070C0"/>
+              </a:solidFill>
+            </a:endParaRPr>
+          </a:p>
+        </p:txBody>
+      </p:sp>
+      <p:sp>
+        <p:nvSpPr>
+          <p:cNvPr id="58" name="TextBox 57"/>
+          <p:cNvSpPr txBox="1"/>
           <p:nvPr/>
-        </p:nvCxnSpPr>
+        </p:nvSpPr>
         <p:spPr>
-          <a:xfrm flipH="1" flipV="1">
-            <a:off x="4858255" y="3339976"/>
-            <a:ext cx="0" cy="1725461"/>
+          <a:xfrm>
+            <a:off x="8526785" y="3783768"/>
+            <a:ext cx="3394904" cy="584775"/>
           </a:xfrm>
-          <a:prstGeom prst="line">
+          <a:prstGeom prst="rect">
             <a:avLst/>
           </a:prstGeom>
-          <a:ln w="19050">
-            <a:solidFill>
-              <a:schemeClr val="dk1"/>
-            </a:solidFill>
-            <a:headEnd type="triangle" w="lg" len="sm"/>
-            <a:tailEnd type="triangle" w="lg" len="sm"/>
-          </a:ln>
+          <a:noFill/>
         </p:spPr>
-        <p:style>
-          <a:lnRef idx="1">
-            <a:schemeClr val="dk1"/>
-          </a:lnRef>
-          <a:fillRef idx="0">
-            <a:schemeClr val="dk1"/>
-          </a:fillRef>
-          <a:effectRef idx="0">
-            <a:schemeClr val="dk1"/>
-          </a:effectRef>
-          <a:fontRef idx="minor">
-            <a:schemeClr val="tx1"/>
-          </a:fontRef>
-        </p:style>
-      </p:cxnSp>
+        <p:txBody>
+          <a:bodyPr wrap="none" rtlCol="0">
+            <a:spAutoFit/>
+          </a:bodyPr>
+          <a:lstStyle/>
+          <a:p>
+            <a:r>
+              <a:rPr lang="en-US" sz="3200" dirty="0" smtClean="0">
+                <a:solidFill>
+                  <a:srgbClr val="0070C0"/>
+                </a:solidFill>
+              </a:rPr>
+              <a:t>count[3, h</a:t>
+            </a:r>
+            <a:r>
+              <a:rPr lang="en-US" sz="3200" baseline="-25000" dirty="0" smtClean="0">
+                <a:solidFill>
+                  <a:srgbClr val="0070C0"/>
+                </a:solidFill>
+              </a:rPr>
+              <a:t>3</a:t>
+            </a:r>
+            <a:r>
+              <a:rPr lang="en-US" sz="3200" dirty="0" smtClean="0">
+                <a:solidFill>
+                  <a:srgbClr val="0070C0"/>
+                </a:solidFill>
+              </a:rPr>
+              <a:t>(</a:t>
+            </a:r>
+            <a:r>
+              <a:rPr lang="en-US" sz="3200" dirty="0" err="1" smtClean="0">
+                <a:solidFill>
+                  <a:srgbClr val="0070C0"/>
+                </a:solidFill>
+              </a:rPr>
+              <a:t>i</a:t>
+            </a:r>
+            <a:r>
+              <a:rPr lang="en-US" sz="3200" dirty="0" smtClean="0">
+                <a:solidFill>
+                  <a:srgbClr val="0070C0"/>
+                </a:solidFill>
+              </a:rPr>
+              <a:t>)] = 25</a:t>
+            </a:r>
+            <a:endParaRPr lang="en-US" sz="3200" dirty="0">
+              <a:solidFill>
+                <a:srgbClr val="0070C0"/>
+              </a:solidFill>
+            </a:endParaRPr>
+          </a:p>
+        </p:txBody>
+      </p:sp>
+      <p:sp>
+        <p:nvSpPr>
+          <p:cNvPr id="69" name="TextBox 68"/>
+          <p:cNvSpPr txBox="1"/>
+          <p:nvPr/>
+        </p:nvSpPr>
+        <p:spPr>
+          <a:xfrm>
+            <a:off x="8526779" y="4319876"/>
+            <a:ext cx="3394904" cy="584775"/>
+          </a:xfrm>
+          <a:prstGeom prst="rect">
+            <a:avLst/>
+          </a:prstGeom>
+          <a:noFill/>
+        </p:spPr>
+        <p:txBody>
+          <a:bodyPr wrap="none" rtlCol="0">
+            <a:spAutoFit/>
+          </a:bodyPr>
+          <a:lstStyle/>
+          <a:p>
+            <a:r>
+              <a:rPr lang="en-US" sz="3200" dirty="0" smtClean="0">
+                <a:solidFill>
+                  <a:srgbClr val="0070C0"/>
+                </a:solidFill>
+              </a:rPr>
+              <a:t>count[4, h</a:t>
+            </a:r>
+            <a:r>
+              <a:rPr lang="en-US" sz="3200" baseline="-25000" dirty="0" smtClean="0">
+                <a:solidFill>
+                  <a:srgbClr val="0070C0"/>
+                </a:solidFill>
+              </a:rPr>
+              <a:t>4</a:t>
+            </a:r>
+            <a:r>
+              <a:rPr lang="en-US" sz="3200" dirty="0" smtClean="0">
+                <a:solidFill>
+                  <a:srgbClr val="0070C0"/>
+                </a:solidFill>
+              </a:rPr>
+              <a:t>(</a:t>
+            </a:r>
+            <a:r>
+              <a:rPr lang="en-US" sz="3200" dirty="0" err="1" smtClean="0">
+                <a:solidFill>
+                  <a:srgbClr val="0070C0"/>
+                </a:solidFill>
+              </a:rPr>
+              <a:t>i</a:t>
+            </a:r>
+            <a:r>
+              <a:rPr lang="en-US" sz="3200" dirty="0" smtClean="0">
+                <a:solidFill>
+                  <a:srgbClr val="0070C0"/>
+                </a:solidFill>
+              </a:rPr>
+              <a:t>)] = </a:t>
+            </a:r>
+            <a:r>
+              <a:rPr lang="en-US" sz="3200" dirty="0" smtClean="0">
+                <a:solidFill>
+                  <a:schemeClr val="accent1"/>
+                </a:solidFill>
+              </a:rPr>
+              <a:t>12</a:t>
+            </a:r>
+            <a:endParaRPr lang="en-US" sz="3200" dirty="0">
+              <a:solidFill>
+                <a:schemeClr val="accent1"/>
+              </a:solidFill>
+            </a:endParaRPr>
+          </a:p>
+        </p:txBody>
+      </p:sp>
+      <p:sp>
+        <p:nvSpPr>
+          <p:cNvPr id="71" name="TextBox 70"/>
+          <p:cNvSpPr txBox="1"/>
+          <p:nvPr/>
+        </p:nvSpPr>
+        <p:spPr>
+          <a:xfrm>
+            <a:off x="8521559" y="4895013"/>
+            <a:ext cx="3394904" cy="584775"/>
+          </a:xfrm>
+          <a:prstGeom prst="rect">
+            <a:avLst/>
+          </a:prstGeom>
+          <a:noFill/>
+        </p:spPr>
+        <p:txBody>
+          <a:bodyPr wrap="none" rtlCol="0">
+            <a:spAutoFit/>
+          </a:bodyPr>
+          <a:lstStyle/>
+          <a:p>
+            <a:r>
+              <a:rPr lang="en-US" sz="3200" dirty="0" smtClean="0">
+                <a:solidFill>
+                  <a:srgbClr val="0070C0"/>
+                </a:solidFill>
+              </a:rPr>
+              <a:t>count[5, h</a:t>
+            </a:r>
+            <a:r>
+              <a:rPr lang="en-US" sz="3200" baseline="-25000" dirty="0" smtClean="0">
+                <a:solidFill>
+                  <a:srgbClr val="0070C0"/>
+                </a:solidFill>
+              </a:rPr>
+              <a:t>5</a:t>
+            </a:r>
+            <a:r>
+              <a:rPr lang="en-US" sz="3200" dirty="0" smtClean="0">
+                <a:solidFill>
+                  <a:srgbClr val="0070C0"/>
+                </a:solidFill>
+              </a:rPr>
+              <a:t>(</a:t>
+            </a:r>
+            <a:r>
+              <a:rPr lang="en-US" sz="3200" dirty="0" err="1" smtClean="0">
+                <a:solidFill>
+                  <a:srgbClr val="0070C0"/>
+                </a:solidFill>
+              </a:rPr>
+              <a:t>i</a:t>
+            </a:r>
+            <a:r>
+              <a:rPr lang="en-US" sz="3200" dirty="0" smtClean="0">
+                <a:solidFill>
+                  <a:srgbClr val="0070C0"/>
+                </a:solidFill>
+              </a:rPr>
+              <a:t>)] = 21</a:t>
+            </a:r>
+            <a:endParaRPr lang="en-US" sz="3200" dirty="0">
+              <a:solidFill>
+                <a:srgbClr val="0070C0"/>
+              </a:solidFill>
+            </a:endParaRPr>
+          </a:p>
+        </p:txBody>
+      </p:sp>
+      <p:sp>
+        <p:nvSpPr>
+          <p:cNvPr id="44" name="TextBox 43"/>
+          <p:cNvSpPr txBox="1"/>
+          <p:nvPr/>
+        </p:nvSpPr>
+        <p:spPr>
+          <a:xfrm>
+            <a:off x="8526779" y="3200998"/>
+            <a:ext cx="3301930" cy="584775"/>
+          </a:xfrm>
+          <a:prstGeom prst="rect">
+            <a:avLst/>
+          </a:prstGeom>
+          <a:noFill/>
+        </p:spPr>
+        <p:txBody>
+          <a:bodyPr wrap="none" rtlCol="0">
+            <a:spAutoFit/>
+          </a:bodyPr>
+          <a:lstStyle/>
+          <a:p>
+            <a:r>
+              <a:rPr lang="en-US" sz="3200" dirty="0" smtClean="0">
+                <a:solidFill>
+                  <a:srgbClr val="0070C0"/>
+                </a:solidFill>
+              </a:rPr>
+              <a:t>count[2, h</a:t>
+            </a:r>
+            <a:r>
+              <a:rPr lang="en-US" sz="3200" baseline="-25000" dirty="0" smtClean="0">
+                <a:solidFill>
+                  <a:srgbClr val="0070C0"/>
+                </a:solidFill>
+              </a:rPr>
+              <a:t>2</a:t>
+            </a:r>
+            <a:r>
+              <a:rPr lang="en-US" sz="3200" dirty="0" smtClean="0">
+                <a:solidFill>
+                  <a:srgbClr val="0070C0"/>
+                </a:solidFill>
+              </a:rPr>
+              <a:t>(</a:t>
+            </a:r>
+            <a:r>
+              <a:rPr lang="en-US" sz="3200" dirty="0" err="1" smtClean="0">
+                <a:solidFill>
+                  <a:srgbClr val="0070C0"/>
+                </a:solidFill>
+              </a:rPr>
+              <a:t>i</a:t>
+            </a:r>
+            <a:r>
+              <a:rPr lang="en-US" sz="3200" dirty="0" smtClean="0">
+                <a:solidFill>
+                  <a:srgbClr val="0070C0"/>
+                </a:solidFill>
+              </a:rPr>
+              <a:t>)]= </a:t>
+            </a:r>
+            <a:r>
+              <a:rPr lang="en-US" sz="3200" dirty="0" smtClean="0">
+                <a:solidFill>
+                  <a:schemeClr val="accent1"/>
+                </a:solidFill>
+              </a:rPr>
+              <a:t>19</a:t>
+            </a:r>
+            <a:endParaRPr lang="en-US" sz="3200" dirty="0">
+              <a:solidFill>
+                <a:schemeClr val="accent1"/>
+              </a:solidFill>
+            </a:endParaRPr>
+          </a:p>
+        </p:txBody>
+      </p:sp>
       <p:pic>
         <p:nvPicPr>
-          <p:cNvPr id="60" name="Picture 59"/>
+          <p:cNvPr id="54" name="Picture 53"/>
           <p:cNvPicPr>
             <a:picLocks noChangeAspect="1"/>
           </p:cNvPicPr>
@@ -9112,44 +10028,382 @@
         </p:blipFill>
         <p:spPr>
           <a:xfrm>
-            <a:off x="5682327" y="2528964"/>
-            <a:ext cx="1687386" cy="641086"/>
+            <a:off x="1097280" y="1898998"/>
+            <a:ext cx="5251565" cy="789451"/>
           </a:xfrm>
           <a:prstGeom prst="rect">
             <a:avLst/>
           </a:prstGeom>
         </p:spPr>
       </p:pic>
-      <p:pic>
-        <p:nvPicPr>
-          <p:cNvPr id="61" name="Picture 60"/>
-          <p:cNvPicPr>
-            <a:picLocks noChangeAspect="1"/>
-          </p:cNvPicPr>
+      <p:sp>
+        <p:nvSpPr>
+          <p:cNvPr id="56" name="Title 1"/>
+          <p:cNvSpPr>
+            <a:spLocks noGrp="1"/>
+          </p:cNvSpPr>
+          <p:nvPr>
+            <p:ph type="title"/>
+          </p:nvPr>
+        </p:nvSpPr>
+        <p:spPr/>
+        <p:txBody>
+          <a:bodyPr/>
+          <a:lstStyle/>
+          <a:p>
+            <a:r>
+              <a:rPr lang="en-US" smtClean="0"/>
+              <a:t>Point Queries Algorithm</a:t>
+            </a:r>
+            <a:endParaRPr lang="en-US" dirty="0"/>
+          </a:p>
+        </p:txBody>
+      </p:sp>
+      <p:sp>
+        <p:nvSpPr>
+          <p:cNvPr id="57" name="TextBox 56"/>
+          <p:cNvSpPr txBox="1"/>
           <p:nvPr/>
-        </p:nvPicPr>
-        <p:blipFill>
-          <a:blip r:embed="rId4">
-            <a:extLst>
-              <a:ext uri="{28A0092B-C50C-407E-A947-70E740481C1C}">
-                <a14:useLocalDpi xmlns:a14="http://schemas.microsoft.com/office/drawing/2010/main" val="0"/>
-              </a:ext>
-            </a:extLst>
-          </a:blip>
-          <a:stretch>
-            <a:fillRect/>
-          </a:stretch>
-        </p:blipFill>
+        </p:nvSpPr>
         <p:spPr>
           <a:xfrm>
-            <a:off x="3247795" y="4022232"/>
-            <a:ext cx="1568404" cy="519471"/>
+            <a:off x="8526779" y="3201809"/>
+            <a:ext cx="3301930" cy="584775"/>
           </a:xfrm>
           <a:prstGeom prst="rect">
             <a:avLst/>
           </a:prstGeom>
+          <a:noFill/>
         </p:spPr>
-      </p:pic>
+        <p:txBody>
+          <a:bodyPr wrap="none" rtlCol="0">
+            <a:spAutoFit/>
+          </a:bodyPr>
+          <a:lstStyle/>
+          <a:p>
+            <a:r>
+              <a:rPr lang="en-US" sz="3200" dirty="0" smtClean="0">
+                <a:solidFill>
+                  <a:srgbClr val="0070C0"/>
+                </a:solidFill>
+              </a:rPr>
+              <a:t>count[2, h</a:t>
+            </a:r>
+            <a:r>
+              <a:rPr lang="en-US" sz="3200" baseline="-25000" dirty="0" smtClean="0">
+                <a:solidFill>
+                  <a:srgbClr val="0070C0"/>
+                </a:solidFill>
+              </a:rPr>
+              <a:t>2</a:t>
+            </a:r>
+            <a:r>
+              <a:rPr lang="en-US" sz="3200" dirty="0" smtClean="0">
+                <a:solidFill>
+                  <a:srgbClr val="0070C0"/>
+                </a:solidFill>
+              </a:rPr>
+              <a:t>(</a:t>
+            </a:r>
+            <a:r>
+              <a:rPr lang="en-US" sz="3200" dirty="0" err="1" smtClean="0">
+                <a:solidFill>
+                  <a:srgbClr val="0070C0"/>
+                </a:solidFill>
+              </a:rPr>
+              <a:t>i</a:t>
+            </a:r>
+            <a:r>
+              <a:rPr lang="en-US" sz="3200" dirty="0" smtClean="0">
+                <a:solidFill>
+                  <a:srgbClr val="0070C0"/>
+                </a:solidFill>
+              </a:rPr>
+              <a:t>)]= 19</a:t>
+            </a:r>
+            <a:endParaRPr lang="en-US" sz="3200" dirty="0">
+              <a:solidFill>
+                <a:srgbClr val="0070C0"/>
+              </a:solidFill>
+            </a:endParaRPr>
+          </a:p>
+        </p:txBody>
+      </p:sp>
+      <p:sp>
+        <p:nvSpPr>
+          <p:cNvPr id="59" name="Rectangle 58"/>
+          <p:cNvSpPr/>
+          <p:nvPr/>
+        </p:nvSpPr>
+        <p:spPr>
+          <a:xfrm>
+            <a:off x="7378977" y="4391626"/>
+            <a:ext cx="356343" cy="340727"/>
+          </a:xfrm>
+          <a:prstGeom prst="rect">
+            <a:avLst/>
+          </a:prstGeom>
+          <a:ln>
+            <a:solidFill>
+              <a:schemeClr val="tx1"/>
+            </a:solidFill>
+          </a:ln>
+        </p:spPr>
+        <p:style>
+          <a:lnRef idx="2">
+            <a:schemeClr val="accent6"/>
+          </a:lnRef>
+          <a:fillRef idx="1">
+            <a:schemeClr val="lt1"/>
+          </a:fillRef>
+          <a:effectRef idx="0">
+            <a:schemeClr val="accent6"/>
+          </a:effectRef>
+          <a:fontRef idx="minor">
+            <a:schemeClr val="dk1"/>
+          </a:fontRef>
+        </p:style>
+        <p:txBody>
+          <a:bodyPr lIns="0" tIns="45720" rIns="0" bIns="45720" rtlCol="0" anchor="ctr"/>
+          <a:lstStyle/>
+          <a:p>
+            <a:pPr algn="ctr"/>
+            <a:r>
+              <a:rPr lang="en-US" dirty="0" smtClean="0">
+                <a:solidFill>
+                  <a:srgbClr val="0070C0"/>
+                </a:solidFill>
+              </a:rPr>
+              <a:t>12</a:t>
+            </a:r>
+            <a:endParaRPr lang="en-US" dirty="0">
+              <a:solidFill>
+                <a:srgbClr val="0070C0"/>
+              </a:solidFill>
+            </a:endParaRPr>
+          </a:p>
+        </p:txBody>
+      </p:sp>
+      <p:sp>
+        <p:nvSpPr>
+          <p:cNvPr id="64" name="Rectangle 63"/>
+          <p:cNvSpPr/>
+          <p:nvPr/>
+        </p:nvSpPr>
+        <p:spPr>
+          <a:xfrm>
+            <a:off x="5150855" y="3325308"/>
+            <a:ext cx="374537" cy="355752"/>
+          </a:xfrm>
+          <a:prstGeom prst="rect">
+            <a:avLst/>
+          </a:prstGeom>
+          <a:ln>
+            <a:solidFill>
+              <a:schemeClr val="tx1"/>
+            </a:solidFill>
+          </a:ln>
+        </p:spPr>
+        <p:style>
+          <a:lnRef idx="2">
+            <a:schemeClr val="accent6"/>
+          </a:lnRef>
+          <a:fillRef idx="1">
+            <a:schemeClr val="lt1"/>
+          </a:fillRef>
+          <a:effectRef idx="0">
+            <a:schemeClr val="accent6"/>
+          </a:effectRef>
+          <a:fontRef idx="minor">
+            <a:schemeClr val="dk1"/>
+          </a:fontRef>
+        </p:style>
+        <p:txBody>
+          <a:bodyPr lIns="0" tIns="45720" rIns="0" bIns="45720" rtlCol="0" anchor="ctr"/>
+          <a:lstStyle/>
+          <a:p>
+            <a:pPr algn="ctr"/>
+            <a:r>
+              <a:rPr lang="en-US" dirty="0" smtClean="0">
+                <a:solidFill>
+                  <a:srgbClr val="0070C0"/>
+                </a:solidFill>
+              </a:rPr>
+              <a:t>35</a:t>
+            </a:r>
+            <a:endParaRPr lang="en-US" dirty="0">
+              <a:solidFill>
+                <a:srgbClr val="0070C0"/>
+              </a:solidFill>
+            </a:endParaRPr>
+          </a:p>
+        </p:txBody>
+      </p:sp>
+      <p:sp>
+        <p:nvSpPr>
+          <p:cNvPr id="31" name="Rectangle 30"/>
+          <p:cNvSpPr/>
+          <p:nvPr/>
+        </p:nvSpPr>
+        <p:spPr>
+          <a:xfrm>
+            <a:off x="4434988" y="3679210"/>
+            <a:ext cx="329184" cy="362395"/>
+          </a:xfrm>
+          <a:prstGeom prst="rect">
+            <a:avLst/>
+          </a:prstGeom>
+          <a:ln>
+            <a:solidFill>
+              <a:schemeClr val="tx1"/>
+            </a:solidFill>
+          </a:ln>
+        </p:spPr>
+        <p:style>
+          <a:lnRef idx="2">
+            <a:schemeClr val="accent6"/>
+          </a:lnRef>
+          <a:fillRef idx="1">
+            <a:schemeClr val="lt1"/>
+          </a:fillRef>
+          <a:effectRef idx="0">
+            <a:schemeClr val="accent6"/>
+          </a:effectRef>
+          <a:fontRef idx="minor">
+            <a:schemeClr val="dk1"/>
+          </a:fontRef>
+        </p:style>
+        <p:txBody>
+          <a:bodyPr lIns="0" tIns="45720" rIns="0" bIns="45720" rtlCol="0" anchor="ctr"/>
+          <a:lstStyle/>
+          <a:p>
+            <a:pPr algn="ctr"/>
+            <a:r>
+              <a:rPr lang="en-US" dirty="0" smtClean="0">
+                <a:solidFill>
+                  <a:srgbClr val="0070C0"/>
+                </a:solidFill>
+              </a:rPr>
+              <a:t>19</a:t>
+            </a:r>
+            <a:endParaRPr lang="en-US" dirty="0">
+              <a:solidFill>
+                <a:srgbClr val="0070C0"/>
+              </a:solidFill>
+            </a:endParaRPr>
+          </a:p>
+        </p:txBody>
+      </p:sp>
+      <p:sp>
+        <p:nvSpPr>
+          <p:cNvPr id="32" name="Rectangle 31"/>
+          <p:cNvSpPr/>
+          <p:nvPr/>
+        </p:nvSpPr>
+        <p:spPr>
+          <a:xfrm>
+            <a:off x="6633907" y="4041605"/>
+            <a:ext cx="373798" cy="350022"/>
+          </a:xfrm>
+          <a:prstGeom prst="rect">
+            <a:avLst/>
+          </a:prstGeom>
+          <a:ln>
+            <a:solidFill>
+              <a:schemeClr val="tx1"/>
+            </a:solidFill>
+          </a:ln>
+        </p:spPr>
+        <p:style>
+          <a:lnRef idx="2">
+            <a:schemeClr val="accent6"/>
+          </a:lnRef>
+          <a:fillRef idx="1">
+            <a:schemeClr val="lt1"/>
+          </a:fillRef>
+          <a:effectRef idx="0">
+            <a:schemeClr val="accent6"/>
+          </a:effectRef>
+          <a:fontRef idx="minor">
+            <a:schemeClr val="dk1"/>
+          </a:fontRef>
+        </p:style>
+        <p:txBody>
+          <a:bodyPr lIns="0" tIns="45720" rIns="0" bIns="45720" rtlCol="0" anchor="ctr"/>
+          <a:lstStyle/>
+          <a:p>
+            <a:pPr algn="ctr"/>
+            <a:r>
+              <a:rPr lang="en-US" dirty="0" smtClean="0">
+                <a:solidFill>
+                  <a:srgbClr val="0070C0"/>
+                </a:solidFill>
+              </a:rPr>
+              <a:t>25</a:t>
+            </a:r>
+            <a:endParaRPr lang="en-US" dirty="0">
+              <a:solidFill>
+                <a:srgbClr val="0070C0"/>
+              </a:solidFill>
+            </a:endParaRPr>
+          </a:p>
+        </p:txBody>
+      </p:sp>
+      <p:sp>
+        <p:nvSpPr>
+          <p:cNvPr id="33" name="Rectangle 32"/>
+          <p:cNvSpPr/>
+          <p:nvPr/>
+        </p:nvSpPr>
+        <p:spPr>
+          <a:xfrm>
+            <a:off x="4760730" y="4733780"/>
+            <a:ext cx="374904" cy="329184"/>
+          </a:xfrm>
+          <a:prstGeom prst="rect">
+            <a:avLst/>
+          </a:prstGeom>
+          <a:ln>
+            <a:solidFill>
+              <a:schemeClr val="tx1"/>
+            </a:solidFill>
+          </a:ln>
+        </p:spPr>
+        <p:style>
+          <a:lnRef idx="2">
+            <a:schemeClr val="accent6"/>
+          </a:lnRef>
+          <a:fillRef idx="1">
+            <a:schemeClr val="lt1"/>
+          </a:fillRef>
+          <a:effectRef idx="0">
+            <a:schemeClr val="accent6"/>
+          </a:effectRef>
+          <a:fontRef idx="minor">
+            <a:schemeClr val="dk1"/>
+          </a:fontRef>
+        </p:style>
+        <p:txBody>
+          <a:bodyPr lIns="0" tIns="45720" rIns="0" bIns="45720" rtlCol="0" anchor="ctr"/>
+          <a:lstStyle/>
+          <a:p>
+            <a:pPr algn="ctr"/>
+            <a:r>
+              <a:rPr lang="en-US" dirty="0" smtClean="0">
+                <a:solidFill>
+                  <a:srgbClr val="0070C0"/>
+                </a:solidFill>
+              </a:rPr>
+              <a:t>21</a:t>
+            </a:r>
+            <a:endParaRPr lang="en-US" dirty="0">
+              <a:solidFill>
+                <a:srgbClr val="0070C0"/>
+              </a:solidFill>
+            </a:endParaRPr>
+          </a:p>
+        </p:txBody>
+      </p:sp>
       <p:cxnSp>
         <p:nvCxnSpPr>
           <p:cNvPr id="5" name="Straight Arrow Connector 4"/>
@@ -9160,8 +10414,8 @@
         </p:nvCxnSpPr>
         <p:spPr>
           <a:xfrm flipH="1">
-            <a:off x="6791140" y="2918039"/>
-            <a:ext cx="2353495" cy="497673"/>
+            <a:off x="5461901" y="2918039"/>
+            <a:ext cx="3064884" cy="525377"/>
           </a:xfrm>
           <a:prstGeom prst="straightConnector1">
             <a:avLst/>
@@ -9188,694 +10442,6 @@
           </a:fontRef>
         </p:style>
       </p:cxnSp>
-      <p:sp>
-        <p:nvSpPr>
-          <p:cNvPr id="41" name="TextBox 40"/>
-          <p:cNvSpPr txBox="1"/>
-          <p:nvPr/>
-        </p:nvSpPr>
-        <p:spPr>
-          <a:xfrm>
-            <a:off x="9144635" y="2625651"/>
-            <a:ext cx="976549" cy="584775"/>
-          </a:xfrm>
-          <a:prstGeom prst="rect">
-            <a:avLst/>
-          </a:prstGeom>
-          <a:noFill/>
-        </p:spPr>
-        <p:txBody>
-          <a:bodyPr wrap="none" rtlCol="0">
-            <a:spAutoFit/>
-          </a:bodyPr>
-          <a:lstStyle/>
-          <a:p>
-            <a:r>
-              <a:rPr lang="en-US" sz="3200" dirty="0" smtClean="0">
-                <a:solidFill>
-                  <a:srgbClr val="0070C0"/>
-                </a:solidFill>
-              </a:rPr>
-              <a:t>h</a:t>
-            </a:r>
-            <a:r>
-              <a:rPr lang="en-US" sz="3200" baseline="-25000" dirty="0" smtClean="0">
-                <a:solidFill>
-                  <a:srgbClr val="0070C0"/>
-                </a:solidFill>
-              </a:rPr>
-              <a:t>1</a:t>
-            </a:r>
-            <a:r>
-              <a:rPr lang="en-US" sz="3200" dirty="0" smtClean="0">
-                <a:solidFill>
-                  <a:srgbClr val="0070C0"/>
-                </a:solidFill>
-              </a:rPr>
-              <a:t>(</a:t>
-            </a:r>
-            <a:r>
-              <a:rPr lang="en-US" sz="3200" dirty="0">
-                <a:solidFill>
-                  <a:srgbClr val="0070C0"/>
-                </a:solidFill>
-              </a:rPr>
-              <a:t>i</a:t>
-            </a:r>
-            <a:r>
-              <a:rPr lang="en-US" sz="3200" baseline="-25000" dirty="0" smtClean="0">
-                <a:solidFill>
-                  <a:srgbClr val="0070C0"/>
-                </a:solidFill>
-              </a:rPr>
-              <a:t>t</a:t>
-            </a:r>
-            <a:r>
-              <a:rPr lang="en-US" sz="3200" dirty="0" smtClean="0">
-                <a:solidFill>
-                  <a:srgbClr val="0070C0"/>
-                </a:solidFill>
-              </a:rPr>
-              <a:t>)</a:t>
-            </a:r>
-            <a:endParaRPr lang="en-US" sz="3200" dirty="0">
-              <a:solidFill>
-                <a:srgbClr val="0070C0"/>
-              </a:solidFill>
-            </a:endParaRPr>
-          </a:p>
-        </p:txBody>
-      </p:sp>
-      <p:sp>
-        <p:nvSpPr>
-          <p:cNvPr id="9" name="TextBox 8"/>
-          <p:cNvSpPr txBox="1"/>
-          <p:nvPr/>
-        </p:nvSpPr>
-        <p:spPr>
-          <a:xfrm>
-            <a:off x="-1046480" y="2078959"/>
-            <a:ext cx="1173719" cy="584775"/>
-          </a:xfrm>
-          <a:prstGeom prst="rect">
-            <a:avLst/>
-          </a:prstGeom>
-          <a:noFill/>
-        </p:spPr>
-        <p:txBody>
-          <a:bodyPr wrap="none" rtlCol="0">
-            <a:spAutoFit/>
-          </a:bodyPr>
-          <a:lstStyle/>
-          <a:p>
-            <a:r>
-              <a:rPr lang="en-US" sz="3200" dirty="0" smtClean="0">
-                <a:solidFill>
-                  <a:srgbClr val="0070C0"/>
-                </a:solidFill>
-              </a:rPr>
-              <a:t>(i</a:t>
-            </a:r>
-            <a:r>
-              <a:rPr lang="en-US" sz="3200" baseline="-25000" dirty="0" smtClean="0">
-                <a:solidFill>
-                  <a:srgbClr val="0070C0"/>
-                </a:solidFill>
-              </a:rPr>
-              <a:t>t</a:t>
-            </a:r>
-            <a:r>
-              <a:rPr lang="en-US" sz="3200" dirty="0" smtClean="0">
-                <a:solidFill>
-                  <a:srgbClr val="0070C0"/>
-                </a:solidFill>
-              </a:rPr>
-              <a:t> , </a:t>
-            </a:r>
-            <a:r>
-              <a:rPr lang="en-US" sz="3200" dirty="0" err="1" smtClean="0">
-                <a:solidFill>
-                  <a:srgbClr val="0070C0"/>
-                </a:solidFill>
-              </a:rPr>
-              <a:t>c</a:t>
-            </a:r>
-            <a:r>
-              <a:rPr lang="en-US" sz="3200" baseline="-25000" dirty="0" err="1" smtClean="0">
-                <a:solidFill>
-                  <a:srgbClr val="0070C0"/>
-                </a:solidFill>
-              </a:rPr>
-              <a:t>t</a:t>
-            </a:r>
-            <a:r>
-              <a:rPr lang="en-US" sz="3200" dirty="0" smtClean="0">
-                <a:solidFill>
-                  <a:srgbClr val="0070C0"/>
-                </a:solidFill>
-              </a:rPr>
-              <a:t>)</a:t>
-            </a:r>
-            <a:endParaRPr lang="en-US" sz="3200" dirty="0">
-              <a:solidFill>
-                <a:srgbClr val="0070C0"/>
-              </a:solidFill>
-            </a:endParaRPr>
-          </a:p>
-        </p:txBody>
-      </p:sp>
-      <p:sp>
-        <p:nvSpPr>
-          <p:cNvPr id="48" name="TextBox 47"/>
-          <p:cNvSpPr txBox="1"/>
-          <p:nvPr/>
-        </p:nvSpPr>
-        <p:spPr>
-          <a:xfrm>
-            <a:off x="9144640" y="3204710"/>
-            <a:ext cx="976549" cy="584775"/>
-          </a:xfrm>
-          <a:prstGeom prst="rect">
-            <a:avLst/>
-          </a:prstGeom>
-          <a:noFill/>
-        </p:spPr>
-        <p:txBody>
-          <a:bodyPr wrap="none" rtlCol="0">
-            <a:spAutoFit/>
-          </a:bodyPr>
-          <a:lstStyle/>
-          <a:p>
-            <a:r>
-              <a:rPr lang="en-US" sz="3200" dirty="0" smtClean="0">
-                <a:solidFill>
-                  <a:srgbClr val="0070C0"/>
-                </a:solidFill>
-              </a:rPr>
-              <a:t>h</a:t>
-            </a:r>
-            <a:r>
-              <a:rPr lang="en-US" sz="3200" baseline="-25000" dirty="0">
-                <a:solidFill>
-                  <a:srgbClr val="0070C0"/>
-                </a:solidFill>
-              </a:rPr>
-              <a:t>2</a:t>
-            </a:r>
-            <a:r>
-              <a:rPr lang="en-US" sz="3200" dirty="0" smtClean="0">
-                <a:solidFill>
-                  <a:srgbClr val="0070C0"/>
-                </a:solidFill>
-              </a:rPr>
-              <a:t>(i</a:t>
-            </a:r>
-            <a:r>
-              <a:rPr lang="en-US" sz="3200" baseline="-25000" dirty="0" smtClean="0">
-                <a:solidFill>
-                  <a:srgbClr val="0070C0"/>
-                </a:solidFill>
-              </a:rPr>
-              <a:t>t</a:t>
-            </a:r>
-            <a:r>
-              <a:rPr lang="en-US" sz="3200" dirty="0" smtClean="0">
-                <a:solidFill>
-                  <a:srgbClr val="0070C0"/>
-                </a:solidFill>
-              </a:rPr>
-              <a:t>)</a:t>
-            </a:r>
-            <a:endParaRPr lang="en-US" sz="3200" dirty="0">
-              <a:solidFill>
-                <a:srgbClr val="0070C0"/>
-              </a:solidFill>
-            </a:endParaRPr>
-          </a:p>
-        </p:txBody>
-      </p:sp>
-      <p:sp>
-        <p:nvSpPr>
-          <p:cNvPr id="58" name="TextBox 57"/>
-          <p:cNvSpPr txBox="1"/>
-          <p:nvPr/>
-        </p:nvSpPr>
-        <p:spPr>
-          <a:xfrm>
-            <a:off x="9144635" y="3783768"/>
-            <a:ext cx="976549" cy="584775"/>
-          </a:xfrm>
-          <a:prstGeom prst="rect">
-            <a:avLst/>
-          </a:prstGeom>
-          <a:noFill/>
-        </p:spPr>
-        <p:txBody>
-          <a:bodyPr wrap="none" rtlCol="0">
-            <a:spAutoFit/>
-          </a:bodyPr>
-          <a:lstStyle/>
-          <a:p>
-            <a:r>
-              <a:rPr lang="en-US" sz="3200" dirty="0" smtClean="0">
-                <a:solidFill>
-                  <a:srgbClr val="0070C0"/>
-                </a:solidFill>
-              </a:rPr>
-              <a:t>h</a:t>
-            </a:r>
-            <a:r>
-              <a:rPr lang="en-US" sz="3200" baseline="-25000" dirty="0" smtClean="0">
-                <a:solidFill>
-                  <a:srgbClr val="0070C0"/>
-                </a:solidFill>
-              </a:rPr>
-              <a:t>3</a:t>
-            </a:r>
-            <a:r>
-              <a:rPr lang="en-US" sz="3200" dirty="0" smtClean="0">
-                <a:solidFill>
-                  <a:srgbClr val="0070C0"/>
-                </a:solidFill>
-              </a:rPr>
-              <a:t>(i</a:t>
-            </a:r>
-            <a:r>
-              <a:rPr lang="en-US" sz="3200" baseline="-25000" dirty="0" smtClean="0">
-                <a:solidFill>
-                  <a:srgbClr val="0070C0"/>
-                </a:solidFill>
-              </a:rPr>
-              <a:t>t</a:t>
-            </a:r>
-            <a:r>
-              <a:rPr lang="en-US" sz="3200" dirty="0" smtClean="0">
-                <a:solidFill>
-                  <a:srgbClr val="0070C0"/>
-                </a:solidFill>
-              </a:rPr>
-              <a:t>)</a:t>
-            </a:r>
-            <a:endParaRPr lang="en-US" sz="3200" dirty="0">
-              <a:solidFill>
-                <a:srgbClr val="0070C0"/>
-              </a:solidFill>
-            </a:endParaRPr>
-          </a:p>
-        </p:txBody>
-      </p:sp>
-      <p:sp>
-        <p:nvSpPr>
-          <p:cNvPr id="69" name="TextBox 68"/>
-          <p:cNvSpPr txBox="1"/>
-          <p:nvPr/>
-        </p:nvSpPr>
-        <p:spPr>
-          <a:xfrm>
-            <a:off x="9144629" y="4319876"/>
-            <a:ext cx="976549" cy="584775"/>
-          </a:xfrm>
-          <a:prstGeom prst="rect">
-            <a:avLst/>
-          </a:prstGeom>
-          <a:noFill/>
-        </p:spPr>
-        <p:txBody>
-          <a:bodyPr wrap="none" rtlCol="0">
-            <a:spAutoFit/>
-          </a:bodyPr>
-          <a:lstStyle/>
-          <a:p>
-            <a:r>
-              <a:rPr lang="en-US" sz="3200" dirty="0" smtClean="0">
-                <a:solidFill>
-                  <a:srgbClr val="0070C0"/>
-                </a:solidFill>
-              </a:rPr>
-              <a:t>h</a:t>
-            </a:r>
-            <a:r>
-              <a:rPr lang="en-US" sz="3200" baseline="-25000" dirty="0">
-                <a:solidFill>
-                  <a:srgbClr val="0070C0"/>
-                </a:solidFill>
-              </a:rPr>
-              <a:t>4</a:t>
-            </a:r>
-            <a:r>
-              <a:rPr lang="en-US" sz="3200" dirty="0" smtClean="0">
-                <a:solidFill>
-                  <a:srgbClr val="0070C0"/>
-                </a:solidFill>
-              </a:rPr>
-              <a:t>(i</a:t>
-            </a:r>
-            <a:r>
-              <a:rPr lang="en-US" sz="3200" baseline="-25000" dirty="0" smtClean="0">
-                <a:solidFill>
-                  <a:srgbClr val="0070C0"/>
-                </a:solidFill>
-              </a:rPr>
-              <a:t>t</a:t>
-            </a:r>
-            <a:r>
-              <a:rPr lang="en-US" sz="3200" dirty="0" smtClean="0">
-                <a:solidFill>
-                  <a:srgbClr val="0070C0"/>
-                </a:solidFill>
-              </a:rPr>
-              <a:t>)</a:t>
-            </a:r>
-            <a:endParaRPr lang="en-US" sz="3200" dirty="0">
-              <a:solidFill>
-                <a:srgbClr val="0070C0"/>
-              </a:solidFill>
-            </a:endParaRPr>
-          </a:p>
-        </p:txBody>
-      </p:sp>
-      <p:sp>
-        <p:nvSpPr>
-          <p:cNvPr id="71" name="TextBox 70"/>
-          <p:cNvSpPr txBox="1"/>
-          <p:nvPr/>
-        </p:nvSpPr>
-        <p:spPr>
-          <a:xfrm>
-            <a:off x="9139409" y="4895013"/>
-            <a:ext cx="976549" cy="584775"/>
-          </a:xfrm>
-          <a:prstGeom prst="rect">
-            <a:avLst/>
-          </a:prstGeom>
-          <a:noFill/>
-        </p:spPr>
-        <p:txBody>
-          <a:bodyPr wrap="none" rtlCol="0">
-            <a:spAutoFit/>
-          </a:bodyPr>
-          <a:lstStyle/>
-          <a:p>
-            <a:r>
-              <a:rPr lang="en-US" sz="3200" dirty="0" smtClean="0">
-                <a:solidFill>
-                  <a:srgbClr val="0070C0"/>
-                </a:solidFill>
-              </a:rPr>
-              <a:t>h</a:t>
-            </a:r>
-            <a:r>
-              <a:rPr lang="en-US" sz="3200" baseline="-25000" dirty="0">
-                <a:solidFill>
-                  <a:srgbClr val="0070C0"/>
-                </a:solidFill>
-              </a:rPr>
-              <a:t>5</a:t>
-            </a:r>
-            <a:r>
-              <a:rPr lang="en-US" sz="3200" dirty="0" smtClean="0">
-                <a:solidFill>
-                  <a:srgbClr val="0070C0"/>
-                </a:solidFill>
-              </a:rPr>
-              <a:t>(i</a:t>
-            </a:r>
-            <a:r>
-              <a:rPr lang="en-US" sz="3200" baseline="-25000" dirty="0" smtClean="0">
-                <a:solidFill>
-                  <a:srgbClr val="0070C0"/>
-                </a:solidFill>
-              </a:rPr>
-              <a:t>t</a:t>
-            </a:r>
-            <a:r>
-              <a:rPr lang="en-US" sz="3200" dirty="0" smtClean="0">
-                <a:solidFill>
-                  <a:srgbClr val="0070C0"/>
-                </a:solidFill>
-              </a:rPr>
-              <a:t>)</a:t>
-            </a:r>
-            <a:endParaRPr lang="en-US" sz="3200" dirty="0">
-              <a:solidFill>
-                <a:srgbClr val="0070C0"/>
-              </a:solidFill>
-            </a:endParaRPr>
-          </a:p>
-        </p:txBody>
-      </p:sp>
-      <p:sp>
-        <p:nvSpPr>
-          <p:cNvPr id="80" name="Rectangle 79"/>
-          <p:cNvSpPr/>
-          <p:nvPr/>
-        </p:nvSpPr>
-        <p:spPr>
-          <a:xfrm>
-            <a:off x="7634293" y="3678147"/>
-            <a:ext cx="368105" cy="363458"/>
-          </a:xfrm>
-          <a:prstGeom prst="rect">
-            <a:avLst/>
-          </a:prstGeom>
-          <a:ln>
-            <a:solidFill>
-              <a:schemeClr val="tx1"/>
-            </a:solidFill>
-          </a:ln>
-        </p:spPr>
-        <p:style>
-          <a:lnRef idx="2">
-            <a:schemeClr val="accent6"/>
-          </a:lnRef>
-          <a:fillRef idx="1">
-            <a:schemeClr val="lt1"/>
-          </a:fillRef>
-          <a:effectRef idx="0">
-            <a:schemeClr val="accent6"/>
-          </a:effectRef>
-          <a:fontRef idx="minor">
-            <a:schemeClr val="dk1"/>
-          </a:fontRef>
-        </p:style>
-        <p:txBody>
-          <a:bodyPr lIns="0" tIns="0" rIns="0" bIns="45720" rtlCol="0" anchor="ctr"/>
-          <a:lstStyle/>
-          <a:p>
-            <a:pPr algn="ctr"/>
-            <a:r>
-              <a:rPr lang="en-US" dirty="0" err="1" smtClean="0">
-                <a:solidFill>
-                  <a:srgbClr val="0070C0"/>
-                </a:solidFill>
-              </a:rPr>
-              <a:t>c</a:t>
-            </a:r>
-            <a:r>
-              <a:rPr lang="en-US" baseline="-25000" dirty="0" err="1" smtClean="0">
-                <a:solidFill>
-                  <a:srgbClr val="0070C0"/>
-                </a:solidFill>
-              </a:rPr>
-              <a:t>t</a:t>
-            </a:r>
-            <a:endParaRPr lang="en-US" dirty="0">
-              <a:solidFill>
-                <a:srgbClr val="0070C0"/>
-              </a:solidFill>
-            </a:endParaRPr>
-          </a:p>
-        </p:txBody>
-      </p:sp>
-      <p:sp>
-        <p:nvSpPr>
-          <p:cNvPr id="82" name="Rectangle 81"/>
-          <p:cNvSpPr/>
-          <p:nvPr/>
-        </p:nvSpPr>
-        <p:spPr>
-          <a:xfrm>
-            <a:off x="5764537" y="4039366"/>
-            <a:ext cx="378704" cy="352259"/>
-          </a:xfrm>
-          <a:prstGeom prst="rect">
-            <a:avLst/>
-          </a:prstGeom>
-          <a:ln>
-            <a:solidFill>
-              <a:schemeClr val="tx1"/>
-            </a:solidFill>
-          </a:ln>
-        </p:spPr>
-        <p:style>
-          <a:lnRef idx="2">
-            <a:schemeClr val="accent6"/>
-          </a:lnRef>
-          <a:fillRef idx="1">
-            <a:schemeClr val="lt1"/>
-          </a:fillRef>
-          <a:effectRef idx="0">
-            <a:schemeClr val="accent6"/>
-          </a:effectRef>
-          <a:fontRef idx="minor">
-            <a:schemeClr val="dk1"/>
-          </a:fontRef>
-        </p:style>
-        <p:txBody>
-          <a:bodyPr lIns="0" tIns="0" rIns="0" bIns="45720" rtlCol="0" anchor="ctr"/>
-          <a:lstStyle/>
-          <a:p>
-            <a:pPr algn="ctr"/>
-            <a:r>
-              <a:rPr lang="en-US" dirty="0" err="1" smtClean="0">
-                <a:solidFill>
-                  <a:srgbClr val="0070C0"/>
-                </a:solidFill>
-              </a:rPr>
-              <a:t>c</a:t>
-            </a:r>
-            <a:r>
-              <a:rPr lang="en-US" baseline="-25000" dirty="0" err="1" smtClean="0">
-                <a:solidFill>
-                  <a:srgbClr val="0070C0"/>
-                </a:solidFill>
-              </a:rPr>
-              <a:t>t</a:t>
-            </a:r>
-            <a:endParaRPr lang="en-US" dirty="0">
-              <a:solidFill>
-                <a:srgbClr val="0070C0"/>
-              </a:solidFill>
-            </a:endParaRPr>
-          </a:p>
-        </p:txBody>
-      </p:sp>
-      <p:sp>
-        <p:nvSpPr>
-          <p:cNvPr id="88" name="Rectangle 87"/>
-          <p:cNvSpPr/>
-          <p:nvPr/>
-        </p:nvSpPr>
-        <p:spPr>
-          <a:xfrm>
-            <a:off x="6506115" y="4391624"/>
-            <a:ext cx="372531" cy="340729"/>
-          </a:xfrm>
-          <a:prstGeom prst="rect">
-            <a:avLst/>
-          </a:prstGeom>
-          <a:ln>
-            <a:solidFill>
-              <a:schemeClr val="tx1"/>
-            </a:solidFill>
-          </a:ln>
-        </p:spPr>
-        <p:style>
-          <a:lnRef idx="2">
-            <a:schemeClr val="accent6"/>
-          </a:lnRef>
-          <a:fillRef idx="1">
-            <a:schemeClr val="lt1"/>
-          </a:fillRef>
-          <a:effectRef idx="0">
-            <a:schemeClr val="accent6"/>
-          </a:effectRef>
-          <a:fontRef idx="minor">
-            <a:schemeClr val="dk1"/>
-          </a:fontRef>
-        </p:style>
-        <p:txBody>
-          <a:bodyPr lIns="0" tIns="0" rIns="0" bIns="45720" rtlCol="0" anchor="ctr"/>
-          <a:lstStyle/>
-          <a:p>
-            <a:pPr algn="ctr"/>
-            <a:r>
-              <a:rPr lang="en-US" dirty="0" err="1" smtClean="0">
-                <a:solidFill>
-                  <a:srgbClr val="0070C0"/>
-                </a:solidFill>
-              </a:rPr>
-              <a:t>c</a:t>
-            </a:r>
-            <a:r>
-              <a:rPr lang="en-US" baseline="-25000" dirty="0" err="1" smtClean="0">
-                <a:solidFill>
-                  <a:srgbClr val="0070C0"/>
-                </a:solidFill>
-              </a:rPr>
-              <a:t>t</a:t>
-            </a:r>
-            <a:endParaRPr lang="en-US" dirty="0">
-              <a:solidFill>
-                <a:srgbClr val="0070C0"/>
-              </a:solidFill>
-            </a:endParaRPr>
-          </a:p>
-        </p:txBody>
-      </p:sp>
-      <p:sp>
-        <p:nvSpPr>
-          <p:cNvPr id="89" name="Rectangle 88"/>
-          <p:cNvSpPr/>
-          <p:nvPr/>
-        </p:nvSpPr>
-        <p:spPr>
-          <a:xfrm>
-            <a:off x="7989496" y="4732353"/>
-            <a:ext cx="366403" cy="330425"/>
-          </a:xfrm>
-          <a:prstGeom prst="rect">
-            <a:avLst/>
-          </a:prstGeom>
-          <a:ln>
-            <a:solidFill>
-              <a:schemeClr val="tx1"/>
-            </a:solidFill>
-          </a:ln>
-        </p:spPr>
-        <p:style>
-          <a:lnRef idx="2">
-            <a:schemeClr val="accent6"/>
-          </a:lnRef>
-          <a:fillRef idx="1">
-            <a:schemeClr val="lt1"/>
-          </a:fillRef>
-          <a:effectRef idx="0">
-            <a:schemeClr val="accent6"/>
-          </a:effectRef>
-          <a:fontRef idx="minor">
-            <a:schemeClr val="dk1"/>
-          </a:fontRef>
-        </p:style>
-        <p:txBody>
-          <a:bodyPr lIns="0" tIns="0" rIns="0" bIns="45720" rtlCol="0" anchor="ctr"/>
-          <a:lstStyle/>
-          <a:p>
-            <a:pPr algn="ctr"/>
-            <a:r>
-              <a:rPr lang="en-US" dirty="0" err="1" smtClean="0">
-                <a:solidFill>
-                  <a:srgbClr val="0070C0"/>
-                </a:solidFill>
-              </a:rPr>
-              <a:t>c</a:t>
-            </a:r>
-            <a:r>
-              <a:rPr lang="en-US" baseline="-25000" dirty="0" err="1" smtClean="0">
-                <a:solidFill>
-                  <a:srgbClr val="0070C0"/>
-                </a:solidFill>
-              </a:rPr>
-              <a:t>t</a:t>
-            </a:r>
-            <a:endParaRPr lang="en-US" dirty="0">
-              <a:solidFill>
-                <a:srgbClr val="0070C0"/>
-              </a:solidFill>
-            </a:endParaRPr>
-          </a:p>
-        </p:txBody>
-      </p:sp>
       <p:cxnSp>
         <p:nvCxnSpPr>
           <p:cNvPr id="63" name="Straight Arrow Connector 62"/>
@@ -9884,8 +10450,8 @@
         </p:nvCxnSpPr>
         <p:spPr>
           <a:xfrm flipH="1">
-            <a:off x="6079751" y="4111135"/>
-            <a:ext cx="3113893" cy="116890"/>
+            <a:off x="6969836" y="4111135"/>
+            <a:ext cx="1605959" cy="113665"/>
           </a:xfrm>
           <a:prstGeom prst="straightConnector1">
             <a:avLst/>
@@ -9920,8 +10486,8 @@
         </p:nvCxnSpPr>
         <p:spPr>
           <a:xfrm flipH="1">
-            <a:off x="7888422" y="3616478"/>
-            <a:ext cx="1256213" cy="163465"/>
+            <a:off x="4710223" y="3616478"/>
+            <a:ext cx="3816563" cy="178410"/>
           </a:xfrm>
           <a:prstGeom prst="straightConnector1">
             <a:avLst/>
@@ -9951,13 +10517,15 @@
       <p:cxnSp>
         <p:nvCxnSpPr>
           <p:cNvPr id="72" name="Straight Arrow Connector 71"/>
-          <p:cNvCxnSpPr/>
+          <p:cNvCxnSpPr>
+            <a:endCxn id="66" idx="3"/>
+          </p:cNvCxnSpPr>
           <p:nvPr/>
         </p:nvCxnSpPr>
         <p:spPr>
           <a:xfrm flipH="1">
-            <a:off x="6798961" y="4558450"/>
-            <a:ext cx="2393747" cy="19702"/>
+            <a:off x="7738057" y="4558450"/>
+            <a:ext cx="836802" cy="0"/>
           </a:xfrm>
           <a:prstGeom prst="straightConnector1">
             <a:avLst/>
@@ -9992,8 +10560,8 @@
         </p:nvCxnSpPr>
         <p:spPr>
           <a:xfrm flipH="1" flipV="1">
-            <a:off x="8270851" y="4996502"/>
-            <a:ext cx="893910" cy="177878"/>
+            <a:off x="5075116" y="4928771"/>
+            <a:ext cx="3471795" cy="245609"/>
           </a:xfrm>
           <a:prstGeom prst="straightConnector1">
             <a:avLst/>
@@ -10051,54 +10619,14 @@
                             </p:stCondLst>
                             <p:childTnLst>
                               <p:par>
-                                <p:cTn id="5" presetID="0" presetClass="path" presetSubtype="0" accel="50000" decel="50000" fill="hold" grpId="0" nodeType="clickEffect">
-                                  <p:stCondLst>
-                                    <p:cond delay="0"/>
-                                  </p:stCondLst>
-                                  <p:childTnLst>
-                                    <p:animMotion origin="layout" path="M -0.0362 -0.01967 L 0.51081 -0.02106 " pathEditMode="relative" rAng="0" ptsTypes="AA">
-                                      <p:cBhvr>
-                                        <p:cTn id="6" dur="1000" fill="hold"/>
-                                        <p:tgtEl>
-                                          <p:spTgt spid="9"/>
-                                        </p:tgtEl>
-                                        <p:attrNameLst>
-                                          <p:attrName>ppt_x</p:attrName>
-                                          <p:attrName>ppt_y</p:attrName>
-                                        </p:attrNameLst>
-                                      </p:cBhvr>
-                                      <p:rCtr x="27344" y="-69"/>
-                                    </p:animMotion>
-                                  </p:childTnLst>
-                                </p:cTn>
-                              </p:par>
-                            </p:childTnLst>
-                          </p:cTn>
-                        </p:par>
-                      </p:childTnLst>
-                    </p:cTn>
-                  </p:par>
-                  <p:par>
-                    <p:cTn id="7" fill="hold">
-                      <p:stCondLst>
-                        <p:cond delay="indefinite"/>
-                      </p:stCondLst>
-                      <p:childTnLst>
-                        <p:par>
-                          <p:cTn id="8" fill="hold">
-                            <p:stCondLst>
-                              <p:cond delay="0"/>
-                            </p:stCondLst>
-                            <p:childTnLst>
-                              <p:par>
-                                <p:cTn id="9" presetID="1" presetClass="entr" presetSubtype="0" fill="hold" grpId="0" nodeType="clickEffect">
+                                <p:cTn id="5" presetID="1" presetClass="entr" presetSubtype="0" fill="hold" grpId="0" nodeType="clickEffect">
                                   <p:stCondLst>
                                     <p:cond delay="0"/>
                                   </p:stCondLst>
                                   <p:childTnLst>
                                     <p:set>
                                       <p:cBhvr>
-                                        <p:cTn id="10" dur="1" fill="hold">
+                                        <p:cTn id="6" dur="1" fill="hold">
                                           <p:stCondLst>
                                             <p:cond delay="0"/>
                                           </p:stCondLst>
@@ -10118,14 +10646,14 @@
                                 </p:cTn>
                               </p:par>
                               <p:par>
-                                <p:cTn id="11" presetID="1" presetClass="entr" presetSubtype="0" fill="hold" nodeType="withEffect">
+                                <p:cTn id="7" presetID="1" presetClass="entr" presetSubtype="0" fill="hold" nodeType="withEffect">
                                   <p:stCondLst>
                                     <p:cond delay="0"/>
                                   </p:stCondLst>
                                   <p:childTnLst>
                                     <p:set>
                                       <p:cBhvr>
-                                        <p:cTn id="12" dur="1" fill="hold">
+                                        <p:cTn id="8" dur="1" fill="hold">
                                           <p:stCondLst>
                                             <p:cond delay="0"/>
                                           </p:stCondLst>
@@ -10145,20 +10673,20 @@
                                 </p:cTn>
                               </p:par>
                               <p:par>
-                                <p:cTn id="13" presetID="1" presetClass="entr" presetSubtype="0" fill="hold" grpId="0" nodeType="withEffect">
+                                <p:cTn id="9" presetID="1" presetClass="entr" presetSubtype="0" fill="hold" grpId="0" nodeType="withEffect">
                                   <p:stCondLst>
                                     <p:cond delay="0"/>
                                   </p:stCondLst>
                                   <p:childTnLst>
                                     <p:set>
                                       <p:cBhvr>
-                                        <p:cTn id="14" dur="1" fill="hold">
+                                        <p:cTn id="10" dur="1" fill="hold">
                                           <p:stCondLst>
                                             <p:cond delay="0"/>
                                           </p:stCondLst>
                                         </p:cTn>
                                         <p:tgtEl>
-                                          <p:spTgt spid="27"/>
+                                          <p:spTgt spid="64"/>
                                         </p:tgtEl>
                                         <p:attrNameLst>
                                           <p:attrName>style.visibility</p:attrName>
@@ -10178,53 +10706,26 @@
                     </p:cTn>
                   </p:par>
                   <p:par>
-                    <p:cTn id="15" fill="hold">
+                    <p:cTn id="11" fill="hold">
                       <p:stCondLst>
                         <p:cond delay="indefinite"/>
                       </p:stCondLst>
                       <p:childTnLst>
                         <p:par>
-                          <p:cTn id="16" fill="hold">
+                          <p:cTn id="12" fill="hold">
                             <p:stCondLst>
                               <p:cond delay="0"/>
                             </p:stCondLst>
                             <p:childTnLst>
                               <p:par>
-                                <p:cTn id="17" presetID="1" presetClass="exit" presetSubtype="0" fill="hold" grpId="1" nodeType="clickEffect">
+                                <p:cTn id="13" presetID="1" presetClass="exit" presetSubtype="0" fill="hold" nodeType="clickEffect">
                                   <p:stCondLst>
                                     <p:cond delay="0"/>
                                   </p:stCondLst>
                                   <p:childTnLst>
                                     <p:set>
                                       <p:cBhvr>
-                                        <p:cTn id="18" dur="1" fill="hold">
-                                          <p:stCondLst>
-                                            <p:cond delay="0"/>
-                                          </p:stCondLst>
-                                        </p:cTn>
-                                        <p:tgtEl>
-                                          <p:spTgt spid="41"/>
-                                        </p:tgtEl>
-                                        <p:attrNameLst>
-                                          <p:attrName>style.visibility</p:attrName>
-                                        </p:attrNameLst>
-                                      </p:cBhvr>
-                                      <p:to>
-                                        <p:strVal val="hidden"/>
-                                      </p:to>
-                                    </p:set>
-                                  </p:childTnLst>
-                                </p:cTn>
-                              </p:par>
-                              <p:par>
-                                <p:cTn id="19" presetID="1" presetClass="exit" presetSubtype="0" fill="hold" nodeType="withEffect">
-                                  <p:stCondLst>
-                                    <p:cond delay="0"/>
-                                  </p:stCondLst>
-                                  <p:childTnLst>
-                                    <p:set>
-                                      <p:cBhvr>
-                                        <p:cTn id="20" dur="1" fill="hold">
+                                        <p:cTn id="14" dur="1" fill="hold">
                                           <p:stCondLst>
                                             <p:cond delay="0"/>
                                           </p:stCondLst>
@@ -10244,20 +10745,20 @@
                                 </p:cTn>
                               </p:par>
                               <p:par>
-                                <p:cTn id="21" presetID="1" presetClass="entr" presetSubtype="0" fill="hold" grpId="0" nodeType="withEffect">
+                                <p:cTn id="15" presetID="1" presetClass="entr" presetSubtype="0" fill="hold" grpId="0" nodeType="withEffect">
                                   <p:stCondLst>
                                     <p:cond delay="0"/>
                                   </p:stCondLst>
                                   <p:childTnLst>
                                     <p:set>
                                       <p:cBhvr>
-                                        <p:cTn id="22" dur="1" fill="hold">
+                                        <p:cTn id="16" dur="1" fill="hold">
                                           <p:stCondLst>
                                             <p:cond delay="0"/>
                                           </p:stCondLst>
                                         </p:cTn>
                                         <p:tgtEl>
-                                          <p:spTgt spid="48"/>
+                                          <p:spTgt spid="31"/>
                                         </p:tgtEl>
                                         <p:attrNameLst>
                                           <p:attrName>style.visibility</p:attrName>
@@ -10271,7 +10772,79 @@
                                 </p:cTn>
                               </p:par>
                               <p:par>
-                                <p:cTn id="23" presetID="1" presetClass="entr" presetSubtype="0" fill="hold" nodeType="withEffect">
+                                <p:cTn id="17" presetID="1" presetClass="entr" presetSubtype="0" fill="hold" grpId="0" nodeType="withEffect">
+                                  <p:stCondLst>
+                                    <p:cond delay="0"/>
+                                  </p:stCondLst>
+                                  <p:childTnLst>
+                                    <p:set>
+                                      <p:cBhvr>
+                                        <p:cTn id="18" dur="1" fill="hold">
+                                          <p:stCondLst>
+                                            <p:cond delay="0"/>
+                                          </p:stCondLst>
+                                        </p:cTn>
+                                        <p:tgtEl>
+                                          <p:spTgt spid="44"/>
+                                        </p:tgtEl>
+                                        <p:attrNameLst>
+                                          <p:attrName>style.visibility</p:attrName>
+                                        </p:attrNameLst>
+                                      </p:cBhvr>
+                                      <p:to>
+                                        <p:strVal val="visible"/>
+                                      </p:to>
+                                    </p:set>
+                                  </p:childTnLst>
+                                </p:cTn>
+                              </p:par>
+                              <p:par>
+                                <p:cTn id="19" presetID="1" presetClass="entr" presetSubtype="0" fill="hold" nodeType="withEffect">
+                                  <p:stCondLst>
+                                    <p:cond delay="0"/>
+                                  </p:stCondLst>
+                                  <p:childTnLst>
+                                    <p:set>
+                                      <p:cBhvr>
+                                        <p:cTn id="20" dur="1" fill="hold">
+                                          <p:stCondLst>
+                                            <p:cond delay="0"/>
+                                          </p:stCondLst>
+                                        </p:cTn>
+                                        <p:tgtEl>
+                                          <p:spTgt spid="45"/>
+                                        </p:tgtEl>
+                                        <p:attrNameLst>
+                                          <p:attrName>style.visibility</p:attrName>
+                                        </p:attrNameLst>
+                                      </p:cBhvr>
+                                      <p:to>
+                                        <p:strVal val="visible"/>
+                                      </p:to>
+                                    </p:set>
+                                  </p:childTnLst>
+                                </p:cTn>
+                              </p:par>
+                            </p:childTnLst>
+                          </p:cTn>
+                        </p:par>
+                      </p:childTnLst>
+                    </p:cTn>
+                  </p:par>
+                  <p:par>
+                    <p:cTn id="21" fill="hold">
+                      <p:stCondLst>
+                        <p:cond delay="indefinite"/>
+                      </p:stCondLst>
+                      <p:childTnLst>
+                        <p:par>
+                          <p:cTn id="22" fill="hold">
+                            <p:stCondLst>
+                              <p:cond delay="0"/>
+                            </p:stCondLst>
+                            <p:childTnLst>
+                              <p:par>
+                                <p:cTn id="23" presetID="1" presetClass="exit" presetSubtype="0" fill="hold" nodeType="clickEffect">
                                   <p:stCondLst>
                                     <p:cond delay="0"/>
                                   </p:stCondLst>
@@ -10291,7 +10864,7 @@
                                         </p:attrNameLst>
                                       </p:cBhvr>
                                       <p:to>
-                                        <p:strVal val="visible"/>
+                                        <p:strVal val="hidden"/>
                                       </p:to>
                                     </p:set>
                                   </p:childTnLst>
@@ -10311,7 +10884,61 @@
                                           </p:stCondLst>
                                         </p:cTn>
                                         <p:tgtEl>
-                                          <p:spTgt spid="80"/>
+                                          <p:spTgt spid="32"/>
+                                        </p:tgtEl>
+                                        <p:attrNameLst>
+                                          <p:attrName>style.visibility</p:attrName>
+                                        </p:attrNameLst>
+                                      </p:cBhvr>
+                                      <p:to>
+                                        <p:strVal val="visible"/>
+                                      </p:to>
+                                    </p:set>
+                                  </p:childTnLst>
+                                </p:cTn>
+                              </p:par>
+                              <p:par>
+                                <p:cTn id="27" presetID="1" presetClass="entr" presetSubtype="0" fill="hold" grpId="0" nodeType="withEffect">
+                                  <p:stCondLst>
+                                    <p:cond delay="0"/>
+                                  </p:stCondLst>
+                                  <p:childTnLst>
+                                    <p:set>
+                                      <p:cBhvr>
+                                        <p:cTn id="28" dur="1" fill="hold">
+                                          <p:stCondLst>
+                                            <p:cond delay="0"/>
+                                          </p:stCondLst>
+                                        </p:cTn>
+                                        <p:tgtEl>
+                                          <p:spTgt spid="58"/>
+                                        </p:tgtEl>
+                                        <p:attrNameLst>
+                                          <p:attrName>style.visibility</p:attrName>
+                                        </p:attrNameLst>
+                                      </p:cBhvr>
+                                      <p:to>
+                                        <p:strVal val="visible"/>
+                                      </p:to>
+                                    </p:set>
+                                  </p:childTnLst>
+                                </p:cTn>
+                              </p:par>
+                              <p:par>
+                                <p:cTn id="29" presetID="1" presetClass="entr" presetSubtype="0" fill="hold" nodeType="withEffect">
+                                  <p:stCondLst>
+                                    <p:cond delay="0"/>
+                                  </p:stCondLst>
+                                  <p:childTnLst>
+                                    <p:set>
+                                      <p:cBhvr>
+                                        <p:cTn id="30" dur="1" fill="hold">
+                                          <p:stCondLst>
+                                            <p:cond delay="0"/>
+                                          </p:stCondLst>
+                                        </p:cTn>
+                                        <p:tgtEl>
+                                          <p:spTgt spid="63"/>
                                         </p:tgtEl>
                                         <p:attrNameLst>
                                           <p:attrName>style.visibility</p:attrName>
@@ -10331,32 +10958,32 @@
                     </p:cTn>
                   </p:par>
                   <p:par>
-                    <p:cTn id="27" fill="hold">
+                    <p:cTn id="31" fill="hold">
                       <p:stCondLst>
                         <p:cond delay="indefinite"/>
                       </p:stCondLst>
                       <p:childTnLst>
                         <p:par>
-                          <p:cTn id="28" fill="hold">
+                          <p:cTn id="32" fill="hold">
                             <p:stCondLst>
                               <p:cond delay="0"/>
                             </p:stCondLst>
                             <p:childTnLst>
                               <p:par>
-                                <p:cTn id="29" presetID="1" presetClass="exit" presetSubtype="0" fill="hold" grpId="1" nodeType="clickEffect">
+                                <p:cTn id="33" presetID="1" presetClass="exit" presetSubtype="0" fill="hold" nodeType="clickEffect">
                                   <p:stCondLst>
                                     <p:cond delay="0"/>
                                   </p:stCondLst>
                                   <p:childTnLst>
                                     <p:set>
                                       <p:cBhvr>
-                                        <p:cTn id="30" dur="1" fill="hold">
+                                        <p:cTn id="34" dur="1" fill="hold">
                                           <p:stCondLst>
                                             <p:cond delay="0"/>
                                           </p:stCondLst>
                                         </p:cTn>
                                         <p:tgtEl>
-                                          <p:spTgt spid="48"/>
+                                          <p:spTgt spid="63"/>
                                         </p:tgtEl>
                                         <p:attrNameLst>
                                           <p:attrName>style.visibility</p:attrName>
@@ -10370,61 +10997,7 @@
                                 </p:cTn>
                               </p:par>
                               <p:par>
-                                <p:cTn id="31" presetID="1" presetClass="exit" presetSubtype="0" fill="hold" nodeType="withEffect">
-                                  <p:stCondLst>
-                                    <p:cond delay="0"/>
-                                  </p:stCondLst>
-                                  <p:childTnLst>
-                                    <p:set>
-                                      <p:cBhvr>
-                                        <p:cTn id="32" dur="1" fill="hold">
-                                          <p:stCondLst>
-                                            <p:cond delay="0"/>
-                                          </p:stCondLst>
-                                        </p:cTn>
-                                        <p:tgtEl>
-                                          <p:spTgt spid="45"/>
-                                        </p:tgtEl>
-                                        <p:attrNameLst>
-                                          <p:attrName>style.visibility</p:attrName>
-                                        </p:attrNameLst>
-                                      </p:cBhvr>
-                                      <p:to>
-                                        <p:strVal val="hidden"/>
-                                      </p:to>
-                                    </p:set>
-                                  </p:childTnLst>
-                                </p:cTn>
-                              </p:par>
-                              <p:par>
-                                <p:cTn id="33" presetID="1" presetClass="entr" presetSubtype="0" fill="hold" grpId="0" nodeType="withEffect">
-                                  <p:stCondLst>
-                                    <p:cond delay="0"/>
-                                  </p:stCondLst>
-                                  <p:childTnLst>
-                                    <p:set>
-                                      <p:cBhvr>
-                                        <p:cTn id="34" dur="1" fill="hold">
-                                          <p:stCondLst>
-                                            <p:cond delay="0"/>
-                                          </p:stCondLst>
-                                        </p:cTn>
-                                        <p:tgtEl>
-                                          <p:spTgt spid="58"/>
-                                        </p:tgtEl>
-                                        <p:attrNameLst>
-                                          <p:attrName>style.visibility</p:attrName>
-                                        </p:attrNameLst>
-                                      </p:cBhvr>
-                                      <p:to>
-                                        <p:strVal val="visible"/>
-                                      </p:to>
-                                    </p:set>
-                                  </p:childTnLst>
-                                </p:cTn>
-                              </p:par>
-                              <p:par>
-                                <p:cTn id="35" presetID="1" presetClass="entr" presetSubtype="0" fill="hold" nodeType="withEffect">
+                                <p:cTn id="35" presetID="1" presetClass="entr" presetSubtype="0" fill="hold" grpId="0" nodeType="withEffect">
                                   <p:stCondLst>
                                     <p:cond delay="0"/>
                                   </p:stCondLst>
@@ -10437,7 +11010,7 @@
                                           </p:stCondLst>
                                         </p:cTn>
                                         <p:tgtEl>
-                                          <p:spTgt spid="63"/>
+                                          <p:spTgt spid="59"/>
                                         </p:tgtEl>
                                         <p:attrNameLst>
                                           <p:attrName>style.visibility</p:attrName>
@@ -10464,7 +11037,61 @@
                                           </p:stCondLst>
                                         </p:cTn>
                                         <p:tgtEl>
-                                          <p:spTgt spid="82"/>
+                                          <p:spTgt spid="69"/>
+                                        </p:tgtEl>
+                                        <p:attrNameLst>
+                                          <p:attrName>style.visibility</p:attrName>
+                                        </p:attrNameLst>
+                                      </p:cBhvr>
+                                      <p:to>
+                                        <p:strVal val="visible"/>
+                                      </p:to>
+                                    </p:set>
+                                  </p:childTnLst>
+                                </p:cTn>
+                              </p:par>
+                              <p:par>
+                                <p:cTn id="39" presetID="1" presetClass="entr" presetSubtype="0" fill="hold" grpId="0" nodeType="withEffect">
+                                  <p:stCondLst>
+                                    <p:cond delay="0"/>
+                                  </p:stCondLst>
+                                  <p:childTnLst>
+                                    <p:set>
+                                      <p:cBhvr>
+                                        <p:cTn id="40" dur="1" fill="hold">
+                                          <p:stCondLst>
+                                            <p:cond delay="0"/>
+                                          </p:stCondLst>
+                                        </p:cTn>
+                                        <p:tgtEl>
+                                          <p:spTgt spid="57"/>
+                                        </p:tgtEl>
+                                        <p:attrNameLst>
+                                          <p:attrName>style.visibility</p:attrName>
+                                        </p:attrNameLst>
+                                      </p:cBhvr>
+                                      <p:to>
+                                        <p:strVal val="visible"/>
+                                      </p:to>
+                                    </p:set>
+                                  </p:childTnLst>
+                                </p:cTn>
+                              </p:par>
+                              <p:par>
+                                <p:cTn id="41" presetID="1" presetClass="entr" presetSubtype="0" fill="hold" nodeType="withEffect">
+                                  <p:stCondLst>
+                                    <p:cond delay="0"/>
+                                  </p:stCondLst>
+                                  <p:childTnLst>
+                                    <p:set>
+                                      <p:cBhvr>
+                                        <p:cTn id="42" dur="1" fill="hold">
+                                          <p:stCondLst>
+                                            <p:cond delay="0"/>
+                                          </p:stCondLst>
+                                        </p:cTn>
+                                        <p:tgtEl>
+                                          <p:spTgt spid="72"/>
                                         </p:tgtEl>
                                         <p:attrNameLst>
                                           <p:attrName>style.visibility</p:attrName>
@@ -10484,73 +11111,19 @@
                     </p:cTn>
                   </p:par>
                   <p:par>
-                    <p:cTn id="39" fill="hold">
+                    <p:cTn id="43" fill="hold">
                       <p:stCondLst>
                         <p:cond delay="indefinite"/>
                       </p:stCondLst>
                       <p:childTnLst>
                         <p:par>
-                          <p:cTn id="40" fill="hold">
+                          <p:cTn id="44" fill="hold">
                             <p:stCondLst>
                               <p:cond delay="0"/>
                             </p:stCondLst>
                             <p:childTnLst>
                               <p:par>
-                                <p:cTn id="41" presetID="1" presetClass="exit" presetSubtype="0" fill="hold" grpId="1" nodeType="clickEffect">
-                                  <p:stCondLst>
-                                    <p:cond delay="0"/>
-                                  </p:stCondLst>
-                                  <p:childTnLst>
-                                    <p:set>
-                                      <p:cBhvr>
-                                        <p:cTn id="42" dur="1" fill="hold">
-                                          <p:stCondLst>
-                                            <p:cond delay="0"/>
-                                          </p:stCondLst>
-                                        </p:cTn>
-                                        <p:tgtEl>
-                                          <p:spTgt spid="58"/>
-                                        </p:tgtEl>
-                                        <p:attrNameLst>
-                                          <p:attrName>style.visibility</p:attrName>
-                                        </p:attrNameLst>
-                                      </p:cBhvr>
-                                      <p:to>
-                                        <p:strVal val="hidden"/>
-                                      </p:to>
-                                    </p:set>
-                                  </p:childTnLst>
-                                </p:cTn>
-                              </p:par>
-                              <p:par>
-                                <p:cTn id="43" presetID="1" presetClass="exit" presetSubtype="0" fill="hold" nodeType="withEffect">
-                                  <p:stCondLst>
-                                    <p:cond delay="0"/>
-                                  </p:stCondLst>
-                                  <p:childTnLst>
-                                    <p:set>
-                                      <p:cBhvr>
-                                        <p:cTn id="44" dur="1" fill="hold">
-                                          <p:stCondLst>
-                                            <p:cond delay="0"/>
-                                          </p:stCondLst>
-                                        </p:cTn>
-                                        <p:tgtEl>
-                                          <p:spTgt spid="63"/>
-                                        </p:tgtEl>
-                                        <p:attrNameLst>
-                                          <p:attrName>style.visibility</p:attrName>
-                                        </p:attrNameLst>
-                                      </p:cBhvr>
-                                      <p:to>
-                                        <p:strVal val="hidden"/>
-                                      </p:to>
-                                    </p:set>
-                                  </p:childTnLst>
-                                </p:cTn>
-                              </p:par>
-                              <p:par>
-                                <p:cTn id="45" presetID="1" presetClass="entr" presetSubtype="0" fill="hold" grpId="0" nodeType="withEffect">
+                                <p:cTn id="45" presetID="1" presetClass="exit" presetSubtype="0" fill="hold" nodeType="clickEffect">
                                   <p:stCondLst>
                                     <p:cond delay="0"/>
                                   </p:stCondLst>
@@ -10558,132 +11131,6 @@
                                     <p:set>
                                       <p:cBhvr>
                                         <p:cTn id="46" dur="1" fill="hold">
-                                          <p:stCondLst>
-                                            <p:cond delay="0"/>
-                                          </p:stCondLst>
-                                        </p:cTn>
-                                        <p:tgtEl>
-                                          <p:spTgt spid="69"/>
-                                        </p:tgtEl>
-                                        <p:attrNameLst>
-                                          <p:attrName>style.visibility</p:attrName>
-                                        </p:attrNameLst>
-                                      </p:cBhvr>
-                                      <p:to>
-                                        <p:strVal val="visible"/>
-                                      </p:to>
-                                    </p:set>
-                                  </p:childTnLst>
-                                </p:cTn>
-                              </p:par>
-                              <p:par>
-                                <p:cTn id="47" presetID="1" presetClass="entr" presetSubtype="0" fill="hold" nodeType="withEffect">
-                                  <p:stCondLst>
-                                    <p:cond delay="0"/>
-                                  </p:stCondLst>
-                                  <p:childTnLst>
-                                    <p:set>
-                                      <p:cBhvr>
-                                        <p:cTn id="48" dur="1" fill="hold">
-                                          <p:stCondLst>
-                                            <p:cond delay="0"/>
-                                          </p:stCondLst>
-                                        </p:cTn>
-                                        <p:tgtEl>
-                                          <p:spTgt spid="72"/>
-                                        </p:tgtEl>
-                                        <p:attrNameLst>
-                                          <p:attrName>style.visibility</p:attrName>
-                                        </p:attrNameLst>
-                                      </p:cBhvr>
-                                      <p:to>
-                                        <p:strVal val="visible"/>
-                                      </p:to>
-                                    </p:set>
-                                  </p:childTnLst>
-                                </p:cTn>
-                              </p:par>
-                              <p:par>
-                                <p:cTn id="49" presetID="1" presetClass="entr" presetSubtype="0" fill="hold" grpId="0" nodeType="withEffect">
-                                  <p:stCondLst>
-                                    <p:cond delay="0"/>
-                                  </p:stCondLst>
-                                  <p:childTnLst>
-                                    <p:set>
-                                      <p:cBhvr>
-                                        <p:cTn id="50" dur="1" fill="hold">
-                                          <p:stCondLst>
-                                            <p:cond delay="0"/>
-                                          </p:stCondLst>
-                                        </p:cTn>
-                                        <p:tgtEl>
-                                          <p:spTgt spid="88"/>
-                                        </p:tgtEl>
-                                        <p:attrNameLst>
-                                          <p:attrName>style.visibility</p:attrName>
-                                        </p:attrNameLst>
-                                      </p:cBhvr>
-                                      <p:to>
-                                        <p:strVal val="visible"/>
-                                      </p:to>
-                                    </p:set>
-                                  </p:childTnLst>
-                                </p:cTn>
-                              </p:par>
-                            </p:childTnLst>
-                          </p:cTn>
-                        </p:par>
-                      </p:childTnLst>
-                    </p:cTn>
-                  </p:par>
-                  <p:par>
-                    <p:cTn id="51" fill="hold">
-                      <p:stCondLst>
-                        <p:cond delay="indefinite"/>
-                      </p:stCondLst>
-                      <p:childTnLst>
-                        <p:par>
-                          <p:cTn id="52" fill="hold">
-                            <p:stCondLst>
-                              <p:cond delay="0"/>
-                            </p:stCondLst>
-                            <p:childTnLst>
-                              <p:par>
-                                <p:cTn id="53" presetID="1" presetClass="exit" presetSubtype="0" fill="hold" grpId="1" nodeType="clickEffect">
-                                  <p:stCondLst>
-                                    <p:cond delay="0"/>
-                                  </p:stCondLst>
-                                  <p:childTnLst>
-                                    <p:set>
-                                      <p:cBhvr>
-                                        <p:cTn id="54" dur="1" fill="hold">
-                                          <p:stCondLst>
-                                            <p:cond delay="0"/>
-                                          </p:stCondLst>
-                                        </p:cTn>
-                                        <p:tgtEl>
-                                          <p:spTgt spid="69"/>
-                                        </p:tgtEl>
-                                        <p:attrNameLst>
-                                          <p:attrName>style.visibility</p:attrName>
-                                        </p:attrNameLst>
-                                      </p:cBhvr>
-                                      <p:to>
-                                        <p:strVal val="hidden"/>
-                                      </p:to>
-                                    </p:set>
-                                  </p:childTnLst>
-                                </p:cTn>
-                              </p:par>
-                              <p:par>
-                                <p:cTn id="55" presetID="1" presetClass="exit" presetSubtype="0" fill="hold" nodeType="withEffect">
-                                  <p:stCondLst>
-                                    <p:cond delay="0"/>
-                                  </p:stCondLst>
-                                  <p:childTnLst>
-                                    <p:set>
-                                      <p:cBhvr>
-                                        <p:cTn id="56" dur="1" fill="hold">
                                           <p:stCondLst>
                                             <p:cond delay="0"/>
                                           </p:stCondLst>
@@ -10703,14 +11150,14 @@
                                 </p:cTn>
                               </p:par>
                               <p:par>
-                                <p:cTn id="57" presetID="1" presetClass="entr" presetSubtype="0" fill="hold" grpId="0" nodeType="withEffect">
+                                <p:cTn id="47" presetID="1" presetClass="entr" presetSubtype="0" fill="hold" grpId="0" nodeType="withEffect">
                                   <p:stCondLst>
                                     <p:cond delay="0"/>
                                   </p:stCondLst>
                                   <p:childTnLst>
                                     <p:set>
                                       <p:cBhvr>
-                                        <p:cTn id="58" dur="1" fill="hold">
+                                        <p:cTn id="48" dur="1" fill="hold">
                                           <p:stCondLst>
                                             <p:cond delay="0"/>
                                           </p:stCondLst>
@@ -10730,14 +11177,14 @@
                                 </p:cTn>
                               </p:par>
                               <p:par>
-                                <p:cTn id="59" presetID="1" presetClass="entr" presetSubtype="0" fill="hold" nodeType="withEffect">
+                                <p:cTn id="49" presetID="1" presetClass="entr" presetSubtype="0" fill="hold" nodeType="withEffect">
                                   <p:stCondLst>
                                     <p:cond delay="0"/>
                                   </p:stCondLst>
                                   <p:childTnLst>
                                     <p:set>
                                       <p:cBhvr>
-                                        <p:cTn id="60" dur="1" fill="hold">
+                                        <p:cTn id="50" dur="1" fill="hold">
                                           <p:stCondLst>
                                             <p:cond delay="0"/>
                                           </p:stCondLst>
@@ -10757,20 +11204,20 @@
                                 </p:cTn>
                               </p:par>
                               <p:par>
-                                <p:cTn id="61" presetID="1" presetClass="entr" presetSubtype="0" fill="hold" grpId="0" nodeType="withEffect">
+                                <p:cTn id="51" presetID="1" presetClass="entr" presetSubtype="0" fill="hold" grpId="0" nodeType="withEffect">
                                   <p:stCondLst>
                                     <p:cond delay="0"/>
                                   </p:stCondLst>
                                   <p:childTnLst>
                                     <p:set>
                                       <p:cBhvr>
-                                        <p:cTn id="62" dur="1" fill="hold">
+                                        <p:cTn id="52" dur="1" fill="hold">
                                           <p:stCondLst>
                                             <p:cond delay="0"/>
                                           </p:stCondLst>
                                         </p:cTn>
                                         <p:tgtEl>
-                                          <p:spTgt spid="89"/>
+                                          <p:spTgt spid="33"/>
                                         </p:tgtEl>
                                         <p:attrNameLst>
                                           <p:attrName>style.visibility</p:attrName>
@@ -10778,51 +11225,6 @@
                                       </p:cBhvr>
                                       <p:to>
                                         <p:strVal val="visible"/>
-                                      </p:to>
-                                    </p:set>
-                                  </p:childTnLst>
-                                </p:cTn>
-                              </p:par>
-                            </p:childTnLst>
-                          </p:cTn>
-                        </p:par>
-                      </p:childTnLst>
-                    </p:cTn>
-                  </p:par>
-                  <p:par>
-                    <p:cTn id="63" fill="hold">
-                      <p:stCondLst>
-                        <p:cond delay="indefinite"/>
-                      </p:stCondLst>
-                      <p:childTnLst>
-                        <p:par>
-                          <p:cTn id="64" fill="hold">
-                            <p:stCondLst>
-                              <p:cond delay="0"/>
-                            </p:stCondLst>
-                            <p:childTnLst>
-                              <p:par>
-                                <p:cTn id="65" presetID="1" presetClass="exit" presetSubtype="0" fill="hold" grpId="1" nodeType="clickEffect">
-                                  <p:stCondLst>
-                                    <p:cond delay="0"/>
-                                  </p:stCondLst>
-                                  <p:childTnLst>
-                                    <p:set>
-                                      <p:cBhvr>
-                                        <p:cTn id="66" dur="1" fill="hold">
-                                          <p:stCondLst>
-                                            <p:cond delay="0"/>
-                                          </p:stCondLst>
-                                        </p:cTn>
-                                        <p:tgtEl>
-                                          <p:spTgt spid="71"/>
-                                        </p:tgtEl>
-                                        <p:attrNameLst>
-                                          <p:attrName>style.visibility</p:attrName>
-                                        </p:attrNameLst>
-                                      </p:cBhvr>
-                                      <p:to>
-                                        <p:strVal val="hidden"/>
                                       </p:to>
                                     </p:set>
                                   </p:childTnLst>
@@ -10856,22 +11258,17 @@
       </p:par>
     </p:tnLst>
     <p:bldLst>
-      <p:bldP spid="27" grpId="0" animBg="1"/>
       <p:bldP spid="41" grpId="0"/>
-      <p:bldP spid="41" grpId="1"/>
-      <p:bldP spid="9" grpId="0"/>
-      <p:bldP spid="48" grpId="0"/>
-      <p:bldP spid="48" grpId="1"/>
       <p:bldP spid="58" grpId="0"/>
-      <p:bldP spid="58" grpId="1"/>
       <p:bldP spid="69" grpId="0"/>
-      <p:bldP spid="69" grpId="1"/>
       <p:bldP spid="71" grpId="0"/>
-      <p:bldP spid="71" grpId="1"/>
-      <p:bldP spid="80" grpId="0" animBg="1"/>
-      <p:bldP spid="82" grpId="0" animBg="1"/>
-      <p:bldP spid="88" grpId="0" animBg="1"/>
-      <p:bldP spid="89" grpId="0" animBg="1"/>
+      <p:bldP spid="44" grpId="0"/>
+      <p:bldP spid="57" grpId="0"/>
+      <p:bldP spid="59" grpId="0" animBg="1"/>
+      <p:bldP spid="64" grpId="0" animBg="1"/>
+      <p:bldP spid="31" grpId="0" animBg="1"/>
+      <p:bldP spid="32" grpId="0" animBg="1"/>
+      <p:bldP spid="33" grpId="0" animBg="1"/>
     </p:bldLst>
   </p:timing>
 </p:sld>

</xml_diff>

<commit_message>
some fixes on the writeup and finished section 3-4 slides
</commit_message>
<xml_diff>
--- a/count_min_sketch_talk.pptx
+++ b/count_min_sketch_talk.pptx
@@ -5,7 +5,7 @@
     <p:sldMasterId id="2147483660" r:id="rId1"/>
   </p:sldMasterIdLst>
   <p:notesMasterIdLst>
-    <p:notesMasterId r:id="rId10"/>
+    <p:notesMasterId r:id="rId18"/>
   </p:notesMasterIdLst>
   <p:sldIdLst>
     <p:sldId id="256" r:id="rId2"/>
@@ -16,6 +16,14 @@
     <p:sldId id="263" r:id="rId7"/>
     <p:sldId id="260" r:id="rId8"/>
     <p:sldId id="261" r:id="rId9"/>
+    <p:sldId id="265" r:id="rId10"/>
+    <p:sldId id="267" r:id="rId11"/>
+    <p:sldId id="268" r:id="rId12"/>
+    <p:sldId id="270" r:id="rId13"/>
+    <p:sldId id="271" r:id="rId14"/>
+    <p:sldId id="272" r:id="rId15"/>
+    <p:sldId id="273" r:id="rId16"/>
+    <p:sldId id="274" r:id="rId17"/>
   </p:sldIdLst>
   <p:sldSz cx="12192000" cy="6858000"/>
   <p:notesSz cx="6858000" cy="9144000"/>
@@ -204,7 +212,7 @@
           <a:p>
             <a:fld id="{58895B02-70E6-674C-BD1F-6A7F778A89D9}" type="datetimeFigureOut">
               <a:rPr lang="en-US" smtClean="0"/>
-              <a:t>12/11/16</a:t>
+              <a:t>12/13/16</a:t>
             </a:fld>
             <a:endParaRPr lang="en-US"/>
           </a:p>
@@ -1034,7 +1042,7 @@
           <a:p>
             <a:fld id="{C03047AA-ACB6-D34A-9274-C4E96F83774F}" type="datetimeFigureOut">
               <a:rPr lang="en-US" smtClean="0"/>
-              <a:t>12/11/16</a:t>
+              <a:t>12/13/16</a:t>
             </a:fld>
             <a:endParaRPr lang="en-US"/>
           </a:p>
@@ -1242,7 +1250,7 @@
           <a:p>
             <a:fld id="{C03047AA-ACB6-D34A-9274-C4E96F83774F}" type="datetimeFigureOut">
               <a:rPr lang="en-US" smtClean="0"/>
-              <a:t>12/11/16</a:t>
+              <a:t>12/13/16</a:t>
             </a:fld>
             <a:endParaRPr lang="en-US"/>
           </a:p>
@@ -1498,7 +1506,7 @@
           <a:p>
             <a:fld id="{C03047AA-ACB6-D34A-9274-C4E96F83774F}" type="datetimeFigureOut">
               <a:rPr lang="en-US" smtClean="0"/>
-              <a:t>12/11/16</a:t>
+              <a:t>12/13/16</a:t>
             </a:fld>
             <a:endParaRPr lang="en-US"/>
           </a:p>
@@ -1672,7 +1680,7 @@
           <a:p>
             <a:fld id="{C03047AA-ACB6-D34A-9274-C4E96F83774F}" type="datetimeFigureOut">
               <a:rPr lang="en-US" smtClean="0"/>
-              <a:t>12/11/16</a:t>
+              <a:t>12/13/16</a:t>
             </a:fld>
             <a:endParaRPr lang="en-US"/>
           </a:p>
@@ -2015,7 +2023,7 @@
           <a:p>
             <a:fld id="{C03047AA-ACB6-D34A-9274-C4E96F83774F}" type="datetimeFigureOut">
               <a:rPr lang="en-US" smtClean="0"/>
-              <a:t>12/11/16</a:t>
+              <a:t>12/13/16</a:t>
             </a:fld>
             <a:endParaRPr lang="en-US"/>
           </a:p>
@@ -2290,7 +2298,7 @@
           <a:p>
             <a:fld id="{C03047AA-ACB6-D34A-9274-C4E96F83774F}" type="datetimeFigureOut">
               <a:rPr lang="en-US" smtClean="0"/>
-              <a:t>12/11/16</a:t>
+              <a:t>12/13/16</a:t>
             </a:fld>
             <a:endParaRPr lang="en-US"/>
           </a:p>
@@ -2669,7 +2677,7 @@
           <a:p>
             <a:fld id="{C03047AA-ACB6-D34A-9274-C4E96F83774F}" type="datetimeFigureOut">
               <a:rPr lang="en-US" smtClean="0"/>
-              <a:t>12/11/16</a:t>
+              <a:t>12/13/16</a:t>
             </a:fld>
             <a:endParaRPr lang="en-US"/>
           </a:p>
@@ -2787,7 +2795,7 @@
           <a:p>
             <a:fld id="{C03047AA-ACB6-D34A-9274-C4E96F83774F}" type="datetimeFigureOut">
               <a:rPr lang="en-US" smtClean="0"/>
-              <a:t>12/11/16</a:t>
+              <a:t>12/13/16</a:t>
             </a:fld>
             <a:endParaRPr lang="en-US"/>
           </a:p>
@@ -2958,7 +2966,7 @@
           <a:p>
             <a:fld id="{C03047AA-ACB6-D34A-9274-C4E96F83774F}" type="datetimeFigureOut">
               <a:rPr lang="en-US" smtClean="0"/>
-              <a:t>12/11/16</a:t>
+              <a:t>12/13/16</a:t>
             </a:fld>
             <a:endParaRPr lang="en-US"/>
           </a:p>
@@ -3312,7 +3320,7 @@
           <a:p>
             <a:fld id="{C03047AA-ACB6-D34A-9274-C4E96F83774F}" type="datetimeFigureOut">
               <a:rPr lang="en-US" smtClean="0"/>
-              <a:t>12/11/16</a:t>
+              <a:t>12/13/16</a:t>
             </a:fld>
             <a:endParaRPr lang="en-US"/>
           </a:p>
@@ -3694,7 +3702,7 @@
           <a:p>
             <a:fld id="{C03047AA-ACB6-D34A-9274-C4E96F83774F}" type="datetimeFigureOut">
               <a:rPr lang="en-US" smtClean="0"/>
-              <a:t>12/11/16</a:t>
+              <a:t>12/13/16</a:t>
             </a:fld>
             <a:endParaRPr lang="en-US"/>
           </a:p>
@@ -3981,7 +3989,7 @@
           <a:p>
             <a:fld id="{C03047AA-ACB6-D34A-9274-C4E96F83774F}" type="datetimeFigureOut">
               <a:rPr lang="en-US" smtClean="0"/>
-              <a:t>12/11/16</a:t>
+              <a:t>12/13/16</a:t>
             </a:fld>
             <a:endParaRPr lang="en-US"/>
           </a:p>
@@ -4563,6 +4571,3626 @@
 </p:sld>
 </file>
 
+<file path=ppt/slides/slide10.xml><?xml version="1.0" encoding="utf-8"?>
+<p:sld xmlns:a="http://schemas.openxmlformats.org/drawingml/2006/main" xmlns:r="http://schemas.openxmlformats.org/officeDocument/2006/relationships" xmlns:p="http://schemas.openxmlformats.org/presentationml/2006/main">
+  <p:cSld>
+    <p:spTree>
+      <p:nvGrpSpPr>
+        <p:cNvPr id="1" name=""/>
+        <p:cNvGrpSpPr/>
+        <p:nvPr/>
+      </p:nvGrpSpPr>
+      <p:grpSpPr>
+        <a:xfrm>
+          <a:off x="0" y="0"/>
+          <a:ext cx="0" cy="0"/>
+          <a:chOff x="0" y="0"/>
+          <a:chExt cx="0" cy="0"/>
+        </a:xfrm>
+      </p:grpSpPr>
+      <p:pic>
+        <p:nvPicPr>
+          <p:cNvPr id="12" name="Picture 11"/>
+          <p:cNvPicPr>
+            <a:picLocks noChangeAspect="1"/>
+          </p:cNvPicPr>
+          <p:nvPr/>
+        </p:nvPicPr>
+        <p:blipFill>
+          <a:blip r:embed="rId2">
+            <a:extLst>
+              <a:ext uri="{28A0092B-C50C-407E-A947-70E740481C1C}">
+                <a14:useLocalDpi xmlns:a14="http://schemas.microsoft.com/office/drawing/2010/main" val="0"/>
+              </a:ext>
+            </a:extLst>
+          </a:blip>
+          <a:stretch>
+            <a:fillRect/>
+          </a:stretch>
+        </p:blipFill>
+        <p:spPr>
+          <a:xfrm>
+            <a:off x="1910080" y="2434107"/>
+            <a:ext cx="7346188" cy="1465828"/>
+          </a:xfrm>
+          <a:prstGeom prst="rect">
+            <a:avLst/>
+          </a:prstGeom>
+        </p:spPr>
+      </p:pic>
+      <p:sp>
+        <p:nvSpPr>
+          <p:cNvPr id="2" name="Title 1"/>
+          <p:cNvSpPr>
+            <a:spLocks noGrp="1"/>
+          </p:cNvSpPr>
+          <p:nvPr>
+            <p:ph type="title"/>
+          </p:nvPr>
+        </p:nvSpPr>
+        <p:spPr/>
+        <p:txBody>
+          <a:bodyPr/>
+          <a:lstStyle/>
+          <a:p>
+            <a:r>
+              <a:rPr lang="en-US" dirty="0" smtClean="0"/>
+              <a:t>Point Queries Error Bounds</a:t>
+            </a:r>
+            <a:endParaRPr lang="en-US" dirty="0"/>
+          </a:p>
+        </p:txBody>
+      </p:sp>
+      <p:pic>
+        <p:nvPicPr>
+          <p:cNvPr id="3" name="Picture 2"/>
+          <p:cNvPicPr>
+            <a:picLocks noChangeAspect="1"/>
+          </p:cNvPicPr>
+          <p:nvPr/>
+        </p:nvPicPr>
+        <p:blipFill>
+          <a:blip r:embed="rId3">
+            <a:extLst>
+              <a:ext uri="{28A0092B-C50C-407E-A947-70E740481C1C}">
+                <a14:useLocalDpi xmlns:a14="http://schemas.microsoft.com/office/drawing/2010/main" val="0"/>
+              </a:ext>
+            </a:extLst>
+          </a:blip>
+          <a:stretch>
+            <a:fillRect/>
+          </a:stretch>
+        </p:blipFill>
+        <p:spPr>
+          <a:xfrm>
+            <a:off x="1292013" y="1979578"/>
+            <a:ext cx="1548723" cy="630961"/>
+          </a:xfrm>
+          <a:prstGeom prst="rect">
+            <a:avLst/>
+          </a:prstGeom>
+          <a:ln w="38100">
+            <a:solidFill>
+              <a:srgbClr val="0070C0"/>
+            </a:solidFill>
+            <a:prstDash val="dash"/>
+          </a:ln>
+        </p:spPr>
+      </p:pic>
+      <p:pic>
+        <p:nvPicPr>
+          <p:cNvPr id="6" name="Picture 5"/>
+          <p:cNvPicPr>
+            <a:picLocks noChangeAspect="1"/>
+          </p:cNvPicPr>
+          <p:nvPr/>
+        </p:nvPicPr>
+        <p:blipFill>
+          <a:blip r:embed="rId4">
+            <a:extLst>
+              <a:ext uri="{28A0092B-C50C-407E-A947-70E740481C1C}">
+                <a14:useLocalDpi xmlns:a14="http://schemas.microsoft.com/office/drawing/2010/main" val="0"/>
+              </a:ext>
+            </a:extLst>
+          </a:blip>
+          <a:stretch>
+            <a:fillRect/>
+          </a:stretch>
+        </p:blipFill>
+        <p:spPr>
+          <a:xfrm>
+            <a:off x="3861392" y="5189331"/>
+            <a:ext cx="3161708" cy="873179"/>
+          </a:xfrm>
+          <a:prstGeom prst="rect">
+            <a:avLst/>
+          </a:prstGeom>
+        </p:spPr>
+      </p:pic>
+      <p:pic>
+        <p:nvPicPr>
+          <p:cNvPr id="7" name="Picture 6"/>
+          <p:cNvPicPr>
+            <a:picLocks noChangeAspect="1"/>
+          </p:cNvPicPr>
+          <p:nvPr/>
+        </p:nvPicPr>
+        <p:blipFill>
+          <a:blip r:embed="rId5">
+            <a:extLst>
+              <a:ext uri="{28A0092B-C50C-407E-A947-70E740481C1C}">
+                <a14:useLocalDpi xmlns:a14="http://schemas.microsoft.com/office/drawing/2010/main" val="0"/>
+              </a:ext>
+            </a:extLst>
+          </a:blip>
+          <a:stretch>
+            <a:fillRect/>
+          </a:stretch>
+        </p:blipFill>
+        <p:spPr>
+          <a:xfrm>
+            <a:off x="1910080" y="3899935"/>
+            <a:ext cx="8449056" cy="1114845"/>
+          </a:xfrm>
+          <a:prstGeom prst="rect">
+            <a:avLst/>
+          </a:prstGeom>
+        </p:spPr>
+      </p:pic>
+    </p:spTree>
+    <p:extLst>
+      <p:ext uri="{BB962C8B-B14F-4D97-AF65-F5344CB8AC3E}">
+        <p14:creationId xmlns:p14="http://schemas.microsoft.com/office/powerpoint/2010/main" val="1106908272"/>
+      </p:ext>
+    </p:extLst>
+  </p:cSld>
+  <p:clrMapOvr>
+    <a:masterClrMapping/>
+  </p:clrMapOvr>
+  <p:timing>
+    <p:tnLst>
+      <p:par>
+        <p:cTn id="1" dur="indefinite" restart="never" nodeType="tmRoot">
+          <p:childTnLst>
+            <p:seq concurrent="1" nextAc="seek">
+              <p:cTn id="2" dur="indefinite" nodeType="mainSeq">
+                <p:childTnLst>
+                  <p:par>
+                    <p:cTn id="3" fill="hold">
+                      <p:stCondLst>
+                        <p:cond delay="indefinite"/>
+                      </p:stCondLst>
+                      <p:childTnLst>
+                        <p:par>
+                          <p:cTn id="4" fill="hold">
+                            <p:stCondLst>
+                              <p:cond delay="0"/>
+                            </p:stCondLst>
+                            <p:childTnLst>
+                              <p:par>
+                                <p:cTn id="5" presetID="1" presetClass="entr" presetSubtype="0" fill="hold" nodeType="clickEffect">
+                                  <p:stCondLst>
+                                    <p:cond delay="0"/>
+                                  </p:stCondLst>
+                                  <p:childTnLst>
+                                    <p:set>
+                                      <p:cBhvr>
+                                        <p:cTn id="6" dur="1" fill="hold">
+                                          <p:stCondLst>
+                                            <p:cond delay="0"/>
+                                          </p:stCondLst>
+                                        </p:cTn>
+                                        <p:tgtEl>
+                                          <p:spTgt spid="7"/>
+                                        </p:tgtEl>
+                                        <p:attrNameLst>
+                                          <p:attrName>style.visibility</p:attrName>
+                                        </p:attrNameLst>
+                                      </p:cBhvr>
+                                      <p:to>
+                                        <p:strVal val="visible"/>
+                                      </p:to>
+                                    </p:set>
+                                  </p:childTnLst>
+                                </p:cTn>
+                              </p:par>
+                            </p:childTnLst>
+                          </p:cTn>
+                        </p:par>
+                      </p:childTnLst>
+                    </p:cTn>
+                  </p:par>
+                  <p:par>
+                    <p:cTn id="7" fill="hold">
+                      <p:stCondLst>
+                        <p:cond delay="indefinite"/>
+                      </p:stCondLst>
+                      <p:childTnLst>
+                        <p:par>
+                          <p:cTn id="8" fill="hold">
+                            <p:stCondLst>
+                              <p:cond delay="0"/>
+                            </p:stCondLst>
+                            <p:childTnLst>
+                              <p:par>
+                                <p:cTn id="9" presetID="1" presetClass="entr" presetSubtype="0" fill="hold" nodeType="clickEffect">
+                                  <p:stCondLst>
+                                    <p:cond delay="0"/>
+                                  </p:stCondLst>
+                                  <p:childTnLst>
+                                    <p:set>
+                                      <p:cBhvr>
+                                        <p:cTn id="10" dur="1" fill="hold">
+                                          <p:stCondLst>
+                                            <p:cond delay="0"/>
+                                          </p:stCondLst>
+                                        </p:cTn>
+                                        <p:tgtEl>
+                                          <p:spTgt spid="6"/>
+                                        </p:tgtEl>
+                                        <p:attrNameLst>
+                                          <p:attrName>style.visibility</p:attrName>
+                                        </p:attrNameLst>
+                                      </p:cBhvr>
+                                      <p:to>
+                                        <p:strVal val="visible"/>
+                                      </p:to>
+                                    </p:set>
+                                  </p:childTnLst>
+                                </p:cTn>
+                              </p:par>
+                            </p:childTnLst>
+                          </p:cTn>
+                        </p:par>
+                      </p:childTnLst>
+                    </p:cTn>
+                  </p:par>
+                </p:childTnLst>
+              </p:cTn>
+              <p:prevCondLst>
+                <p:cond evt="onPrev" delay="0">
+                  <p:tgtEl>
+                    <p:sldTgt/>
+                  </p:tgtEl>
+                </p:cond>
+              </p:prevCondLst>
+              <p:nextCondLst>
+                <p:cond evt="onNext" delay="0">
+                  <p:tgtEl>
+                    <p:sldTgt/>
+                  </p:tgtEl>
+                </p:cond>
+              </p:nextCondLst>
+            </p:seq>
+          </p:childTnLst>
+        </p:cTn>
+      </p:par>
+    </p:tnLst>
+  </p:timing>
+</p:sld>
+</file>
+
+<file path=ppt/slides/slide11.xml><?xml version="1.0" encoding="utf-8"?>
+<p:sld xmlns:a="http://schemas.openxmlformats.org/drawingml/2006/main" xmlns:r="http://schemas.openxmlformats.org/officeDocument/2006/relationships" xmlns:p="http://schemas.openxmlformats.org/presentationml/2006/main">
+  <p:cSld>
+    <p:spTree>
+      <p:nvGrpSpPr>
+        <p:cNvPr id="1" name=""/>
+        <p:cNvGrpSpPr/>
+        <p:nvPr/>
+      </p:nvGrpSpPr>
+      <p:grpSpPr>
+        <a:xfrm>
+          <a:off x="0" y="0"/>
+          <a:ext cx="0" cy="0"/>
+          <a:chOff x="0" y="0"/>
+          <a:chExt cx="0" cy="0"/>
+        </a:xfrm>
+      </p:grpSpPr>
+      <p:sp>
+        <p:nvSpPr>
+          <p:cNvPr id="2" name="Title 1"/>
+          <p:cNvSpPr>
+            <a:spLocks noGrp="1"/>
+          </p:cNvSpPr>
+          <p:nvPr>
+            <p:ph type="title"/>
+          </p:nvPr>
+        </p:nvSpPr>
+        <p:spPr/>
+        <p:txBody>
+          <a:bodyPr/>
+          <a:lstStyle/>
+          <a:p>
+            <a:r>
+              <a:rPr lang="en-US" dirty="0" smtClean="0"/>
+              <a:t>Point Queries Error Bounds</a:t>
+            </a:r>
+            <a:endParaRPr lang="en-US" dirty="0"/>
+          </a:p>
+        </p:txBody>
+      </p:sp>
+      <p:pic>
+        <p:nvPicPr>
+          <p:cNvPr id="3" name="Picture 2"/>
+          <p:cNvPicPr>
+            <a:picLocks noChangeAspect="1"/>
+          </p:cNvPicPr>
+          <p:nvPr/>
+        </p:nvPicPr>
+        <p:blipFill>
+          <a:blip r:embed="rId2">
+            <a:extLst>
+              <a:ext uri="{28A0092B-C50C-407E-A947-70E740481C1C}">
+                <a14:useLocalDpi xmlns:a14="http://schemas.microsoft.com/office/drawing/2010/main" val="0"/>
+              </a:ext>
+            </a:extLst>
+          </a:blip>
+          <a:stretch>
+            <a:fillRect/>
+          </a:stretch>
+        </p:blipFill>
+        <p:spPr>
+          <a:xfrm>
+            <a:off x="1292013" y="1979578"/>
+            <a:ext cx="1548723" cy="630961"/>
+          </a:xfrm>
+          <a:prstGeom prst="rect">
+            <a:avLst/>
+          </a:prstGeom>
+          <a:ln w="38100">
+            <a:solidFill>
+              <a:srgbClr val="0070C0"/>
+            </a:solidFill>
+            <a:prstDash val="dash"/>
+          </a:ln>
+        </p:spPr>
+      </p:pic>
+      <p:pic>
+        <p:nvPicPr>
+          <p:cNvPr id="4" name="Picture 3"/>
+          <p:cNvPicPr>
+            <a:picLocks noChangeAspect="1"/>
+          </p:cNvPicPr>
+          <p:nvPr/>
+        </p:nvPicPr>
+        <p:blipFill>
+          <a:blip r:embed="rId3">
+            <a:extLst>
+              <a:ext uri="{28A0092B-C50C-407E-A947-70E740481C1C}">
+                <a14:useLocalDpi xmlns:a14="http://schemas.microsoft.com/office/drawing/2010/main" val="0"/>
+              </a:ext>
+            </a:extLst>
+          </a:blip>
+          <a:stretch>
+            <a:fillRect/>
+          </a:stretch>
+        </p:blipFill>
+        <p:spPr>
+          <a:xfrm>
+            <a:off x="3974592" y="3871918"/>
+            <a:ext cx="4791456" cy="865303"/>
+          </a:xfrm>
+          <a:prstGeom prst="rect">
+            <a:avLst/>
+          </a:prstGeom>
+        </p:spPr>
+      </p:pic>
+      <p:pic>
+        <p:nvPicPr>
+          <p:cNvPr id="7" name="Picture 6"/>
+          <p:cNvPicPr>
+            <a:picLocks noChangeAspect="1"/>
+          </p:cNvPicPr>
+          <p:nvPr/>
+        </p:nvPicPr>
+        <p:blipFill>
+          <a:blip r:embed="rId4">
+            <a:extLst>
+              <a:ext uri="{28A0092B-C50C-407E-A947-70E740481C1C}">
+                <a14:useLocalDpi xmlns:a14="http://schemas.microsoft.com/office/drawing/2010/main" val="0"/>
+              </a:ext>
+            </a:extLst>
+          </a:blip>
+          <a:stretch>
+            <a:fillRect/>
+          </a:stretch>
+        </p:blipFill>
+        <p:spPr>
+          <a:xfrm>
+            <a:off x="3974592" y="2673987"/>
+            <a:ext cx="3023616" cy="1374371"/>
+          </a:xfrm>
+          <a:prstGeom prst="rect">
+            <a:avLst/>
+          </a:prstGeom>
+        </p:spPr>
+      </p:pic>
+      <p:pic>
+        <p:nvPicPr>
+          <p:cNvPr id="9" name="Picture 8"/>
+          <p:cNvPicPr>
+            <a:picLocks noChangeAspect="1"/>
+          </p:cNvPicPr>
+          <p:nvPr/>
+        </p:nvPicPr>
+        <p:blipFill>
+          <a:blip r:embed="rId5">
+            <a:extLst>
+              <a:ext uri="{28A0092B-C50C-407E-A947-70E740481C1C}">
+                <a14:useLocalDpi xmlns:a14="http://schemas.microsoft.com/office/drawing/2010/main" val="0"/>
+              </a:ext>
+            </a:extLst>
+          </a:blip>
+          <a:stretch>
+            <a:fillRect/>
+          </a:stretch>
+        </p:blipFill>
+        <p:spPr>
+          <a:xfrm>
+            <a:off x="3974592" y="4829417"/>
+            <a:ext cx="3608832" cy="833744"/>
+          </a:xfrm>
+          <a:prstGeom prst="rect">
+            <a:avLst/>
+          </a:prstGeom>
+        </p:spPr>
+      </p:pic>
+    </p:spTree>
+    <p:extLst>
+      <p:ext uri="{BB962C8B-B14F-4D97-AF65-F5344CB8AC3E}">
+        <p14:creationId xmlns:p14="http://schemas.microsoft.com/office/powerpoint/2010/main" val="1405094141"/>
+      </p:ext>
+    </p:extLst>
+  </p:cSld>
+  <p:clrMapOvr>
+    <a:masterClrMapping/>
+  </p:clrMapOvr>
+  <p:timing>
+    <p:tnLst>
+      <p:par>
+        <p:cTn id="1" dur="indefinite" restart="never" nodeType="tmRoot">
+          <p:childTnLst>
+            <p:seq concurrent="1" nextAc="seek">
+              <p:cTn id="2" dur="indefinite" nodeType="mainSeq">
+                <p:childTnLst>
+                  <p:par>
+                    <p:cTn id="3" fill="hold">
+                      <p:stCondLst>
+                        <p:cond delay="indefinite"/>
+                      </p:stCondLst>
+                      <p:childTnLst>
+                        <p:par>
+                          <p:cTn id="4" fill="hold">
+                            <p:stCondLst>
+                              <p:cond delay="0"/>
+                            </p:stCondLst>
+                            <p:childTnLst>
+                              <p:par>
+                                <p:cTn id="5" presetID="1" presetClass="entr" presetSubtype="0" fill="hold" nodeType="clickEffect">
+                                  <p:stCondLst>
+                                    <p:cond delay="0"/>
+                                  </p:stCondLst>
+                                  <p:childTnLst>
+                                    <p:set>
+                                      <p:cBhvr>
+                                        <p:cTn id="6" dur="1" fill="hold">
+                                          <p:stCondLst>
+                                            <p:cond delay="0"/>
+                                          </p:stCondLst>
+                                        </p:cTn>
+                                        <p:tgtEl>
+                                          <p:spTgt spid="4"/>
+                                        </p:tgtEl>
+                                        <p:attrNameLst>
+                                          <p:attrName>style.visibility</p:attrName>
+                                        </p:attrNameLst>
+                                      </p:cBhvr>
+                                      <p:to>
+                                        <p:strVal val="visible"/>
+                                      </p:to>
+                                    </p:set>
+                                  </p:childTnLst>
+                                </p:cTn>
+                              </p:par>
+                            </p:childTnLst>
+                          </p:cTn>
+                        </p:par>
+                      </p:childTnLst>
+                    </p:cTn>
+                  </p:par>
+                  <p:par>
+                    <p:cTn id="7" fill="hold">
+                      <p:stCondLst>
+                        <p:cond delay="indefinite"/>
+                      </p:stCondLst>
+                      <p:childTnLst>
+                        <p:par>
+                          <p:cTn id="8" fill="hold">
+                            <p:stCondLst>
+                              <p:cond delay="0"/>
+                            </p:stCondLst>
+                            <p:childTnLst>
+                              <p:par>
+                                <p:cTn id="9" presetID="1" presetClass="entr" presetSubtype="0" fill="hold" nodeType="clickEffect">
+                                  <p:stCondLst>
+                                    <p:cond delay="0"/>
+                                  </p:stCondLst>
+                                  <p:childTnLst>
+                                    <p:set>
+                                      <p:cBhvr>
+                                        <p:cTn id="10" dur="1" fill="hold">
+                                          <p:stCondLst>
+                                            <p:cond delay="0"/>
+                                          </p:stCondLst>
+                                        </p:cTn>
+                                        <p:tgtEl>
+                                          <p:spTgt spid="9"/>
+                                        </p:tgtEl>
+                                        <p:attrNameLst>
+                                          <p:attrName>style.visibility</p:attrName>
+                                        </p:attrNameLst>
+                                      </p:cBhvr>
+                                      <p:to>
+                                        <p:strVal val="visible"/>
+                                      </p:to>
+                                    </p:set>
+                                  </p:childTnLst>
+                                </p:cTn>
+                              </p:par>
+                            </p:childTnLst>
+                          </p:cTn>
+                        </p:par>
+                      </p:childTnLst>
+                    </p:cTn>
+                  </p:par>
+                </p:childTnLst>
+              </p:cTn>
+              <p:prevCondLst>
+                <p:cond evt="onPrev" delay="0">
+                  <p:tgtEl>
+                    <p:sldTgt/>
+                  </p:tgtEl>
+                </p:cond>
+              </p:prevCondLst>
+              <p:nextCondLst>
+                <p:cond evt="onNext" delay="0">
+                  <p:tgtEl>
+                    <p:sldTgt/>
+                  </p:tgtEl>
+                </p:cond>
+              </p:nextCondLst>
+            </p:seq>
+          </p:childTnLst>
+        </p:cTn>
+      </p:par>
+    </p:tnLst>
+  </p:timing>
+</p:sld>
+</file>
+
+<file path=ppt/slides/slide12.xml><?xml version="1.0" encoding="utf-8"?>
+<p:sld xmlns:a="http://schemas.openxmlformats.org/drawingml/2006/main" xmlns:r="http://schemas.openxmlformats.org/officeDocument/2006/relationships" xmlns:p="http://schemas.openxmlformats.org/presentationml/2006/main">
+  <p:cSld>
+    <p:spTree>
+      <p:nvGrpSpPr>
+        <p:cNvPr id="1" name=""/>
+        <p:cNvGrpSpPr/>
+        <p:nvPr/>
+      </p:nvGrpSpPr>
+      <p:grpSpPr>
+        <a:xfrm>
+          <a:off x="0" y="0"/>
+          <a:ext cx="0" cy="0"/>
+          <a:chOff x="0" y="0"/>
+          <a:chExt cx="0" cy="0"/>
+        </a:xfrm>
+      </p:grpSpPr>
+      <p:pic>
+        <p:nvPicPr>
+          <p:cNvPr id="7" name="Picture 6"/>
+          <p:cNvPicPr>
+            <a:picLocks noChangeAspect="1"/>
+          </p:cNvPicPr>
+          <p:nvPr/>
+        </p:nvPicPr>
+        <p:blipFill>
+          <a:blip r:embed="rId2">
+            <a:extLst>
+              <a:ext uri="{28A0092B-C50C-407E-A947-70E740481C1C}">
+                <a14:useLocalDpi xmlns:a14="http://schemas.microsoft.com/office/drawing/2010/main" val="0"/>
+              </a:ext>
+            </a:extLst>
+          </a:blip>
+          <a:stretch>
+            <a:fillRect/>
+          </a:stretch>
+        </p:blipFill>
+        <p:spPr>
+          <a:xfrm>
+            <a:off x="4218432" y="3172696"/>
+            <a:ext cx="4155101" cy="1264596"/>
+          </a:xfrm>
+          <a:prstGeom prst="rect">
+            <a:avLst/>
+          </a:prstGeom>
+        </p:spPr>
+      </p:pic>
+      <p:sp>
+        <p:nvSpPr>
+          <p:cNvPr id="2" name="Title 1"/>
+          <p:cNvSpPr>
+            <a:spLocks noGrp="1"/>
+          </p:cNvSpPr>
+          <p:nvPr>
+            <p:ph type="title"/>
+          </p:nvPr>
+        </p:nvSpPr>
+        <p:spPr/>
+        <p:txBody>
+          <a:bodyPr/>
+          <a:lstStyle/>
+          <a:p>
+            <a:r>
+              <a:rPr lang="en-US" dirty="0" smtClean="0"/>
+              <a:t>Point Queries Error Bounds</a:t>
+            </a:r>
+            <a:endParaRPr lang="en-US" dirty="0"/>
+          </a:p>
+        </p:txBody>
+      </p:sp>
+      <p:pic>
+        <p:nvPicPr>
+          <p:cNvPr id="8" name="Picture 7"/>
+          <p:cNvPicPr>
+            <a:picLocks noChangeAspect="1"/>
+          </p:cNvPicPr>
+          <p:nvPr/>
+        </p:nvPicPr>
+        <p:blipFill>
+          <a:blip r:embed="rId3">
+            <a:extLst>
+              <a:ext uri="{28A0092B-C50C-407E-A947-70E740481C1C}">
+                <a14:useLocalDpi xmlns:a14="http://schemas.microsoft.com/office/drawing/2010/main" val="0"/>
+              </a:ext>
+            </a:extLst>
+          </a:blip>
+          <a:stretch>
+            <a:fillRect/>
+          </a:stretch>
+        </p:blipFill>
+        <p:spPr>
+          <a:xfrm>
+            <a:off x="1292352" y="1983104"/>
+            <a:ext cx="6729984" cy="628970"/>
+          </a:xfrm>
+          <a:prstGeom prst="rect">
+            <a:avLst/>
+          </a:prstGeom>
+          <a:ln w="38100">
+            <a:solidFill>
+              <a:srgbClr val="0070C0"/>
+            </a:solidFill>
+            <a:prstDash val="dash"/>
+          </a:ln>
+        </p:spPr>
+      </p:pic>
+      <p:pic>
+        <p:nvPicPr>
+          <p:cNvPr id="10" name="Picture 9"/>
+          <p:cNvPicPr>
+            <a:picLocks noChangeAspect="1"/>
+          </p:cNvPicPr>
+          <p:nvPr/>
+        </p:nvPicPr>
+        <p:blipFill>
+          <a:blip r:embed="rId4">
+            <a:extLst>
+              <a:ext uri="{28A0092B-C50C-407E-A947-70E740481C1C}">
+                <a14:useLocalDpi xmlns:a14="http://schemas.microsoft.com/office/drawing/2010/main" val="0"/>
+              </a:ext>
+            </a:extLst>
+          </a:blip>
+          <a:stretch>
+            <a:fillRect/>
+          </a:stretch>
+        </p:blipFill>
+        <p:spPr>
+          <a:xfrm>
+            <a:off x="3083532" y="4964549"/>
+            <a:ext cx="5086151" cy="1361647"/>
+          </a:xfrm>
+          <a:prstGeom prst="rect">
+            <a:avLst/>
+          </a:prstGeom>
+        </p:spPr>
+      </p:pic>
+      <p:pic>
+        <p:nvPicPr>
+          <p:cNvPr id="9" name="Picture 8"/>
+          <p:cNvPicPr>
+            <a:picLocks noChangeAspect="1"/>
+          </p:cNvPicPr>
+          <p:nvPr/>
+        </p:nvPicPr>
+        <p:blipFill>
+          <a:blip r:embed="rId5">
+            <a:extLst>
+              <a:ext uri="{28A0092B-C50C-407E-A947-70E740481C1C}">
+                <a14:useLocalDpi xmlns:a14="http://schemas.microsoft.com/office/drawing/2010/main" val="0"/>
+              </a:ext>
+            </a:extLst>
+          </a:blip>
+          <a:stretch>
+            <a:fillRect/>
+          </a:stretch>
+        </p:blipFill>
+        <p:spPr>
+          <a:xfrm>
+            <a:off x="4493742" y="4353279"/>
+            <a:ext cx="2231069" cy="630691"/>
+          </a:xfrm>
+          <a:prstGeom prst="rect">
+            <a:avLst/>
+          </a:prstGeom>
+          <a:ln>
+            <a:solidFill>
+              <a:srgbClr val="0070C0"/>
+            </a:solidFill>
+          </a:ln>
+        </p:spPr>
+      </p:pic>
+      <p:cxnSp>
+        <p:nvCxnSpPr>
+          <p:cNvPr id="18" name="Straight Arrow Connector 17"/>
+          <p:cNvCxnSpPr/>
+          <p:nvPr/>
+        </p:nvCxnSpPr>
+        <p:spPr>
+          <a:xfrm flipH="1">
+            <a:off x="5609277" y="4837746"/>
+            <a:ext cx="1" cy="424523"/>
+          </a:xfrm>
+          <a:prstGeom prst="straightConnector1">
+            <a:avLst/>
+          </a:prstGeom>
+          <a:ln w="57150">
+            <a:solidFill>
+              <a:srgbClr val="0070C0"/>
+            </a:solidFill>
+            <a:tailEnd type="triangle"/>
+          </a:ln>
+        </p:spPr>
+        <p:style>
+          <a:lnRef idx="1">
+            <a:schemeClr val="accent1"/>
+          </a:lnRef>
+          <a:fillRef idx="0">
+            <a:schemeClr val="accent1"/>
+          </a:fillRef>
+          <a:effectRef idx="0">
+            <a:schemeClr val="accent1"/>
+          </a:effectRef>
+          <a:fontRef idx="minor">
+            <a:schemeClr val="tx1"/>
+          </a:fontRef>
+        </p:style>
+      </p:cxnSp>
+      <p:cxnSp>
+        <p:nvCxnSpPr>
+          <p:cNvPr id="20" name="Straight Arrow Connector 19"/>
+          <p:cNvCxnSpPr/>
+          <p:nvPr/>
+        </p:nvCxnSpPr>
+        <p:spPr>
+          <a:xfrm>
+            <a:off x="5614942" y="3335439"/>
+            <a:ext cx="0" cy="354518"/>
+          </a:xfrm>
+          <a:prstGeom prst="straightConnector1">
+            <a:avLst/>
+          </a:prstGeom>
+          <a:ln w="57150">
+            <a:solidFill>
+              <a:srgbClr val="0070C0"/>
+            </a:solidFill>
+            <a:tailEnd type="triangle"/>
+          </a:ln>
+        </p:spPr>
+        <p:style>
+          <a:lnRef idx="1">
+            <a:schemeClr val="accent1"/>
+          </a:lnRef>
+          <a:fillRef idx="0">
+            <a:schemeClr val="accent1"/>
+          </a:fillRef>
+          <a:effectRef idx="0">
+            <a:schemeClr val="accent1"/>
+          </a:effectRef>
+          <a:fontRef idx="minor">
+            <a:schemeClr val="tx1"/>
+          </a:fontRef>
+        </p:style>
+      </p:cxnSp>
+      <p:pic>
+        <p:nvPicPr>
+          <p:cNvPr id="12" name="Picture 11"/>
+          <p:cNvPicPr>
+            <a:picLocks noChangeAspect="1"/>
+          </p:cNvPicPr>
+          <p:nvPr/>
+        </p:nvPicPr>
+        <p:blipFill>
+          <a:blip r:embed="rId6">
+            <a:extLst>
+              <a:ext uri="{28A0092B-C50C-407E-A947-70E740481C1C}">
+                <a14:useLocalDpi xmlns:a14="http://schemas.microsoft.com/office/drawing/2010/main" val="0"/>
+              </a:ext>
+            </a:extLst>
+          </a:blip>
+          <a:stretch>
+            <a:fillRect/>
+          </a:stretch>
+        </p:blipFill>
+        <p:spPr>
+          <a:xfrm>
+            <a:off x="4716703" y="2702821"/>
+            <a:ext cx="1579279" cy="633916"/>
+          </a:xfrm>
+          <a:prstGeom prst="rect">
+            <a:avLst/>
+          </a:prstGeom>
+          <a:ln>
+            <a:solidFill>
+              <a:srgbClr val="0070C0"/>
+            </a:solidFill>
+          </a:ln>
+        </p:spPr>
+      </p:pic>
+    </p:spTree>
+    <p:extLst>
+      <p:ext uri="{BB962C8B-B14F-4D97-AF65-F5344CB8AC3E}">
+        <p14:creationId xmlns:p14="http://schemas.microsoft.com/office/powerpoint/2010/main" val="956547162"/>
+      </p:ext>
+    </p:extLst>
+  </p:cSld>
+  <p:clrMapOvr>
+    <a:masterClrMapping/>
+  </p:clrMapOvr>
+  <mc:AlternateContent xmlns:mc="http://schemas.openxmlformats.org/markup-compatibility/2006">
+    <mc:Choice xmlns:p14="http://schemas.microsoft.com/office/powerpoint/2010/main" Requires="p14">
+      <p:transition spd="slow" p14:dur="2000"/>
+    </mc:Choice>
+    <mc:Fallback>
+      <p:transition spd="slow"/>
+    </mc:Fallback>
+  </mc:AlternateContent>
+  <p:timing>
+    <p:tnLst>
+      <p:par>
+        <p:cTn id="1" dur="indefinite" restart="never" nodeType="tmRoot">
+          <p:childTnLst>
+            <p:seq concurrent="1" nextAc="seek">
+              <p:cTn id="2" dur="indefinite" nodeType="mainSeq">
+                <p:childTnLst>
+                  <p:par>
+                    <p:cTn id="3" fill="hold">
+                      <p:stCondLst>
+                        <p:cond delay="indefinite"/>
+                      </p:stCondLst>
+                      <p:childTnLst>
+                        <p:par>
+                          <p:cTn id="4" fill="hold">
+                            <p:stCondLst>
+                              <p:cond delay="0"/>
+                            </p:stCondLst>
+                            <p:childTnLst>
+                              <p:par>
+                                <p:cTn id="5" presetID="1" presetClass="entr" presetSubtype="0" fill="hold" nodeType="clickEffect">
+                                  <p:stCondLst>
+                                    <p:cond delay="0"/>
+                                  </p:stCondLst>
+                                  <p:childTnLst>
+                                    <p:set>
+                                      <p:cBhvr>
+                                        <p:cTn id="6" dur="1" fill="hold">
+                                          <p:stCondLst>
+                                            <p:cond delay="0"/>
+                                          </p:stCondLst>
+                                        </p:cTn>
+                                        <p:tgtEl>
+                                          <p:spTgt spid="9"/>
+                                        </p:tgtEl>
+                                        <p:attrNameLst>
+                                          <p:attrName>style.visibility</p:attrName>
+                                        </p:attrNameLst>
+                                      </p:cBhvr>
+                                      <p:to>
+                                        <p:strVal val="visible"/>
+                                      </p:to>
+                                    </p:set>
+                                  </p:childTnLst>
+                                </p:cTn>
+                              </p:par>
+                              <p:par>
+                                <p:cTn id="7" presetID="1" presetClass="entr" presetSubtype="0" fill="hold" nodeType="withEffect">
+                                  <p:stCondLst>
+                                    <p:cond delay="0"/>
+                                  </p:stCondLst>
+                                  <p:childTnLst>
+                                    <p:set>
+                                      <p:cBhvr>
+                                        <p:cTn id="8" dur="1" fill="hold">
+                                          <p:stCondLst>
+                                            <p:cond delay="0"/>
+                                          </p:stCondLst>
+                                        </p:cTn>
+                                        <p:tgtEl>
+                                          <p:spTgt spid="10"/>
+                                        </p:tgtEl>
+                                        <p:attrNameLst>
+                                          <p:attrName>style.visibility</p:attrName>
+                                        </p:attrNameLst>
+                                      </p:cBhvr>
+                                      <p:to>
+                                        <p:strVal val="visible"/>
+                                      </p:to>
+                                    </p:set>
+                                  </p:childTnLst>
+                                </p:cTn>
+                              </p:par>
+                              <p:par>
+                                <p:cTn id="9" presetID="1" presetClass="entr" presetSubtype="0" fill="hold" nodeType="withEffect">
+                                  <p:stCondLst>
+                                    <p:cond delay="0"/>
+                                  </p:stCondLst>
+                                  <p:childTnLst>
+                                    <p:set>
+                                      <p:cBhvr>
+                                        <p:cTn id="10" dur="1" fill="hold">
+                                          <p:stCondLst>
+                                            <p:cond delay="0"/>
+                                          </p:stCondLst>
+                                        </p:cTn>
+                                        <p:tgtEl>
+                                          <p:spTgt spid="18"/>
+                                        </p:tgtEl>
+                                        <p:attrNameLst>
+                                          <p:attrName>style.visibility</p:attrName>
+                                        </p:attrNameLst>
+                                      </p:cBhvr>
+                                      <p:to>
+                                        <p:strVal val="visible"/>
+                                      </p:to>
+                                    </p:set>
+                                  </p:childTnLst>
+                                </p:cTn>
+                              </p:par>
+                            </p:childTnLst>
+                          </p:cTn>
+                        </p:par>
+                      </p:childTnLst>
+                    </p:cTn>
+                  </p:par>
+                </p:childTnLst>
+              </p:cTn>
+              <p:prevCondLst>
+                <p:cond evt="onPrev" delay="0">
+                  <p:tgtEl>
+                    <p:sldTgt/>
+                  </p:tgtEl>
+                </p:cond>
+              </p:prevCondLst>
+              <p:nextCondLst>
+                <p:cond evt="onNext" delay="0">
+                  <p:tgtEl>
+                    <p:sldTgt/>
+                  </p:tgtEl>
+                </p:cond>
+              </p:nextCondLst>
+            </p:seq>
+          </p:childTnLst>
+        </p:cTn>
+      </p:par>
+    </p:tnLst>
+  </p:timing>
+</p:sld>
+</file>
+
+<file path=ppt/slides/slide13.xml><?xml version="1.0" encoding="utf-8"?>
+<p:sld xmlns:a="http://schemas.openxmlformats.org/drawingml/2006/main" xmlns:r="http://schemas.openxmlformats.org/officeDocument/2006/relationships" xmlns:p="http://schemas.openxmlformats.org/presentationml/2006/main">
+  <p:cSld>
+    <p:spTree>
+      <p:nvGrpSpPr>
+        <p:cNvPr id="1" name=""/>
+        <p:cNvGrpSpPr/>
+        <p:nvPr/>
+      </p:nvGrpSpPr>
+      <p:grpSpPr>
+        <a:xfrm>
+          <a:off x="0" y="0"/>
+          <a:ext cx="0" cy="0"/>
+          <a:chOff x="0" y="0"/>
+          <a:chExt cx="0" cy="0"/>
+        </a:xfrm>
+      </p:grpSpPr>
+      <p:pic>
+        <p:nvPicPr>
+          <p:cNvPr id="42" name="Picture 41"/>
+          <p:cNvPicPr>
+            <a:picLocks noChangeAspect="1"/>
+          </p:cNvPicPr>
+          <p:nvPr/>
+        </p:nvPicPr>
+        <p:blipFill>
+          <a:blip r:embed="rId2">
+            <a:extLst>
+              <a:ext uri="{28A0092B-C50C-407E-A947-70E740481C1C}">
+                <a14:useLocalDpi xmlns:a14="http://schemas.microsoft.com/office/drawing/2010/main" val="0"/>
+              </a:ext>
+            </a:extLst>
+          </a:blip>
+          <a:stretch>
+            <a:fillRect/>
+          </a:stretch>
+        </p:blipFill>
+        <p:spPr>
+          <a:xfrm>
+            <a:off x="4731547" y="4496913"/>
+            <a:ext cx="2278851" cy="934167"/>
+          </a:xfrm>
+          <a:prstGeom prst="rect">
+            <a:avLst/>
+          </a:prstGeom>
+        </p:spPr>
+      </p:pic>
+      <p:sp>
+        <p:nvSpPr>
+          <p:cNvPr id="2" name="Title 1"/>
+          <p:cNvSpPr>
+            <a:spLocks noGrp="1"/>
+          </p:cNvSpPr>
+          <p:nvPr>
+            <p:ph type="title"/>
+          </p:nvPr>
+        </p:nvSpPr>
+        <p:spPr/>
+        <p:txBody>
+          <a:bodyPr/>
+          <a:lstStyle/>
+          <a:p>
+            <a:r>
+              <a:rPr lang="en-US" dirty="0" smtClean="0"/>
+              <a:t>Point Queries Error Bounds</a:t>
+            </a:r>
+            <a:endParaRPr lang="en-US" dirty="0"/>
+          </a:p>
+        </p:txBody>
+      </p:sp>
+      <p:cxnSp>
+        <p:nvCxnSpPr>
+          <p:cNvPr id="31" name="Straight Arrow Connector 30"/>
+          <p:cNvCxnSpPr/>
+          <p:nvPr/>
+        </p:nvCxnSpPr>
+        <p:spPr>
+          <a:xfrm flipH="1">
+            <a:off x="5914077" y="4380633"/>
+            <a:ext cx="1" cy="424523"/>
+          </a:xfrm>
+          <a:prstGeom prst="straightConnector1">
+            <a:avLst/>
+          </a:prstGeom>
+          <a:ln w="57150">
+            <a:solidFill>
+              <a:srgbClr val="0070C0"/>
+            </a:solidFill>
+            <a:tailEnd type="triangle"/>
+          </a:ln>
+        </p:spPr>
+        <p:style>
+          <a:lnRef idx="1">
+            <a:schemeClr val="accent1"/>
+          </a:lnRef>
+          <a:fillRef idx="0">
+            <a:schemeClr val="accent1"/>
+          </a:fillRef>
+          <a:effectRef idx="0">
+            <a:schemeClr val="accent1"/>
+          </a:effectRef>
+          <a:fontRef idx="minor">
+            <a:schemeClr val="tx1"/>
+          </a:fontRef>
+        </p:style>
+      </p:cxnSp>
+      <p:pic>
+        <p:nvPicPr>
+          <p:cNvPr id="36" name="Picture 35"/>
+          <p:cNvPicPr>
+            <a:picLocks noChangeAspect="1"/>
+          </p:cNvPicPr>
+          <p:nvPr/>
+        </p:nvPicPr>
+        <p:blipFill>
+          <a:blip r:embed="rId3">
+            <a:extLst>
+              <a:ext uri="{28A0092B-C50C-407E-A947-70E740481C1C}">
+                <a14:useLocalDpi xmlns:a14="http://schemas.microsoft.com/office/drawing/2010/main" val="0"/>
+              </a:ext>
+            </a:extLst>
+          </a:blip>
+          <a:stretch>
+            <a:fillRect/>
+          </a:stretch>
+        </p:blipFill>
+        <p:spPr>
+          <a:xfrm>
+            <a:off x="5048041" y="2713385"/>
+            <a:ext cx="1286135" cy="396589"/>
+          </a:xfrm>
+          <a:prstGeom prst="rect">
+            <a:avLst/>
+          </a:prstGeom>
+          <a:ln w="6350">
+            <a:solidFill>
+              <a:srgbClr val="0070C0"/>
+            </a:solidFill>
+          </a:ln>
+        </p:spPr>
+      </p:pic>
+      <p:pic>
+        <p:nvPicPr>
+          <p:cNvPr id="37" name="Picture 36"/>
+          <p:cNvPicPr>
+            <a:picLocks noChangeAspect="1"/>
+          </p:cNvPicPr>
+          <p:nvPr/>
+        </p:nvPicPr>
+        <p:blipFill>
+          <a:blip r:embed="rId4">
+            <a:extLst>
+              <a:ext uri="{28A0092B-C50C-407E-A947-70E740481C1C}">
+                <a14:useLocalDpi xmlns:a14="http://schemas.microsoft.com/office/drawing/2010/main" val="0"/>
+              </a:ext>
+            </a:extLst>
+          </a:blip>
+          <a:stretch>
+            <a:fillRect/>
+          </a:stretch>
+        </p:blipFill>
+        <p:spPr>
+          <a:xfrm>
+            <a:off x="4059936" y="3146595"/>
+            <a:ext cx="2984234" cy="1030917"/>
+          </a:xfrm>
+          <a:prstGeom prst="rect">
+            <a:avLst/>
+          </a:prstGeom>
+        </p:spPr>
+      </p:pic>
+      <p:cxnSp>
+        <p:nvCxnSpPr>
+          <p:cNvPr id="19" name="Straight Arrow Connector 18"/>
+          <p:cNvCxnSpPr/>
+          <p:nvPr/>
+        </p:nvCxnSpPr>
+        <p:spPr>
+          <a:xfrm>
+            <a:off x="5870974" y="3109974"/>
+            <a:ext cx="0" cy="354518"/>
+          </a:xfrm>
+          <a:prstGeom prst="straightConnector1">
+            <a:avLst/>
+          </a:prstGeom>
+          <a:ln w="57150">
+            <a:solidFill>
+              <a:srgbClr val="0070C0"/>
+            </a:solidFill>
+            <a:tailEnd type="triangle"/>
+          </a:ln>
+        </p:spPr>
+        <p:style>
+          <a:lnRef idx="1">
+            <a:schemeClr val="accent1"/>
+          </a:lnRef>
+          <a:fillRef idx="0">
+            <a:schemeClr val="accent1"/>
+          </a:fillRef>
+          <a:effectRef idx="0">
+            <a:schemeClr val="accent1"/>
+          </a:effectRef>
+          <a:fontRef idx="minor">
+            <a:schemeClr val="tx1"/>
+          </a:fontRef>
+        </p:style>
+      </p:cxnSp>
+      <p:pic>
+        <p:nvPicPr>
+          <p:cNvPr id="41" name="Picture 40"/>
+          <p:cNvPicPr>
+            <a:picLocks noChangeAspect="1"/>
+          </p:cNvPicPr>
+          <p:nvPr/>
+        </p:nvPicPr>
+        <p:blipFill>
+          <a:blip r:embed="rId5">
+            <a:extLst>
+              <a:ext uri="{28A0092B-C50C-407E-A947-70E740481C1C}">
+                <a14:useLocalDpi xmlns:a14="http://schemas.microsoft.com/office/drawing/2010/main" val="0"/>
+              </a:ext>
+            </a:extLst>
+          </a:blip>
+          <a:stretch>
+            <a:fillRect/>
+          </a:stretch>
+        </p:blipFill>
+        <p:spPr>
+          <a:xfrm>
+            <a:off x="4529995" y="4021034"/>
+            <a:ext cx="2550750" cy="428098"/>
+          </a:xfrm>
+          <a:prstGeom prst="rect">
+            <a:avLst/>
+          </a:prstGeom>
+          <a:ln w="6350">
+            <a:solidFill>
+              <a:srgbClr val="0070C0"/>
+            </a:solidFill>
+          </a:ln>
+        </p:spPr>
+      </p:pic>
+      <p:pic>
+        <p:nvPicPr>
+          <p:cNvPr id="5" name="Picture 4"/>
+          <p:cNvPicPr>
+            <a:picLocks noChangeAspect="1"/>
+          </p:cNvPicPr>
+          <p:nvPr/>
+        </p:nvPicPr>
+        <p:blipFill>
+          <a:blip r:embed="rId6">
+            <a:extLst>
+              <a:ext uri="{28A0092B-C50C-407E-A947-70E740481C1C}">
+                <a14:useLocalDpi xmlns:a14="http://schemas.microsoft.com/office/drawing/2010/main" val="0"/>
+              </a:ext>
+            </a:extLst>
+          </a:blip>
+          <a:stretch>
+            <a:fillRect/>
+          </a:stretch>
+        </p:blipFill>
+        <p:spPr>
+          <a:xfrm>
+            <a:off x="3669792" y="5323571"/>
+            <a:ext cx="3553968" cy="828459"/>
+          </a:xfrm>
+          <a:prstGeom prst="rect">
+            <a:avLst/>
+          </a:prstGeom>
+        </p:spPr>
+      </p:pic>
+      <p:pic>
+        <p:nvPicPr>
+          <p:cNvPr id="11" name="Picture 10"/>
+          <p:cNvPicPr>
+            <a:picLocks noChangeAspect="1"/>
+          </p:cNvPicPr>
+          <p:nvPr/>
+        </p:nvPicPr>
+        <p:blipFill>
+          <a:blip r:embed="rId7">
+            <a:extLst>
+              <a:ext uri="{28A0092B-C50C-407E-A947-70E740481C1C}">
+                <a14:useLocalDpi xmlns:a14="http://schemas.microsoft.com/office/drawing/2010/main" val="0"/>
+              </a:ext>
+            </a:extLst>
+          </a:blip>
+          <a:stretch>
+            <a:fillRect/>
+          </a:stretch>
+        </p:blipFill>
+        <p:spPr>
+          <a:xfrm>
+            <a:off x="1292352" y="1983104"/>
+            <a:ext cx="6729984" cy="628970"/>
+          </a:xfrm>
+          <a:prstGeom prst="rect">
+            <a:avLst/>
+          </a:prstGeom>
+          <a:ln w="38100">
+            <a:solidFill>
+              <a:srgbClr val="0070C0"/>
+            </a:solidFill>
+            <a:prstDash val="dash"/>
+          </a:ln>
+        </p:spPr>
+      </p:pic>
+    </p:spTree>
+    <p:extLst>
+      <p:ext uri="{BB962C8B-B14F-4D97-AF65-F5344CB8AC3E}">
+        <p14:creationId xmlns:p14="http://schemas.microsoft.com/office/powerpoint/2010/main" val="2097069953"/>
+      </p:ext>
+    </p:extLst>
+  </p:cSld>
+  <p:clrMapOvr>
+    <a:masterClrMapping/>
+  </p:clrMapOvr>
+  <mc:AlternateContent xmlns:mc="http://schemas.openxmlformats.org/markup-compatibility/2006">
+    <mc:Choice xmlns:p14="http://schemas.microsoft.com/office/powerpoint/2010/main" Requires="p14">
+      <p:transition spd="slow" p14:dur="2000"/>
+    </mc:Choice>
+    <mc:Fallback>
+      <p:transition spd="slow"/>
+    </mc:Fallback>
+  </mc:AlternateContent>
+  <p:timing>
+    <p:tnLst>
+      <p:par>
+        <p:cTn id="1" dur="indefinite" restart="never" nodeType="tmRoot">
+          <p:childTnLst>
+            <p:seq concurrent="1" nextAc="seek">
+              <p:cTn id="2" dur="indefinite" nodeType="mainSeq">
+                <p:childTnLst>
+                  <p:par>
+                    <p:cTn id="3" fill="hold">
+                      <p:stCondLst>
+                        <p:cond delay="indefinite"/>
+                      </p:stCondLst>
+                      <p:childTnLst>
+                        <p:par>
+                          <p:cTn id="4" fill="hold">
+                            <p:stCondLst>
+                              <p:cond delay="0"/>
+                            </p:stCondLst>
+                            <p:childTnLst>
+                              <p:par>
+                                <p:cTn id="5" presetID="1" presetClass="entr" presetSubtype="0" fill="hold" nodeType="clickEffect">
+                                  <p:stCondLst>
+                                    <p:cond delay="0"/>
+                                  </p:stCondLst>
+                                  <p:childTnLst>
+                                    <p:set>
+                                      <p:cBhvr>
+                                        <p:cTn id="6" dur="1" fill="hold">
+                                          <p:stCondLst>
+                                            <p:cond delay="0"/>
+                                          </p:stCondLst>
+                                        </p:cTn>
+                                        <p:tgtEl>
+                                          <p:spTgt spid="41"/>
+                                        </p:tgtEl>
+                                        <p:attrNameLst>
+                                          <p:attrName>style.visibility</p:attrName>
+                                        </p:attrNameLst>
+                                      </p:cBhvr>
+                                      <p:to>
+                                        <p:strVal val="visible"/>
+                                      </p:to>
+                                    </p:set>
+                                  </p:childTnLst>
+                                </p:cTn>
+                              </p:par>
+                              <p:par>
+                                <p:cTn id="7" presetID="1" presetClass="entr" presetSubtype="0" fill="hold" nodeType="withEffect">
+                                  <p:stCondLst>
+                                    <p:cond delay="0"/>
+                                  </p:stCondLst>
+                                  <p:childTnLst>
+                                    <p:set>
+                                      <p:cBhvr>
+                                        <p:cTn id="8" dur="1" fill="hold">
+                                          <p:stCondLst>
+                                            <p:cond delay="0"/>
+                                          </p:stCondLst>
+                                        </p:cTn>
+                                        <p:tgtEl>
+                                          <p:spTgt spid="31"/>
+                                        </p:tgtEl>
+                                        <p:attrNameLst>
+                                          <p:attrName>style.visibility</p:attrName>
+                                        </p:attrNameLst>
+                                      </p:cBhvr>
+                                      <p:to>
+                                        <p:strVal val="visible"/>
+                                      </p:to>
+                                    </p:set>
+                                  </p:childTnLst>
+                                </p:cTn>
+                              </p:par>
+                              <p:par>
+                                <p:cTn id="9" presetID="1" presetClass="entr" presetSubtype="0" fill="hold" nodeType="withEffect">
+                                  <p:stCondLst>
+                                    <p:cond delay="0"/>
+                                  </p:stCondLst>
+                                  <p:childTnLst>
+                                    <p:set>
+                                      <p:cBhvr>
+                                        <p:cTn id="10" dur="1" fill="hold">
+                                          <p:stCondLst>
+                                            <p:cond delay="0"/>
+                                          </p:stCondLst>
+                                        </p:cTn>
+                                        <p:tgtEl>
+                                          <p:spTgt spid="42"/>
+                                        </p:tgtEl>
+                                        <p:attrNameLst>
+                                          <p:attrName>style.visibility</p:attrName>
+                                        </p:attrNameLst>
+                                      </p:cBhvr>
+                                      <p:to>
+                                        <p:strVal val="visible"/>
+                                      </p:to>
+                                    </p:set>
+                                  </p:childTnLst>
+                                </p:cTn>
+                              </p:par>
+                            </p:childTnLst>
+                          </p:cTn>
+                        </p:par>
+                      </p:childTnLst>
+                    </p:cTn>
+                  </p:par>
+                  <p:par>
+                    <p:cTn id="11" fill="hold">
+                      <p:stCondLst>
+                        <p:cond delay="indefinite"/>
+                      </p:stCondLst>
+                      <p:childTnLst>
+                        <p:par>
+                          <p:cTn id="12" fill="hold">
+                            <p:stCondLst>
+                              <p:cond delay="0"/>
+                            </p:stCondLst>
+                            <p:childTnLst>
+                              <p:par>
+                                <p:cTn id="13" presetID="1" presetClass="entr" presetSubtype="0" fill="hold" nodeType="clickEffect">
+                                  <p:stCondLst>
+                                    <p:cond delay="0"/>
+                                  </p:stCondLst>
+                                  <p:childTnLst>
+                                    <p:set>
+                                      <p:cBhvr>
+                                        <p:cTn id="14" dur="1" fill="hold">
+                                          <p:stCondLst>
+                                            <p:cond delay="0"/>
+                                          </p:stCondLst>
+                                        </p:cTn>
+                                        <p:tgtEl>
+                                          <p:spTgt spid="5"/>
+                                        </p:tgtEl>
+                                        <p:attrNameLst>
+                                          <p:attrName>style.visibility</p:attrName>
+                                        </p:attrNameLst>
+                                      </p:cBhvr>
+                                      <p:to>
+                                        <p:strVal val="visible"/>
+                                      </p:to>
+                                    </p:set>
+                                  </p:childTnLst>
+                                </p:cTn>
+                              </p:par>
+                            </p:childTnLst>
+                          </p:cTn>
+                        </p:par>
+                      </p:childTnLst>
+                    </p:cTn>
+                  </p:par>
+                </p:childTnLst>
+              </p:cTn>
+              <p:prevCondLst>
+                <p:cond evt="onPrev" delay="0">
+                  <p:tgtEl>
+                    <p:sldTgt/>
+                  </p:tgtEl>
+                </p:cond>
+              </p:prevCondLst>
+              <p:nextCondLst>
+                <p:cond evt="onNext" delay="0">
+                  <p:tgtEl>
+                    <p:sldTgt/>
+                  </p:tgtEl>
+                </p:cond>
+              </p:nextCondLst>
+            </p:seq>
+          </p:childTnLst>
+        </p:cTn>
+      </p:par>
+    </p:tnLst>
+  </p:timing>
+</p:sld>
+</file>
+
+<file path=ppt/slides/slide14.xml><?xml version="1.0" encoding="utf-8"?>
+<p:sld xmlns:a="http://schemas.openxmlformats.org/drawingml/2006/main" xmlns:r="http://schemas.openxmlformats.org/officeDocument/2006/relationships" xmlns:p="http://schemas.openxmlformats.org/presentationml/2006/main">
+  <p:cSld>
+    <p:spTree>
+      <p:nvGrpSpPr>
+        <p:cNvPr id="1" name=""/>
+        <p:cNvGrpSpPr/>
+        <p:nvPr/>
+      </p:nvGrpSpPr>
+      <p:grpSpPr>
+        <a:xfrm>
+          <a:off x="0" y="0"/>
+          <a:ext cx="0" cy="0"/>
+          <a:chOff x="0" y="0"/>
+          <a:chExt cx="0" cy="0"/>
+        </a:xfrm>
+      </p:grpSpPr>
+      <p:sp>
+        <p:nvSpPr>
+          <p:cNvPr id="2" name="Title 1"/>
+          <p:cNvSpPr>
+            <a:spLocks noGrp="1"/>
+          </p:cNvSpPr>
+          <p:nvPr>
+            <p:ph type="title"/>
+          </p:nvPr>
+        </p:nvSpPr>
+        <p:spPr/>
+        <p:txBody>
+          <a:bodyPr/>
+          <a:lstStyle/>
+          <a:p>
+            <a:r>
+              <a:rPr lang="en-US" dirty="0" smtClean="0"/>
+              <a:t>Point Queries Error Bounds</a:t>
+            </a:r>
+            <a:endParaRPr lang="en-US" dirty="0"/>
+          </a:p>
+        </p:txBody>
+      </p:sp>
+      <p:pic>
+        <p:nvPicPr>
+          <p:cNvPr id="11" name="Picture 10"/>
+          <p:cNvPicPr>
+            <a:picLocks noChangeAspect="1"/>
+          </p:cNvPicPr>
+          <p:nvPr/>
+        </p:nvPicPr>
+        <p:blipFill>
+          <a:blip r:embed="rId2">
+            <a:extLst>
+              <a:ext uri="{28A0092B-C50C-407E-A947-70E740481C1C}">
+                <a14:useLocalDpi xmlns:a14="http://schemas.microsoft.com/office/drawing/2010/main" val="0"/>
+              </a:ext>
+            </a:extLst>
+          </a:blip>
+          <a:stretch>
+            <a:fillRect/>
+          </a:stretch>
+        </p:blipFill>
+        <p:spPr>
+          <a:xfrm>
+            <a:off x="1292352" y="1983104"/>
+            <a:ext cx="6729984" cy="628970"/>
+          </a:xfrm>
+          <a:prstGeom prst="rect">
+            <a:avLst/>
+          </a:prstGeom>
+          <a:ln w="38100">
+            <a:solidFill>
+              <a:srgbClr val="0070C0"/>
+            </a:solidFill>
+            <a:prstDash val="dash"/>
+          </a:ln>
+        </p:spPr>
+      </p:pic>
+      <p:pic>
+        <p:nvPicPr>
+          <p:cNvPr id="3" name="Picture 2"/>
+          <p:cNvPicPr>
+            <a:picLocks noChangeAspect="1"/>
+          </p:cNvPicPr>
+          <p:nvPr/>
+        </p:nvPicPr>
+        <p:blipFill>
+          <a:blip r:embed="rId3">
+            <a:extLst>
+              <a:ext uri="{28A0092B-C50C-407E-A947-70E740481C1C}">
+                <a14:useLocalDpi xmlns:a14="http://schemas.microsoft.com/office/drawing/2010/main" val="0"/>
+              </a:ext>
+            </a:extLst>
+          </a:blip>
+          <a:stretch>
+            <a:fillRect/>
+          </a:stretch>
+        </p:blipFill>
+        <p:spPr>
+          <a:xfrm>
+            <a:off x="1097280" y="5625837"/>
+            <a:ext cx="10058400" cy="716193"/>
+          </a:xfrm>
+          <a:prstGeom prst="rect">
+            <a:avLst/>
+          </a:prstGeom>
+        </p:spPr>
+      </p:pic>
+      <p:pic>
+        <p:nvPicPr>
+          <p:cNvPr id="4" name="Picture 3"/>
+          <p:cNvPicPr>
+            <a:picLocks noChangeAspect="1"/>
+          </p:cNvPicPr>
+          <p:nvPr/>
+        </p:nvPicPr>
+        <p:blipFill>
+          <a:blip r:embed="rId4">
+            <a:extLst>
+              <a:ext uri="{28A0092B-C50C-407E-A947-70E740481C1C}">
+                <a14:useLocalDpi xmlns:a14="http://schemas.microsoft.com/office/drawing/2010/main" val="0"/>
+              </a:ext>
+            </a:extLst>
+          </a:blip>
+          <a:stretch>
+            <a:fillRect/>
+          </a:stretch>
+        </p:blipFill>
+        <p:spPr>
+          <a:xfrm>
+            <a:off x="163178" y="4422899"/>
+            <a:ext cx="11922348" cy="656448"/>
+          </a:xfrm>
+          <a:prstGeom prst="rect">
+            <a:avLst/>
+          </a:prstGeom>
+        </p:spPr>
+      </p:pic>
+      <p:pic>
+        <p:nvPicPr>
+          <p:cNvPr id="6" name="Picture 5"/>
+          <p:cNvPicPr>
+            <a:picLocks noChangeAspect="1"/>
+          </p:cNvPicPr>
+          <p:nvPr/>
+        </p:nvPicPr>
+        <p:blipFill>
+          <a:blip r:embed="rId5">
+            <a:extLst>
+              <a:ext uri="{28A0092B-C50C-407E-A947-70E740481C1C}">
+                <a14:useLocalDpi xmlns:a14="http://schemas.microsoft.com/office/drawing/2010/main" val="0"/>
+              </a:ext>
+            </a:extLst>
+          </a:blip>
+          <a:stretch>
+            <a:fillRect/>
+          </a:stretch>
+        </p:blipFill>
+        <p:spPr>
+          <a:xfrm>
+            <a:off x="1097280" y="3354932"/>
+            <a:ext cx="10058400" cy="641675"/>
+          </a:xfrm>
+          <a:prstGeom prst="rect">
+            <a:avLst/>
+          </a:prstGeom>
+        </p:spPr>
+      </p:pic>
+      <p:pic>
+        <p:nvPicPr>
+          <p:cNvPr id="9" name="Picture 8"/>
+          <p:cNvPicPr>
+            <a:picLocks noChangeAspect="1"/>
+          </p:cNvPicPr>
+          <p:nvPr/>
+        </p:nvPicPr>
+        <p:blipFill>
+          <a:blip r:embed="rId6">
+            <a:extLst>
+              <a:ext uri="{28A0092B-C50C-407E-A947-70E740481C1C}">
+                <a14:useLocalDpi xmlns:a14="http://schemas.microsoft.com/office/drawing/2010/main" val="0"/>
+              </a:ext>
+            </a:extLst>
+          </a:blip>
+          <a:stretch>
+            <a:fillRect/>
+          </a:stretch>
+        </p:blipFill>
+        <p:spPr>
+          <a:xfrm>
+            <a:off x="3387248" y="2834350"/>
+            <a:ext cx="4135216" cy="438197"/>
+          </a:xfrm>
+          <a:prstGeom prst="rect">
+            <a:avLst/>
+          </a:prstGeom>
+        </p:spPr>
+      </p:pic>
+      <p:sp>
+        <p:nvSpPr>
+          <p:cNvPr id="10" name="TextBox 9"/>
+          <p:cNvSpPr txBox="1"/>
+          <p:nvPr/>
+        </p:nvSpPr>
+        <p:spPr>
+          <a:xfrm>
+            <a:off x="1389888" y="2818064"/>
+            <a:ext cx="2001638" cy="461665"/>
+          </a:xfrm>
+          <a:prstGeom prst="rect">
+            <a:avLst/>
+          </a:prstGeom>
+          <a:noFill/>
+        </p:spPr>
+        <p:txBody>
+          <a:bodyPr wrap="none" rtlCol="0">
+            <a:spAutoFit/>
+          </a:bodyPr>
+          <a:lstStyle/>
+          <a:p>
+            <a:r>
+              <a:rPr lang="en-US" sz="2400" dirty="0" smtClean="0"/>
+              <a:t>Want to show:</a:t>
+            </a:r>
+            <a:endParaRPr lang="en-US" sz="2400" dirty="0"/>
+          </a:p>
+        </p:txBody>
+      </p:sp>
+      <p:pic>
+        <p:nvPicPr>
+          <p:cNvPr id="12" name="Picture 11"/>
+          <p:cNvPicPr>
+            <a:picLocks noChangeAspect="1"/>
+          </p:cNvPicPr>
+          <p:nvPr/>
+        </p:nvPicPr>
+        <p:blipFill>
+          <a:blip r:embed="rId7">
+            <a:extLst>
+              <a:ext uri="{28A0092B-C50C-407E-A947-70E740481C1C}">
+                <a14:useLocalDpi xmlns:a14="http://schemas.microsoft.com/office/drawing/2010/main" val="0"/>
+              </a:ext>
+            </a:extLst>
+          </a:blip>
+          <a:stretch>
+            <a:fillRect/>
+          </a:stretch>
+        </p:blipFill>
+        <p:spPr>
+          <a:xfrm>
+            <a:off x="4174164" y="3952259"/>
+            <a:ext cx="3848172" cy="470640"/>
+          </a:xfrm>
+          <a:prstGeom prst="rect">
+            <a:avLst/>
+          </a:prstGeom>
+          <a:ln w="12700">
+            <a:solidFill>
+              <a:srgbClr val="0070C0"/>
+            </a:solidFill>
+          </a:ln>
+        </p:spPr>
+      </p:pic>
+      <p:pic>
+        <p:nvPicPr>
+          <p:cNvPr id="13" name="Picture 12"/>
+          <p:cNvPicPr>
+            <a:picLocks noChangeAspect="1"/>
+          </p:cNvPicPr>
+          <p:nvPr/>
+        </p:nvPicPr>
+        <p:blipFill>
+          <a:blip r:embed="rId8">
+            <a:extLst>
+              <a:ext uri="{28A0092B-C50C-407E-A947-70E740481C1C}">
+                <a14:useLocalDpi xmlns:a14="http://schemas.microsoft.com/office/drawing/2010/main" val="0"/>
+              </a:ext>
+            </a:extLst>
+          </a:blip>
+          <a:stretch>
+            <a:fillRect/>
+          </a:stretch>
+        </p:blipFill>
+        <p:spPr>
+          <a:xfrm>
+            <a:off x="5454856" y="5006533"/>
+            <a:ext cx="2194560" cy="619304"/>
+          </a:xfrm>
+          <a:prstGeom prst="rect">
+            <a:avLst/>
+          </a:prstGeom>
+          <a:ln w="12700">
+            <a:solidFill>
+              <a:srgbClr val="0070C0"/>
+            </a:solidFill>
+          </a:ln>
+        </p:spPr>
+      </p:pic>
+      <p:cxnSp>
+        <p:nvCxnSpPr>
+          <p:cNvPr id="21" name="Straight Arrow Connector 20"/>
+          <p:cNvCxnSpPr/>
+          <p:nvPr/>
+        </p:nvCxnSpPr>
+        <p:spPr>
+          <a:xfrm>
+            <a:off x="6552136" y="4263620"/>
+            <a:ext cx="0" cy="354518"/>
+          </a:xfrm>
+          <a:prstGeom prst="straightConnector1">
+            <a:avLst/>
+          </a:prstGeom>
+          <a:ln w="57150">
+            <a:solidFill>
+              <a:srgbClr val="0070C0"/>
+            </a:solidFill>
+            <a:tailEnd type="triangle"/>
+          </a:ln>
+        </p:spPr>
+        <p:style>
+          <a:lnRef idx="1">
+            <a:schemeClr val="accent1"/>
+          </a:lnRef>
+          <a:fillRef idx="0">
+            <a:schemeClr val="accent1"/>
+          </a:fillRef>
+          <a:effectRef idx="0">
+            <a:schemeClr val="accent1"/>
+          </a:effectRef>
+          <a:fontRef idx="minor">
+            <a:schemeClr val="tx1"/>
+          </a:fontRef>
+        </p:style>
+      </p:cxnSp>
+      <p:cxnSp>
+        <p:nvCxnSpPr>
+          <p:cNvPr id="24" name="Straight Arrow Connector 23"/>
+          <p:cNvCxnSpPr/>
+          <p:nvPr/>
+        </p:nvCxnSpPr>
+        <p:spPr>
+          <a:xfrm>
+            <a:off x="6693934" y="5448578"/>
+            <a:ext cx="0" cy="354518"/>
+          </a:xfrm>
+          <a:prstGeom prst="straightConnector1">
+            <a:avLst/>
+          </a:prstGeom>
+          <a:ln w="57150">
+            <a:solidFill>
+              <a:srgbClr val="0070C0"/>
+            </a:solidFill>
+            <a:tailEnd type="triangle"/>
+          </a:ln>
+        </p:spPr>
+        <p:style>
+          <a:lnRef idx="1">
+            <a:schemeClr val="accent1"/>
+          </a:lnRef>
+          <a:fillRef idx="0">
+            <a:schemeClr val="accent1"/>
+          </a:fillRef>
+          <a:effectRef idx="0">
+            <a:schemeClr val="accent1"/>
+          </a:effectRef>
+          <a:fontRef idx="minor">
+            <a:schemeClr val="tx1"/>
+          </a:fontRef>
+        </p:style>
+      </p:cxnSp>
+    </p:spTree>
+    <p:extLst>
+      <p:ext uri="{BB962C8B-B14F-4D97-AF65-F5344CB8AC3E}">
+        <p14:creationId xmlns:p14="http://schemas.microsoft.com/office/powerpoint/2010/main" val="979769080"/>
+      </p:ext>
+    </p:extLst>
+  </p:cSld>
+  <p:clrMapOvr>
+    <a:masterClrMapping/>
+  </p:clrMapOvr>
+  <mc:AlternateContent xmlns:mc="http://schemas.openxmlformats.org/markup-compatibility/2006">
+    <mc:Choice xmlns:p14="http://schemas.microsoft.com/office/powerpoint/2010/main" Requires="p14">
+      <p:transition spd="slow" p14:dur="2000"/>
+    </mc:Choice>
+    <mc:Fallback>
+      <p:transition spd="slow"/>
+    </mc:Fallback>
+  </mc:AlternateContent>
+  <p:timing>
+    <p:tnLst>
+      <p:par>
+        <p:cTn id="1" dur="indefinite" restart="never" nodeType="tmRoot">
+          <p:childTnLst>
+            <p:seq concurrent="1" nextAc="seek">
+              <p:cTn id="2" dur="indefinite" nodeType="mainSeq">
+                <p:childTnLst>
+                  <p:par>
+                    <p:cTn id="3" fill="hold">
+                      <p:stCondLst>
+                        <p:cond delay="indefinite"/>
+                      </p:stCondLst>
+                      <p:childTnLst>
+                        <p:par>
+                          <p:cTn id="4" fill="hold">
+                            <p:stCondLst>
+                              <p:cond delay="0"/>
+                            </p:stCondLst>
+                            <p:childTnLst>
+                              <p:par>
+                                <p:cTn id="5" presetID="1" presetClass="entr" presetSubtype="0" fill="hold" nodeType="clickEffect">
+                                  <p:stCondLst>
+                                    <p:cond delay="0"/>
+                                  </p:stCondLst>
+                                  <p:childTnLst>
+                                    <p:set>
+                                      <p:cBhvr>
+                                        <p:cTn id="6" dur="1" fill="hold">
+                                          <p:stCondLst>
+                                            <p:cond delay="0"/>
+                                          </p:stCondLst>
+                                        </p:cTn>
+                                        <p:tgtEl>
+                                          <p:spTgt spid="6"/>
+                                        </p:tgtEl>
+                                        <p:attrNameLst>
+                                          <p:attrName>style.visibility</p:attrName>
+                                        </p:attrNameLst>
+                                      </p:cBhvr>
+                                      <p:to>
+                                        <p:strVal val="visible"/>
+                                      </p:to>
+                                    </p:set>
+                                  </p:childTnLst>
+                                </p:cTn>
+                              </p:par>
+                            </p:childTnLst>
+                          </p:cTn>
+                        </p:par>
+                      </p:childTnLst>
+                    </p:cTn>
+                  </p:par>
+                </p:childTnLst>
+              </p:cTn>
+              <p:prevCondLst>
+                <p:cond evt="onPrev" delay="0">
+                  <p:tgtEl>
+                    <p:sldTgt/>
+                  </p:tgtEl>
+                </p:cond>
+              </p:prevCondLst>
+              <p:nextCondLst>
+                <p:cond evt="onNext" delay="0">
+                  <p:tgtEl>
+                    <p:sldTgt/>
+                  </p:tgtEl>
+                </p:cond>
+              </p:nextCondLst>
+            </p:seq>
+          </p:childTnLst>
+        </p:cTn>
+      </p:par>
+    </p:tnLst>
+  </p:timing>
+</p:sld>
+</file>
+
+<file path=ppt/slides/slide15.xml><?xml version="1.0" encoding="utf-8"?>
+<p:sld xmlns:a="http://schemas.openxmlformats.org/drawingml/2006/main" xmlns:r="http://schemas.openxmlformats.org/officeDocument/2006/relationships" xmlns:p="http://schemas.openxmlformats.org/presentationml/2006/main">
+  <p:cSld>
+    <p:spTree>
+      <p:nvGrpSpPr>
+        <p:cNvPr id="1" name=""/>
+        <p:cNvGrpSpPr/>
+        <p:nvPr/>
+      </p:nvGrpSpPr>
+      <p:grpSpPr>
+        <a:xfrm>
+          <a:off x="0" y="0"/>
+          <a:ext cx="0" cy="0"/>
+          <a:chOff x="0" y="0"/>
+          <a:chExt cx="0" cy="0"/>
+        </a:xfrm>
+      </p:grpSpPr>
+      <p:pic>
+        <p:nvPicPr>
+          <p:cNvPr id="20" name="Picture 19"/>
+          <p:cNvPicPr>
+            <a:picLocks noChangeAspect="1"/>
+          </p:cNvPicPr>
+          <p:nvPr/>
+        </p:nvPicPr>
+        <p:blipFill>
+          <a:blip r:embed="rId2">
+            <a:extLst>
+              <a:ext uri="{28A0092B-C50C-407E-A947-70E740481C1C}">
+                <a14:useLocalDpi xmlns:a14="http://schemas.microsoft.com/office/drawing/2010/main" val="0"/>
+              </a:ext>
+            </a:extLst>
+          </a:blip>
+          <a:stretch>
+            <a:fillRect/>
+          </a:stretch>
+        </p:blipFill>
+        <p:spPr>
+          <a:xfrm>
+            <a:off x="1893929" y="4280521"/>
+            <a:ext cx="6145378" cy="1167981"/>
+          </a:xfrm>
+          <a:prstGeom prst="rect">
+            <a:avLst/>
+          </a:prstGeom>
+        </p:spPr>
+      </p:pic>
+      <p:pic>
+        <p:nvPicPr>
+          <p:cNvPr id="8" name="Picture 7"/>
+          <p:cNvPicPr>
+            <a:picLocks noChangeAspect="1"/>
+          </p:cNvPicPr>
+          <p:nvPr/>
+        </p:nvPicPr>
+        <p:blipFill>
+          <a:blip r:embed="rId3">
+            <a:extLst>
+              <a:ext uri="{28A0092B-C50C-407E-A947-70E740481C1C}">
+                <a14:useLocalDpi xmlns:a14="http://schemas.microsoft.com/office/drawing/2010/main" val="0"/>
+              </a:ext>
+            </a:extLst>
+          </a:blip>
+          <a:stretch>
+            <a:fillRect/>
+          </a:stretch>
+        </p:blipFill>
+        <p:spPr>
+          <a:xfrm>
+            <a:off x="3961572" y="2659337"/>
+            <a:ext cx="3019530" cy="885782"/>
+          </a:xfrm>
+          <a:prstGeom prst="rect">
+            <a:avLst/>
+          </a:prstGeom>
+        </p:spPr>
+      </p:pic>
+      <p:pic>
+        <p:nvPicPr>
+          <p:cNvPr id="7" name="Picture 6"/>
+          <p:cNvPicPr>
+            <a:picLocks noChangeAspect="1"/>
+          </p:cNvPicPr>
+          <p:nvPr/>
+        </p:nvPicPr>
+        <p:blipFill>
+          <a:blip r:embed="rId4">
+            <a:extLst>
+              <a:ext uri="{28A0092B-C50C-407E-A947-70E740481C1C}">
+                <a14:useLocalDpi xmlns:a14="http://schemas.microsoft.com/office/drawing/2010/main" val="0"/>
+              </a:ext>
+            </a:extLst>
+          </a:blip>
+          <a:stretch>
+            <a:fillRect/>
+          </a:stretch>
+        </p:blipFill>
+        <p:spPr>
+          <a:xfrm>
+            <a:off x="3577937" y="3463226"/>
+            <a:ext cx="3570290" cy="817295"/>
+          </a:xfrm>
+          <a:prstGeom prst="rect">
+            <a:avLst/>
+          </a:prstGeom>
+        </p:spPr>
+      </p:pic>
+      <p:sp>
+        <p:nvSpPr>
+          <p:cNvPr id="2" name="Title 1"/>
+          <p:cNvSpPr>
+            <a:spLocks noGrp="1"/>
+          </p:cNvSpPr>
+          <p:nvPr>
+            <p:ph type="title"/>
+          </p:nvPr>
+        </p:nvSpPr>
+        <p:spPr/>
+        <p:txBody>
+          <a:bodyPr/>
+          <a:lstStyle/>
+          <a:p>
+            <a:r>
+              <a:rPr lang="en-US" dirty="0" smtClean="0"/>
+              <a:t>Point Queries Error Bounds</a:t>
+            </a:r>
+            <a:endParaRPr lang="en-US" dirty="0"/>
+          </a:p>
+        </p:txBody>
+      </p:sp>
+      <p:pic>
+        <p:nvPicPr>
+          <p:cNvPr id="11" name="Picture 10"/>
+          <p:cNvPicPr>
+            <a:picLocks noChangeAspect="1"/>
+          </p:cNvPicPr>
+          <p:nvPr/>
+        </p:nvPicPr>
+        <p:blipFill>
+          <a:blip r:embed="rId5">
+            <a:extLst>
+              <a:ext uri="{28A0092B-C50C-407E-A947-70E740481C1C}">
+                <a14:useLocalDpi xmlns:a14="http://schemas.microsoft.com/office/drawing/2010/main" val="0"/>
+              </a:ext>
+            </a:extLst>
+          </a:blip>
+          <a:stretch>
+            <a:fillRect/>
+          </a:stretch>
+        </p:blipFill>
+        <p:spPr>
+          <a:xfrm>
+            <a:off x="1292352" y="1983104"/>
+            <a:ext cx="6729984" cy="628970"/>
+          </a:xfrm>
+          <a:prstGeom prst="rect">
+            <a:avLst/>
+          </a:prstGeom>
+          <a:ln w="38100">
+            <a:solidFill>
+              <a:srgbClr val="0070C0"/>
+            </a:solidFill>
+            <a:prstDash val="dash"/>
+          </a:ln>
+        </p:spPr>
+      </p:pic>
+      <p:pic>
+        <p:nvPicPr>
+          <p:cNvPr id="17" name="Picture 16"/>
+          <p:cNvPicPr>
+            <a:picLocks noChangeAspect="1"/>
+          </p:cNvPicPr>
+          <p:nvPr/>
+        </p:nvPicPr>
+        <p:blipFill>
+          <a:blip r:embed="rId6">
+            <a:extLst>
+              <a:ext uri="{28A0092B-C50C-407E-A947-70E740481C1C}">
+                <a14:useLocalDpi xmlns:a14="http://schemas.microsoft.com/office/drawing/2010/main" val="0"/>
+              </a:ext>
+            </a:extLst>
+          </a:blip>
+          <a:stretch>
+            <a:fillRect/>
+          </a:stretch>
+        </p:blipFill>
+        <p:spPr>
+          <a:xfrm>
+            <a:off x="1840992" y="5500446"/>
+            <a:ext cx="6835014" cy="601564"/>
+          </a:xfrm>
+          <a:prstGeom prst="rect">
+            <a:avLst/>
+          </a:prstGeom>
+        </p:spPr>
+      </p:pic>
+    </p:spTree>
+    <p:extLst>
+      <p:ext uri="{BB962C8B-B14F-4D97-AF65-F5344CB8AC3E}">
+        <p14:creationId xmlns:p14="http://schemas.microsoft.com/office/powerpoint/2010/main" val="814565429"/>
+      </p:ext>
+    </p:extLst>
+  </p:cSld>
+  <p:clrMapOvr>
+    <a:masterClrMapping/>
+  </p:clrMapOvr>
+  <mc:AlternateContent xmlns:mc="http://schemas.openxmlformats.org/markup-compatibility/2006">
+    <mc:Choice xmlns:p14="http://schemas.microsoft.com/office/powerpoint/2010/main" Requires="p14">
+      <p:transition spd="slow" p14:dur="2000"/>
+    </mc:Choice>
+    <mc:Fallback>
+      <p:transition spd="slow"/>
+    </mc:Fallback>
+  </mc:AlternateContent>
+  <p:timing>
+    <p:tnLst>
+      <p:par>
+        <p:cTn id="1" dur="indefinite" restart="never" nodeType="tmRoot">
+          <p:childTnLst>
+            <p:seq concurrent="1" nextAc="seek">
+              <p:cTn id="2" dur="indefinite" nodeType="mainSeq">
+                <p:childTnLst>
+                  <p:par>
+                    <p:cTn id="3" fill="hold">
+                      <p:stCondLst>
+                        <p:cond delay="indefinite"/>
+                      </p:stCondLst>
+                      <p:childTnLst>
+                        <p:par>
+                          <p:cTn id="4" fill="hold">
+                            <p:stCondLst>
+                              <p:cond delay="0"/>
+                            </p:stCondLst>
+                            <p:childTnLst>
+                              <p:par>
+                                <p:cTn id="5" presetID="1" presetClass="entr" presetSubtype="0" fill="hold" nodeType="clickEffect">
+                                  <p:stCondLst>
+                                    <p:cond delay="0"/>
+                                  </p:stCondLst>
+                                  <p:childTnLst>
+                                    <p:set>
+                                      <p:cBhvr>
+                                        <p:cTn id="6" dur="1" fill="hold">
+                                          <p:stCondLst>
+                                            <p:cond delay="0"/>
+                                          </p:stCondLst>
+                                        </p:cTn>
+                                        <p:tgtEl>
+                                          <p:spTgt spid="7"/>
+                                        </p:tgtEl>
+                                        <p:attrNameLst>
+                                          <p:attrName>style.visibility</p:attrName>
+                                        </p:attrNameLst>
+                                      </p:cBhvr>
+                                      <p:to>
+                                        <p:strVal val="visible"/>
+                                      </p:to>
+                                    </p:set>
+                                  </p:childTnLst>
+                                </p:cTn>
+                              </p:par>
+                            </p:childTnLst>
+                          </p:cTn>
+                        </p:par>
+                      </p:childTnLst>
+                    </p:cTn>
+                  </p:par>
+                  <p:par>
+                    <p:cTn id="7" fill="hold">
+                      <p:stCondLst>
+                        <p:cond delay="indefinite"/>
+                      </p:stCondLst>
+                      <p:childTnLst>
+                        <p:par>
+                          <p:cTn id="8" fill="hold">
+                            <p:stCondLst>
+                              <p:cond delay="0"/>
+                            </p:stCondLst>
+                            <p:childTnLst>
+                              <p:par>
+                                <p:cTn id="9" presetID="1" presetClass="entr" presetSubtype="0" fill="hold" nodeType="clickEffect">
+                                  <p:stCondLst>
+                                    <p:cond delay="0"/>
+                                  </p:stCondLst>
+                                  <p:childTnLst>
+                                    <p:set>
+                                      <p:cBhvr>
+                                        <p:cTn id="10" dur="1" fill="hold">
+                                          <p:stCondLst>
+                                            <p:cond delay="0"/>
+                                          </p:stCondLst>
+                                        </p:cTn>
+                                        <p:tgtEl>
+                                          <p:spTgt spid="20"/>
+                                        </p:tgtEl>
+                                        <p:attrNameLst>
+                                          <p:attrName>style.visibility</p:attrName>
+                                        </p:attrNameLst>
+                                      </p:cBhvr>
+                                      <p:to>
+                                        <p:strVal val="visible"/>
+                                      </p:to>
+                                    </p:set>
+                                  </p:childTnLst>
+                                </p:cTn>
+                              </p:par>
+                            </p:childTnLst>
+                          </p:cTn>
+                        </p:par>
+                      </p:childTnLst>
+                    </p:cTn>
+                  </p:par>
+                  <p:par>
+                    <p:cTn id="11" fill="hold">
+                      <p:stCondLst>
+                        <p:cond delay="indefinite"/>
+                      </p:stCondLst>
+                      <p:childTnLst>
+                        <p:par>
+                          <p:cTn id="12" fill="hold">
+                            <p:stCondLst>
+                              <p:cond delay="0"/>
+                            </p:stCondLst>
+                            <p:childTnLst>
+                              <p:par>
+                                <p:cTn id="13" presetID="1" presetClass="entr" presetSubtype="0" fill="hold" nodeType="clickEffect">
+                                  <p:stCondLst>
+                                    <p:cond delay="0"/>
+                                  </p:stCondLst>
+                                  <p:childTnLst>
+                                    <p:set>
+                                      <p:cBhvr>
+                                        <p:cTn id="14" dur="1" fill="hold">
+                                          <p:stCondLst>
+                                            <p:cond delay="0"/>
+                                          </p:stCondLst>
+                                        </p:cTn>
+                                        <p:tgtEl>
+                                          <p:spTgt spid="17"/>
+                                        </p:tgtEl>
+                                        <p:attrNameLst>
+                                          <p:attrName>style.visibility</p:attrName>
+                                        </p:attrNameLst>
+                                      </p:cBhvr>
+                                      <p:to>
+                                        <p:strVal val="visible"/>
+                                      </p:to>
+                                    </p:set>
+                                  </p:childTnLst>
+                                </p:cTn>
+                              </p:par>
+                            </p:childTnLst>
+                          </p:cTn>
+                        </p:par>
+                      </p:childTnLst>
+                    </p:cTn>
+                  </p:par>
+                </p:childTnLst>
+              </p:cTn>
+              <p:prevCondLst>
+                <p:cond evt="onPrev" delay="0">
+                  <p:tgtEl>
+                    <p:sldTgt/>
+                  </p:tgtEl>
+                </p:cond>
+              </p:prevCondLst>
+              <p:nextCondLst>
+                <p:cond evt="onNext" delay="0">
+                  <p:tgtEl>
+                    <p:sldTgt/>
+                  </p:tgtEl>
+                </p:cond>
+              </p:nextCondLst>
+            </p:seq>
+          </p:childTnLst>
+        </p:cTn>
+      </p:par>
+    </p:tnLst>
+  </p:timing>
+</p:sld>
+</file>
+
+<file path=ppt/slides/slide16.xml><?xml version="1.0" encoding="utf-8"?>
+<p:sld xmlns:a="http://schemas.openxmlformats.org/drawingml/2006/main" xmlns:r="http://schemas.openxmlformats.org/officeDocument/2006/relationships" xmlns:p="http://schemas.openxmlformats.org/presentationml/2006/main">
+  <p:cSld>
+    <p:spTree>
+      <p:nvGrpSpPr>
+        <p:cNvPr id="1" name=""/>
+        <p:cNvGrpSpPr/>
+        <p:nvPr/>
+      </p:nvGrpSpPr>
+      <p:grpSpPr>
+        <a:xfrm>
+          <a:off x="0" y="0"/>
+          <a:ext cx="0" cy="0"/>
+          <a:chOff x="0" y="0"/>
+          <a:chExt cx="0" cy="0"/>
+        </a:xfrm>
+      </p:grpSpPr>
+      <p:sp>
+        <p:nvSpPr>
+          <p:cNvPr id="2" name="Title 1"/>
+          <p:cNvSpPr>
+            <a:spLocks noGrp="1"/>
+          </p:cNvSpPr>
+          <p:nvPr>
+            <p:ph type="title"/>
+          </p:nvPr>
+        </p:nvSpPr>
+        <p:spPr/>
+        <p:txBody>
+          <a:bodyPr/>
+          <a:lstStyle/>
+          <a:p>
+            <a:r>
+              <a:rPr lang="en-US" dirty="0" smtClean="0"/>
+              <a:t>Point Queries </a:t>
+            </a:r>
+            <a:r>
+              <a:rPr lang="en-US" dirty="0" smtClean="0"/>
+              <a:t>Space and Time Complexity</a:t>
+            </a:r>
+            <a:endParaRPr lang="en-US" dirty="0"/>
+          </a:p>
+        </p:txBody>
+      </p:sp>
+      <p:sp>
+        <p:nvSpPr>
+          <p:cNvPr id="3" name="TextBox 2"/>
+          <p:cNvSpPr txBox="1"/>
+          <p:nvPr/>
+        </p:nvSpPr>
+        <p:spPr>
+          <a:xfrm>
+            <a:off x="1255776" y="1938528"/>
+            <a:ext cx="4811125" cy="1200329"/>
+          </a:xfrm>
+          <a:prstGeom prst="rect">
+            <a:avLst/>
+          </a:prstGeom>
+          <a:noFill/>
+        </p:spPr>
+        <p:txBody>
+          <a:bodyPr wrap="none" rtlCol="0">
+            <a:spAutoFit/>
+          </a:bodyPr>
+          <a:lstStyle/>
+          <a:p>
+            <a:pPr marL="285750" indent="-285750">
+              <a:buFont typeface="Arial" charset="0"/>
+              <a:buChar char="•"/>
+            </a:pPr>
+            <a:r>
+              <a:rPr lang="en-US" sz="2400" dirty="0" smtClean="0"/>
+              <a:t>Time complexity for CMS updates: </a:t>
+            </a:r>
+          </a:p>
+          <a:p>
+            <a:pPr marL="285750" indent="-285750">
+              <a:buFont typeface="Arial" charset="0"/>
+              <a:buChar char="•"/>
+            </a:pPr>
+            <a:r>
+              <a:rPr lang="en-US" sz="2400" dirty="0" smtClean="0"/>
+              <a:t>Time complexity for point queries:</a:t>
+            </a:r>
+          </a:p>
+          <a:p>
+            <a:pPr marL="285750" indent="-285750">
+              <a:buFont typeface="Arial" charset="0"/>
+              <a:buChar char="•"/>
+            </a:pPr>
+            <a:r>
+              <a:rPr lang="en-US" sz="2400" dirty="0" smtClean="0"/>
+              <a:t>Space complexity for CMS: </a:t>
+            </a:r>
+          </a:p>
+        </p:txBody>
+      </p:sp>
+      <p:pic>
+        <p:nvPicPr>
+          <p:cNvPr id="4" name="Picture 3"/>
+          <p:cNvPicPr>
+            <a:picLocks noChangeAspect="1"/>
+          </p:cNvPicPr>
+          <p:nvPr/>
+        </p:nvPicPr>
+        <p:blipFill>
+          <a:blip r:embed="rId2">
+            <a:extLst>
+              <a:ext uri="{28A0092B-C50C-407E-A947-70E740481C1C}">
+                <a14:useLocalDpi xmlns:a14="http://schemas.microsoft.com/office/drawing/2010/main" val="0"/>
+              </a:ext>
+            </a:extLst>
+          </a:blip>
+          <a:stretch>
+            <a:fillRect/>
+          </a:stretch>
+        </p:blipFill>
+        <p:spPr>
+          <a:xfrm>
+            <a:off x="5925312" y="1877568"/>
+            <a:ext cx="1080808" cy="458525"/>
+          </a:xfrm>
+          <a:prstGeom prst="rect">
+            <a:avLst/>
+          </a:prstGeom>
+        </p:spPr>
+      </p:pic>
+      <p:pic>
+        <p:nvPicPr>
+          <p:cNvPr id="10" name="Picture 9"/>
+          <p:cNvPicPr>
+            <a:picLocks noChangeAspect="1"/>
+          </p:cNvPicPr>
+          <p:nvPr/>
+        </p:nvPicPr>
+        <p:blipFill>
+          <a:blip r:embed="rId2">
+            <a:extLst>
+              <a:ext uri="{28A0092B-C50C-407E-A947-70E740481C1C}">
+                <a14:useLocalDpi xmlns:a14="http://schemas.microsoft.com/office/drawing/2010/main" val="0"/>
+              </a:ext>
+            </a:extLst>
+          </a:blip>
+          <a:stretch>
+            <a:fillRect/>
+          </a:stretch>
+        </p:blipFill>
+        <p:spPr>
+          <a:xfrm>
+            <a:off x="5949696" y="2333813"/>
+            <a:ext cx="1080808" cy="458525"/>
+          </a:xfrm>
+          <a:prstGeom prst="rect">
+            <a:avLst/>
+          </a:prstGeom>
+        </p:spPr>
+      </p:pic>
+      <p:pic>
+        <p:nvPicPr>
+          <p:cNvPr id="5" name="Picture 4"/>
+          <p:cNvPicPr>
+            <a:picLocks noChangeAspect="1"/>
+          </p:cNvPicPr>
+          <p:nvPr/>
+        </p:nvPicPr>
+        <p:blipFill>
+          <a:blip r:embed="rId3">
+            <a:extLst>
+              <a:ext uri="{28A0092B-C50C-407E-A947-70E740481C1C}">
+                <a14:useLocalDpi xmlns:a14="http://schemas.microsoft.com/office/drawing/2010/main" val="0"/>
+              </a:ext>
+            </a:extLst>
+          </a:blip>
+          <a:stretch>
+            <a:fillRect/>
+          </a:stretch>
+        </p:blipFill>
+        <p:spPr>
+          <a:xfrm>
+            <a:off x="4973354" y="2678054"/>
+            <a:ext cx="1290248" cy="460803"/>
+          </a:xfrm>
+          <a:prstGeom prst="rect">
+            <a:avLst/>
+          </a:prstGeom>
+        </p:spPr>
+      </p:pic>
+      <p:grpSp>
+        <p:nvGrpSpPr>
+          <p:cNvPr id="14" name="Group 13"/>
+          <p:cNvGrpSpPr/>
+          <p:nvPr/>
+        </p:nvGrpSpPr>
+        <p:grpSpPr>
+          <a:xfrm>
+            <a:off x="4488086" y="3109207"/>
+            <a:ext cx="5108115" cy="2545596"/>
+            <a:chOff x="2023871" y="1948455"/>
+            <a:chExt cx="5108115" cy="2545596"/>
+          </a:xfrm>
+        </p:grpSpPr>
+        <p:sp>
+          <p:nvSpPr>
+            <p:cNvPr id="15" name="Rectangle 14"/>
+            <p:cNvSpPr/>
+            <p:nvPr/>
+          </p:nvSpPr>
+          <p:spPr>
+            <a:xfrm>
+              <a:off x="3826229" y="3098701"/>
+              <a:ext cx="3305755" cy="359094"/>
+            </a:xfrm>
+            <a:prstGeom prst="rect">
+              <a:avLst/>
+            </a:prstGeom>
+            <a:solidFill>
+              <a:schemeClr val="bg1"/>
+            </a:solidFill>
+            <a:ln>
+              <a:solidFill>
+                <a:schemeClr val="dk1"/>
+              </a:solidFill>
+            </a:ln>
+          </p:spPr>
+          <p:style>
+            <a:lnRef idx="2">
+              <a:schemeClr val="accent1">
+                <a:shade val="50000"/>
+              </a:schemeClr>
+            </a:lnRef>
+            <a:fillRef idx="1">
+              <a:schemeClr val="accent1"/>
+            </a:fillRef>
+            <a:effectRef idx="0">
+              <a:schemeClr val="accent1"/>
+            </a:effectRef>
+            <a:fontRef idx="minor">
+              <a:schemeClr val="lt1"/>
+            </a:fontRef>
+          </p:style>
+          <p:txBody>
+            <a:bodyPr lIns="9144" tIns="45720" rIns="0" bIns="0" rtlCol="0" anchor="t" anchorCtr="0"/>
+            <a:lstStyle/>
+            <a:p>
+              <a:r>
+                <a:rPr lang="en-US" dirty="0" smtClean="0">
+                  <a:solidFill>
+                    <a:schemeClr val="tx1"/>
+                  </a:solidFill>
+                </a:rPr>
+                <a:t>  0     0     0     0     0     0     0     0    0</a:t>
+              </a:r>
+              <a:endParaRPr lang="en-US" dirty="0">
+                <a:solidFill>
+                  <a:schemeClr val="tx1"/>
+                </a:solidFill>
+              </a:endParaRPr>
+            </a:p>
+          </p:txBody>
+        </p:sp>
+        <p:sp>
+          <p:nvSpPr>
+            <p:cNvPr id="16" name="Rectangle 15"/>
+            <p:cNvSpPr/>
+            <p:nvPr/>
+          </p:nvSpPr>
+          <p:spPr>
+            <a:xfrm>
+              <a:off x="3826229" y="3452023"/>
+              <a:ext cx="3305755" cy="359094"/>
+            </a:xfrm>
+            <a:prstGeom prst="rect">
+              <a:avLst/>
+            </a:prstGeom>
+            <a:solidFill>
+              <a:schemeClr val="bg1"/>
+            </a:solidFill>
+            <a:ln>
+              <a:solidFill>
+                <a:schemeClr val="dk1"/>
+              </a:solidFill>
+            </a:ln>
+          </p:spPr>
+          <p:style>
+            <a:lnRef idx="2">
+              <a:schemeClr val="accent1">
+                <a:shade val="50000"/>
+              </a:schemeClr>
+            </a:lnRef>
+            <a:fillRef idx="1">
+              <a:schemeClr val="accent1"/>
+            </a:fillRef>
+            <a:effectRef idx="0">
+              <a:schemeClr val="accent1"/>
+            </a:effectRef>
+            <a:fontRef idx="minor">
+              <a:schemeClr val="lt1"/>
+            </a:fontRef>
+          </p:style>
+          <p:txBody>
+            <a:bodyPr lIns="9144" tIns="45720" rIns="0" bIns="0" rtlCol="0" anchor="t" anchorCtr="0"/>
+            <a:lstStyle/>
+            <a:p>
+              <a:r>
+                <a:rPr lang="en-US" dirty="0" smtClean="0">
+                  <a:solidFill>
+                    <a:schemeClr val="tx1"/>
+                  </a:solidFill>
+                </a:rPr>
+                <a:t>  0     0     0     0     0     0     0     0    0</a:t>
+              </a:r>
+              <a:endParaRPr lang="en-US" dirty="0">
+                <a:solidFill>
+                  <a:schemeClr val="tx1"/>
+                </a:solidFill>
+              </a:endParaRPr>
+            </a:p>
+          </p:txBody>
+        </p:sp>
+        <p:sp>
+          <p:nvSpPr>
+            <p:cNvPr id="18" name="Rectangle 17"/>
+            <p:cNvSpPr/>
+            <p:nvPr/>
+          </p:nvSpPr>
+          <p:spPr>
+            <a:xfrm>
+              <a:off x="3826228" y="3804038"/>
+              <a:ext cx="3305755" cy="347806"/>
+            </a:xfrm>
+            <a:prstGeom prst="rect">
+              <a:avLst/>
+            </a:prstGeom>
+            <a:solidFill>
+              <a:schemeClr val="bg1"/>
+            </a:solidFill>
+            <a:ln>
+              <a:solidFill>
+                <a:schemeClr val="dk1"/>
+              </a:solidFill>
+            </a:ln>
+          </p:spPr>
+          <p:style>
+            <a:lnRef idx="2">
+              <a:schemeClr val="accent1">
+                <a:shade val="50000"/>
+              </a:schemeClr>
+            </a:lnRef>
+            <a:fillRef idx="1">
+              <a:schemeClr val="accent1"/>
+            </a:fillRef>
+            <a:effectRef idx="0">
+              <a:schemeClr val="accent1"/>
+            </a:effectRef>
+            <a:fontRef idx="minor">
+              <a:schemeClr val="lt1"/>
+            </a:fontRef>
+          </p:style>
+          <p:txBody>
+            <a:bodyPr lIns="9144" tIns="45720" rIns="0" bIns="0" rtlCol="0" anchor="t" anchorCtr="0"/>
+            <a:lstStyle/>
+            <a:p>
+              <a:r>
+                <a:rPr lang="en-US" dirty="0" smtClean="0">
+                  <a:solidFill>
+                    <a:schemeClr val="tx1"/>
+                  </a:solidFill>
+                </a:rPr>
+                <a:t>  0     0     0     0     0     0     0     0    0</a:t>
+              </a:r>
+              <a:endParaRPr lang="en-US" dirty="0">
+                <a:solidFill>
+                  <a:schemeClr val="tx1"/>
+                </a:solidFill>
+              </a:endParaRPr>
+            </a:p>
+          </p:txBody>
+        </p:sp>
+        <p:sp>
+          <p:nvSpPr>
+            <p:cNvPr id="19" name="Rectangle 18"/>
+            <p:cNvSpPr/>
+            <p:nvPr/>
+          </p:nvSpPr>
+          <p:spPr>
+            <a:xfrm>
+              <a:off x="3826226" y="4134957"/>
+              <a:ext cx="3305755" cy="359094"/>
+            </a:xfrm>
+            <a:prstGeom prst="rect">
+              <a:avLst/>
+            </a:prstGeom>
+            <a:solidFill>
+              <a:schemeClr val="bg1"/>
+            </a:solidFill>
+            <a:ln>
+              <a:solidFill>
+                <a:schemeClr val="dk1"/>
+              </a:solidFill>
+            </a:ln>
+          </p:spPr>
+          <p:style>
+            <a:lnRef idx="2">
+              <a:schemeClr val="accent1">
+                <a:shade val="50000"/>
+              </a:schemeClr>
+            </a:lnRef>
+            <a:fillRef idx="1">
+              <a:schemeClr val="accent1"/>
+            </a:fillRef>
+            <a:effectRef idx="0">
+              <a:schemeClr val="accent1"/>
+            </a:effectRef>
+            <a:fontRef idx="minor">
+              <a:schemeClr val="lt1"/>
+            </a:fontRef>
+          </p:style>
+          <p:txBody>
+            <a:bodyPr lIns="9144" tIns="45720" rIns="0" bIns="0" rtlCol="0" anchor="t" anchorCtr="0"/>
+            <a:lstStyle/>
+            <a:p>
+              <a:r>
+                <a:rPr lang="en-US" dirty="0" smtClean="0">
+                  <a:solidFill>
+                    <a:schemeClr val="tx1"/>
+                  </a:solidFill>
+                </a:rPr>
+                <a:t>  0     0     0     0     0     0     0     0    0</a:t>
+              </a:r>
+              <a:endParaRPr lang="en-US" dirty="0">
+                <a:solidFill>
+                  <a:schemeClr val="tx1"/>
+                </a:solidFill>
+              </a:endParaRPr>
+            </a:p>
+          </p:txBody>
+        </p:sp>
+        <p:grpSp>
+          <p:nvGrpSpPr>
+            <p:cNvPr id="21" name="Group 20"/>
+            <p:cNvGrpSpPr/>
+            <p:nvPr/>
+          </p:nvGrpSpPr>
+          <p:grpSpPr>
+            <a:xfrm>
+              <a:off x="3826231" y="2740907"/>
+              <a:ext cx="3305755" cy="1753144"/>
+              <a:chOff x="3826231" y="2740907"/>
+              <a:chExt cx="3305755" cy="1911164"/>
+            </a:xfrm>
+          </p:grpSpPr>
+          <p:sp>
+            <p:nvSpPr>
+              <p:cNvPr id="26" name="TextBox 25"/>
+              <p:cNvSpPr txBox="1"/>
+              <p:nvPr/>
+            </p:nvSpPr>
+            <p:spPr>
+              <a:xfrm>
+                <a:off x="5283308" y="2740914"/>
+                <a:ext cx="209210" cy="402622"/>
+              </a:xfrm>
+              <a:prstGeom prst="rect">
+                <a:avLst/>
+              </a:prstGeom>
+              <a:noFill/>
+              <a:ln>
+                <a:solidFill>
+                  <a:schemeClr val="dk1"/>
+                </a:solidFill>
+              </a:ln>
+            </p:spPr>
+            <p:txBody>
+              <a:bodyPr wrap="none" lIns="9144" rtlCol="0">
+                <a:spAutoFit/>
+              </a:bodyPr>
+              <a:lstStyle/>
+              <a:p>
+                <a:r>
+                  <a:rPr lang="en-US" dirty="0" smtClean="0"/>
+                  <a:t>  </a:t>
+                </a:r>
+                <a:endParaRPr lang="en-US" dirty="0"/>
+              </a:p>
+            </p:txBody>
+          </p:sp>
+          <p:sp>
+            <p:nvSpPr>
+              <p:cNvPr id="27" name="Rectangle 26"/>
+              <p:cNvSpPr/>
+              <p:nvPr/>
+            </p:nvSpPr>
+            <p:spPr>
+              <a:xfrm>
+                <a:off x="3826231" y="2740914"/>
+                <a:ext cx="3305755" cy="401353"/>
+              </a:xfrm>
+              <a:prstGeom prst="rect">
+                <a:avLst/>
+              </a:prstGeom>
+              <a:solidFill>
+                <a:schemeClr val="bg1"/>
+              </a:solidFill>
+              <a:ln>
+                <a:solidFill>
+                  <a:schemeClr val="dk1"/>
+                </a:solidFill>
+              </a:ln>
+            </p:spPr>
+            <p:style>
+              <a:lnRef idx="2">
+                <a:schemeClr val="accent1">
+                  <a:shade val="50000"/>
+                </a:schemeClr>
+              </a:lnRef>
+              <a:fillRef idx="1">
+                <a:schemeClr val="accent1"/>
+              </a:fillRef>
+              <a:effectRef idx="0">
+                <a:schemeClr val="accent1"/>
+              </a:effectRef>
+              <a:fontRef idx="minor">
+                <a:schemeClr val="lt1"/>
+              </a:fontRef>
+            </p:style>
+            <p:txBody>
+              <a:bodyPr lIns="9144" tIns="45720" rIns="0" bIns="0" rtlCol="0" anchor="t" anchorCtr="0"/>
+              <a:lstStyle/>
+              <a:p>
+                <a:r>
+                  <a:rPr lang="en-US" dirty="0" smtClean="0">
+                    <a:solidFill>
+                      <a:schemeClr val="tx1"/>
+                    </a:solidFill>
+                  </a:rPr>
+                  <a:t>  0     0     0     0     0     0     0     0    0</a:t>
+                </a:r>
+                <a:endParaRPr lang="en-US" dirty="0">
+                  <a:solidFill>
+                    <a:schemeClr val="tx1"/>
+                  </a:solidFill>
+                </a:endParaRPr>
+              </a:p>
+            </p:txBody>
+          </p:sp>
+          <p:cxnSp>
+            <p:nvCxnSpPr>
+              <p:cNvPr id="28" name="Straight Connector 27"/>
+              <p:cNvCxnSpPr/>
+              <p:nvPr/>
+            </p:nvCxnSpPr>
+            <p:spPr>
+              <a:xfrm flipH="1">
+                <a:off x="4152514" y="2750852"/>
+                <a:ext cx="14910" cy="1901219"/>
+              </a:xfrm>
+              <a:prstGeom prst="line">
+                <a:avLst/>
+              </a:prstGeom>
+              <a:ln>
+                <a:solidFill>
+                  <a:schemeClr val="dk1"/>
+                </a:solidFill>
+              </a:ln>
+            </p:spPr>
+            <p:style>
+              <a:lnRef idx="1">
+                <a:schemeClr val="dk1"/>
+              </a:lnRef>
+              <a:fillRef idx="0">
+                <a:schemeClr val="dk1"/>
+              </a:fillRef>
+              <a:effectRef idx="0">
+                <a:schemeClr val="dk1"/>
+              </a:effectRef>
+              <a:fontRef idx="minor">
+                <a:schemeClr val="tx1"/>
+              </a:fontRef>
+            </p:style>
+          </p:cxnSp>
+          <p:cxnSp>
+            <p:nvCxnSpPr>
+              <p:cNvPr id="29" name="Straight Connector 28"/>
+              <p:cNvCxnSpPr/>
+              <p:nvPr/>
+            </p:nvCxnSpPr>
+            <p:spPr>
+              <a:xfrm flipH="1">
+                <a:off x="4530018" y="2750852"/>
+                <a:ext cx="14910" cy="1901219"/>
+              </a:xfrm>
+              <a:prstGeom prst="line">
+                <a:avLst/>
+              </a:prstGeom>
+              <a:ln>
+                <a:solidFill>
+                  <a:schemeClr val="dk1"/>
+                </a:solidFill>
+              </a:ln>
+            </p:spPr>
+            <p:style>
+              <a:lnRef idx="1">
+                <a:schemeClr val="dk1"/>
+              </a:lnRef>
+              <a:fillRef idx="0">
+                <a:schemeClr val="dk1"/>
+              </a:fillRef>
+              <a:effectRef idx="0">
+                <a:schemeClr val="dk1"/>
+              </a:effectRef>
+              <a:fontRef idx="minor">
+                <a:schemeClr val="tx1"/>
+              </a:fontRef>
+            </p:style>
+          </p:cxnSp>
+          <p:cxnSp>
+            <p:nvCxnSpPr>
+              <p:cNvPr id="30" name="Straight Connector 29"/>
+              <p:cNvCxnSpPr/>
+              <p:nvPr/>
+            </p:nvCxnSpPr>
+            <p:spPr>
+              <a:xfrm flipH="1">
+                <a:off x="4908602" y="2750852"/>
+                <a:ext cx="14910" cy="1901219"/>
+              </a:xfrm>
+              <a:prstGeom prst="line">
+                <a:avLst/>
+              </a:prstGeom>
+              <a:ln>
+                <a:solidFill>
+                  <a:schemeClr val="dk1"/>
+                </a:solidFill>
+              </a:ln>
+            </p:spPr>
+            <p:style>
+              <a:lnRef idx="1">
+                <a:schemeClr val="dk1"/>
+              </a:lnRef>
+              <a:fillRef idx="0">
+                <a:schemeClr val="dk1"/>
+              </a:fillRef>
+              <a:effectRef idx="0">
+                <a:schemeClr val="dk1"/>
+              </a:effectRef>
+              <a:fontRef idx="minor">
+                <a:schemeClr val="tx1"/>
+              </a:fontRef>
+            </p:style>
+          </p:cxnSp>
+          <p:cxnSp>
+            <p:nvCxnSpPr>
+              <p:cNvPr id="31" name="Straight Connector 30"/>
+              <p:cNvCxnSpPr/>
+              <p:nvPr/>
+            </p:nvCxnSpPr>
+            <p:spPr>
+              <a:xfrm flipH="1">
+                <a:off x="5287186" y="2750850"/>
+                <a:ext cx="14910" cy="1901219"/>
+              </a:xfrm>
+              <a:prstGeom prst="line">
+                <a:avLst/>
+              </a:prstGeom>
+              <a:ln>
+                <a:solidFill>
+                  <a:schemeClr val="dk1"/>
+                </a:solidFill>
+              </a:ln>
+            </p:spPr>
+            <p:style>
+              <a:lnRef idx="1">
+                <a:schemeClr val="dk1"/>
+              </a:lnRef>
+              <a:fillRef idx="0">
+                <a:schemeClr val="dk1"/>
+              </a:fillRef>
+              <a:effectRef idx="0">
+                <a:schemeClr val="dk1"/>
+              </a:effectRef>
+              <a:fontRef idx="minor">
+                <a:schemeClr val="tx1"/>
+              </a:fontRef>
+            </p:style>
+          </p:cxnSp>
+          <p:cxnSp>
+            <p:nvCxnSpPr>
+              <p:cNvPr id="32" name="Straight Connector 31"/>
+              <p:cNvCxnSpPr/>
+              <p:nvPr/>
+            </p:nvCxnSpPr>
+            <p:spPr>
+              <a:xfrm flipH="1">
+                <a:off x="5651637" y="2750850"/>
+                <a:ext cx="14910" cy="1901219"/>
+              </a:xfrm>
+              <a:prstGeom prst="line">
+                <a:avLst/>
+              </a:prstGeom>
+              <a:ln>
+                <a:solidFill>
+                  <a:schemeClr val="dk1"/>
+                </a:solidFill>
+              </a:ln>
+            </p:spPr>
+            <p:style>
+              <a:lnRef idx="1">
+                <a:schemeClr val="dk1"/>
+              </a:lnRef>
+              <a:fillRef idx="0">
+                <a:schemeClr val="dk1"/>
+              </a:fillRef>
+              <a:effectRef idx="0">
+                <a:schemeClr val="dk1"/>
+              </a:effectRef>
+              <a:fontRef idx="minor">
+                <a:schemeClr val="tx1"/>
+              </a:fontRef>
+            </p:style>
+          </p:cxnSp>
+          <p:cxnSp>
+            <p:nvCxnSpPr>
+              <p:cNvPr id="33" name="Straight Connector 32"/>
+              <p:cNvCxnSpPr/>
+              <p:nvPr/>
+            </p:nvCxnSpPr>
+            <p:spPr>
+              <a:xfrm flipH="1">
+                <a:off x="6765572" y="2750850"/>
+                <a:ext cx="14910" cy="1901219"/>
+              </a:xfrm>
+              <a:prstGeom prst="line">
+                <a:avLst/>
+              </a:prstGeom>
+              <a:ln>
+                <a:solidFill>
+                  <a:schemeClr val="dk1"/>
+                </a:solidFill>
+              </a:ln>
+            </p:spPr>
+            <p:style>
+              <a:lnRef idx="1">
+                <a:schemeClr val="dk1"/>
+              </a:lnRef>
+              <a:fillRef idx="0">
+                <a:schemeClr val="dk1"/>
+              </a:fillRef>
+              <a:effectRef idx="0">
+                <a:schemeClr val="dk1"/>
+              </a:effectRef>
+              <a:fontRef idx="minor">
+                <a:schemeClr val="tx1"/>
+              </a:fontRef>
+            </p:style>
+          </p:cxnSp>
+          <p:cxnSp>
+            <p:nvCxnSpPr>
+              <p:cNvPr id="34" name="Straight Connector 33"/>
+              <p:cNvCxnSpPr/>
+              <p:nvPr/>
+            </p:nvCxnSpPr>
+            <p:spPr>
+              <a:xfrm flipH="1">
+                <a:off x="6018343" y="2740908"/>
+                <a:ext cx="14910" cy="1901219"/>
+              </a:xfrm>
+              <a:prstGeom prst="line">
+                <a:avLst/>
+              </a:prstGeom>
+              <a:ln>
+                <a:solidFill>
+                  <a:schemeClr val="dk1"/>
+                </a:solidFill>
+              </a:ln>
+            </p:spPr>
+            <p:style>
+              <a:lnRef idx="1">
+                <a:schemeClr val="dk1"/>
+              </a:lnRef>
+              <a:fillRef idx="0">
+                <a:schemeClr val="dk1"/>
+              </a:fillRef>
+              <a:effectRef idx="0">
+                <a:schemeClr val="dk1"/>
+              </a:effectRef>
+              <a:fontRef idx="minor">
+                <a:schemeClr val="tx1"/>
+              </a:fontRef>
+            </p:style>
+          </p:cxnSp>
+          <p:cxnSp>
+            <p:nvCxnSpPr>
+              <p:cNvPr id="35" name="Straight Connector 34"/>
+              <p:cNvCxnSpPr/>
+              <p:nvPr/>
+            </p:nvCxnSpPr>
+            <p:spPr>
+              <a:xfrm flipH="1">
+                <a:off x="6396927" y="2740907"/>
+                <a:ext cx="14910" cy="1901219"/>
+              </a:xfrm>
+              <a:prstGeom prst="line">
+                <a:avLst/>
+              </a:prstGeom>
+              <a:ln>
+                <a:solidFill>
+                  <a:schemeClr val="dk1"/>
+                </a:solidFill>
+              </a:ln>
+            </p:spPr>
+            <p:style>
+              <a:lnRef idx="1">
+                <a:schemeClr val="dk1"/>
+              </a:lnRef>
+              <a:fillRef idx="0">
+                <a:schemeClr val="dk1"/>
+              </a:fillRef>
+              <a:effectRef idx="0">
+                <a:schemeClr val="dk1"/>
+              </a:effectRef>
+              <a:fontRef idx="minor">
+                <a:schemeClr val="tx1"/>
+              </a:fontRef>
+            </p:style>
+          </p:cxnSp>
+        </p:grpSp>
+        <p:cxnSp>
+          <p:nvCxnSpPr>
+            <p:cNvPr id="22" name="Straight Connector 21"/>
+            <p:cNvCxnSpPr/>
+            <p:nvPr/>
+          </p:nvCxnSpPr>
+          <p:spPr>
+            <a:xfrm flipV="1">
+              <a:off x="3826229" y="2595376"/>
+              <a:ext cx="3305755" cy="4403"/>
+            </a:xfrm>
+            <a:prstGeom prst="line">
+              <a:avLst/>
+            </a:prstGeom>
+            <a:ln w="19050">
+              <a:solidFill>
+                <a:schemeClr val="dk1"/>
+              </a:solidFill>
+              <a:headEnd type="triangle" w="lg" len="sm"/>
+              <a:tailEnd type="triangle" w="lg" len="sm"/>
+            </a:ln>
+          </p:spPr>
+          <p:style>
+            <a:lnRef idx="1">
+              <a:schemeClr val="dk1"/>
+            </a:lnRef>
+            <a:fillRef idx="0">
+              <a:schemeClr val="dk1"/>
+            </a:fillRef>
+            <a:effectRef idx="0">
+              <a:schemeClr val="dk1"/>
+            </a:effectRef>
+            <a:fontRef idx="minor">
+              <a:schemeClr val="tx1"/>
+            </a:fontRef>
+          </p:style>
+        </p:cxnSp>
+        <p:cxnSp>
+          <p:nvCxnSpPr>
+            <p:cNvPr id="23" name="Straight Connector 22"/>
+            <p:cNvCxnSpPr/>
+            <p:nvPr/>
+          </p:nvCxnSpPr>
+          <p:spPr>
+            <a:xfrm flipH="1" flipV="1">
+              <a:off x="3634331" y="2759467"/>
+              <a:ext cx="0" cy="1725461"/>
+            </a:xfrm>
+            <a:prstGeom prst="line">
+              <a:avLst/>
+            </a:prstGeom>
+            <a:ln w="19050">
+              <a:solidFill>
+                <a:schemeClr val="dk1"/>
+              </a:solidFill>
+              <a:headEnd type="triangle" w="lg" len="sm"/>
+              <a:tailEnd type="triangle" w="lg" len="sm"/>
+            </a:ln>
+          </p:spPr>
+          <p:style>
+            <a:lnRef idx="1">
+              <a:schemeClr val="dk1"/>
+            </a:lnRef>
+            <a:fillRef idx="0">
+              <a:schemeClr val="dk1"/>
+            </a:fillRef>
+            <a:effectRef idx="0">
+              <a:schemeClr val="dk1"/>
+            </a:effectRef>
+            <a:fontRef idx="minor">
+              <a:schemeClr val="tx1"/>
+            </a:fontRef>
+          </p:style>
+        </p:cxnSp>
+        <p:pic>
+          <p:nvPicPr>
+            <p:cNvPr id="24" name="Picture 23"/>
+            <p:cNvPicPr>
+              <a:picLocks noChangeAspect="1"/>
+            </p:cNvPicPr>
+            <p:nvPr/>
+          </p:nvPicPr>
+          <p:blipFill>
+            <a:blip r:embed="rId4">
+              <a:extLst>
+                <a:ext uri="{28A0092B-C50C-407E-A947-70E740481C1C}">
+                  <a14:useLocalDpi xmlns:a14="http://schemas.microsoft.com/office/drawing/2010/main" val="0"/>
+                </a:ext>
+              </a:extLst>
+            </a:blip>
+            <a:stretch>
+              <a:fillRect/>
+            </a:stretch>
+          </p:blipFill>
+          <p:spPr>
+            <a:xfrm>
+              <a:off x="4458403" y="1948455"/>
+              <a:ext cx="1687386" cy="641086"/>
+            </a:xfrm>
+            <a:prstGeom prst="rect">
+              <a:avLst/>
+            </a:prstGeom>
+          </p:spPr>
+        </p:pic>
+        <p:pic>
+          <p:nvPicPr>
+            <p:cNvPr id="25" name="Picture 24"/>
+            <p:cNvPicPr>
+              <a:picLocks noChangeAspect="1"/>
+            </p:cNvPicPr>
+            <p:nvPr/>
+          </p:nvPicPr>
+          <p:blipFill>
+            <a:blip r:embed="rId5">
+              <a:extLst>
+                <a:ext uri="{28A0092B-C50C-407E-A947-70E740481C1C}">
+                  <a14:useLocalDpi xmlns:a14="http://schemas.microsoft.com/office/drawing/2010/main" val="0"/>
+                </a:ext>
+              </a:extLst>
+            </a:blip>
+            <a:stretch>
+              <a:fillRect/>
+            </a:stretch>
+          </p:blipFill>
+          <p:spPr>
+            <a:xfrm>
+              <a:off x="2023871" y="3441723"/>
+              <a:ext cx="1568404" cy="519471"/>
+            </a:xfrm>
+            <a:prstGeom prst="rect">
+              <a:avLst/>
+            </a:prstGeom>
+          </p:spPr>
+        </p:pic>
+      </p:grpSp>
+      <p:grpSp>
+        <p:nvGrpSpPr>
+          <p:cNvPr id="36" name="Group 35"/>
+          <p:cNvGrpSpPr/>
+          <p:nvPr/>
+        </p:nvGrpSpPr>
+        <p:grpSpPr>
+          <a:xfrm>
+            <a:off x="9898611" y="3736005"/>
+            <a:ext cx="451696" cy="1850596"/>
+            <a:chOff x="9113002" y="3249976"/>
+            <a:chExt cx="451696" cy="1850596"/>
+          </a:xfrm>
+        </p:grpSpPr>
+        <p:sp>
+          <p:nvSpPr>
+            <p:cNvPr id="37" name="TextBox 36"/>
+            <p:cNvSpPr txBox="1"/>
+            <p:nvPr/>
+          </p:nvSpPr>
+          <p:spPr>
+            <a:xfrm>
+              <a:off x="9114228" y="3969467"/>
+              <a:ext cx="449162" cy="461665"/>
+            </a:xfrm>
+            <a:prstGeom prst="rect">
+              <a:avLst/>
+            </a:prstGeom>
+            <a:noFill/>
+          </p:spPr>
+          <p:txBody>
+            <a:bodyPr wrap="none" rtlCol="0">
+              <a:spAutoFit/>
+            </a:bodyPr>
+            <a:lstStyle/>
+            <a:p>
+              <a:r>
+                <a:rPr lang="en-US" sz="2400" dirty="0" smtClean="0"/>
+                <a:t>h</a:t>
+              </a:r>
+              <a:r>
+                <a:rPr lang="en-US" sz="2400" baseline="-25000" dirty="0"/>
+                <a:t>3</a:t>
+              </a:r>
+              <a:endParaRPr lang="en-US" sz="2400" dirty="0"/>
+            </a:p>
+          </p:txBody>
+        </p:sp>
+        <p:sp>
+          <p:nvSpPr>
+            <p:cNvPr id="38" name="TextBox 37"/>
+            <p:cNvSpPr txBox="1"/>
+            <p:nvPr/>
+          </p:nvSpPr>
+          <p:spPr>
+            <a:xfrm>
+              <a:off x="9113002" y="3249976"/>
+              <a:ext cx="449162" cy="461665"/>
+            </a:xfrm>
+            <a:prstGeom prst="rect">
+              <a:avLst/>
+            </a:prstGeom>
+            <a:noFill/>
+          </p:spPr>
+          <p:txBody>
+            <a:bodyPr wrap="none" rtlCol="0">
+              <a:spAutoFit/>
+            </a:bodyPr>
+            <a:lstStyle/>
+            <a:p>
+              <a:r>
+                <a:rPr lang="en-US" sz="2400" dirty="0" smtClean="0"/>
+                <a:t>h</a:t>
+              </a:r>
+              <a:r>
+                <a:rPr lang="en-US" sz="2400" baseline="-25000" dirty="0" smtClean="0"/>
+                <a:t>1</a:t>
+              </a:r>
+              <a:endParaRPr lang="en-US" sz="2400" dirty="0"/>
+            </a:p>
+          </p:txBody>
+        </p:sp>
+        <p:sp>
+          <p:nvSpPr>
+            <p:cNvPr id="39" name="TextBox 38"/>
+            <p:cNvSpPr txBox="1"/>
+            <p:nvPr/>
+          </p:nvSpPr>
+          <p:spPr>
+            <a:xfrm>
+              <a:off x="9115536" y="3617480"/>
+              <a:ext cx="449162" cy="461665"/>
+            </a:xfrm>
+            <a:prstGeom prst="rect">
+              <a:avLst/>
+            </a:prstGeom>
+            <a:noFill/>
+          </p:spPr>
+          <p:txBody>
+            <a:bodyPr wrap="none" rtlCol="0">
+              <a:spAutoFit/>
+            </a:bodyPr>
+            <a:lstStyle/>
+            <a:p>
+              <a:r>
+                <a:rPr lang="en-US" sz="2400" dirty="0" smtClean="0"/>
+                <a:t>h</a:t>
+              </a:r>
+              <a:r>
+                <a:rPr lang="en-US" sz="2400" baseline="-25000" dirty="0"/>
+                <a:t>2</a:t>
+              </a:r>
+              <a:endParaRPr lang="en-US" sz="2400" dirty="0"/>
+            </a:p>
+          </p:txBody>
+        </p:sp>
+        <p:sp>
+          <p:nvSpPr>
+            <p:cNvPr id="40" name="TextBox 39"/>
+            <p:cNvSpPr txBox="1"/>
+            <p:nvPr/>
+          </p:nvSpPr>
+          <p:spPr>
+            <a:xfrm>
+              <a:off x="9113002" y="4310870"/>
+              <a:ext cx="449162" cy="461665"/>
+            </a:xfrm>
+            <a:prstGeom prst="rect">
+              <a:avLst/>
+            </a:prstGeom>
+            <a:noFill/>
+          </p:spPr>
+          <p:txBody>
+            <a:bodyPr wrap="none" rtlCol="0">
+              <a:spAutoFit/>
+            </a:bodyPr>
+            <a:lstStyle/>
+            <a:p>
+              <a:r>
+                <a:rPr lang="en-US" sz="2400" dirty="0" smtClean="0"/>
+                <a:t>h</a:t>
+              </a:r>
+              <a:r>
+                <a:rPr lang="en-US" sz="2400" baseline="-25000" dirty="0"/>
+                <a:t>4</a:t>
+              </a:r>
+              <a:endParaRPr lang="en-US" sz="2400" dirty="0"/>
+            </a:p>
+          </p:txBody>
+        </p:sp>
+        <p:sp>
+          <p:nvSpPr>
+            <p:cNvPr id="41" name="TextBox 40"/>
+            <p:cNvSpPr txBox="1"/>
+            <p:nvPr/>
+          </p:nvSpPr>
+          <p:spPr>
+            <a:xfrm>
+              <a:off x="9115525" y="4638907"/>
+              <a:ext cx="449162" cy="461665"/>
+            </a:xfrm>
+            <a:prstGeom prst="rect">
+              <a:avLst/>
+            </a:prstGeom>
+            <a:noFill/>
+          </p:spPr>
+          <p:txBody>
+            <a:bodyPr wrap="none" rtlCol="0">
+              <a:spAutoFit/>
+            </a:bodyPr>
+            <a:lstStyle/>
+            <a:p>
+              <a:r>
+                <a:rPr lang="en-US" sz="2400" dirty="0" smtClean="0"/>
+                <a:t>h</a:t>
+              </a:r>
+              <a:r>
+                <a:rPr lang="en-US" sz="2400" baseline="-25000" dirty="0"/>
+                <a:t>5</a:t>
+              </a:r>
+              <a:endParaRPr lang="en-US" sz="2400" dirty="0"/>
+            </a:p>
+          </p:txBody>
+        </p:sp>
+      </p:grpSp>
+    </p:spTree>
+    <p:extLst>
+      <p:ext uri="{BB962C8B-B14F-4D97-AF65-F5344CB8AC3E}">
+        <p14:creationId xmlns:p14="http://schemas.microsoft.com/office/powerpoint/2010/main" val="536913872"/>
+      </p:ext>
+    </p:extLst>
+  </p:cSld>
+  <p:clrMapOvr>
+    <a:masterClrMapping/>
+  </p:clrMapOvr>
+  <mc:AlternateContent xmlns:mc="http://schemas.openxmlformats.org/markup-compatibility/2006">
+    <mc:Choice xmlns:p14="http://schemas.microsoft.com/office/powerpoint/2010/main" Requires="p14">
+      <p:transition spd="slow" p14:dur="2000"/>
+    </mc:Choice>
+    <mc:Fallback>
+      <p:transition spd="slow"/>
+    </mc:Fallback>
+  </mc:AlternateContent>
+  <p:timing>
+    <p:tnLst>
+      <p:par>
+        <p:cTn id="1" dur="indefinite" restart="never" nodeType="tmRoot">
+          <p:childTnLst>
+            <p:seq concurrent="1" nextAc="seek">
+              <p:cTn id="2" dur="indefinite" nodeType="mainSeq">
+                <p:childTnLst>
+                  <p:par>
+                    <p:cTn id="3" fill="hold">
+                      <p:stCondLst>
+                        <p:cond delay="indefinite"/>
+                        <p:cond evt="onBegin" delay="0">
+                          <p:tn val="2"/>
+                        </p:cond>
+                      </p:stCondLst>
+                      <p:childTnLst>
+                        <p:par>
+                          <p:cTn id="4" fill="hold">
+                            <p:stCondLst>
+                              <p:cond delay="0"/>
+                            </p:stCondLst>
+                            <p:childTnLst>
+                              <p:par>
+                                <p:cTn id="5" presetID="1" presetClass="entr" presetSubtype="0" fill="hold" nodeType="withEffect">
+                                  <p:stCondLst>
+                                    <p:cond delay="0"/>
+                                  </p:stCondLst>
+                                  <p:childTnLst>
+                                    <p:set>
+                                      <p:cBhvr>
+                                        <p:cTn id="6" dur="1" fill="hold">
+                                          <p:stCondLst>
+                                            <p:cond delay="0"/>
+                                          </p:stCondLst>
+                                        </p:cTn>
+                                        <p:tgtEl>
+                                          <p:spTgt spid="36"/>
+                                        </p:tgtEl>
+                                        <p:attrNameLst>
+                                          <p:attrName>style.visibility</p:attrName>
+                                        </p:attrNameLst>
+                                      </p:cBhvr>
+                                      <p:to>
+                                        <p:strVal val="visible"/>
+                                      </p:to>
+                                    </p:set>
+                                  </p:childTnLst>
+                                </p:cTn>
+                              </p:par>
+                            </p:childTnLst>
+                          </p:cTn>
+                        </p:par>
+                      </p:childTnLst>
+                    </p:cTn>
+                  </p:par>
+                </p:childTnLst>
+              </p:cTn>
+              <p:prevCondLst>
+                <p:cond evt="onPrev" delay="0">
+                  <p:tgtEl>
+                    <p:sldTgt/>
+                  </p:tgtEl>
+                </p:cond>
+              </p:prevCondLst>
+              <p:nextCondLst>
+                <p:cond evt="onNext" delay="0">
+                  <p:tgtEl>
+                    <p:sldTgt/>
+                  </p:tgtEl>
+                </p:cond>
+              </p:nextCondLst>
+            </p:seq>
+          </p:childTnLst>
+        </p:cTn>
+      </p:par>
+    </p:tnLst>
+  </p:timing>
+</p:sld>
+</file>
+
 <file path=ppt/slides/slide2.xml><?xml version="1.0" encoding="utf-8"?>
 <p:sld xmlns:a="http://schemas.openxmlformats.org/drawingml/2006/main" xmlns:r="http://schemas.openxmlformats.org/officeDocument/2006/relationships" xmlns:p="http://schemas.openxmlformats.org/presentationml/2006/main">
   <p:cSld>
@@ -4634,7 +8262,7 @@
             </a:r>
             <a:r>
               <a:rPr lang="en-US" sz="2800" dirty="0" smtClean="0"/>
-              <a:t>Introduction and Problem Statement</a:t>
+              <a:t>Introduction, Problem Statement, and Related Work</a:t>
             </a:r>
           </a:p>
           <a:p>
@@ -8627,7 +12255,12 @@
             <p:ph idx="1"/>
           </p:nvPr>
         </p:nvSpPr>
-        <p:spPr/>
+        <p:spPr>
+          <a:xfrm>
+            <a:off x="1097280" y="1845734"/>
+            <a:ext cx="10058400" cy="4023360"/>
+          </a:xfrm>
+        </p:spPr>
         <p:txBody>
           <a:bodyPr>
             <a:normAutofit/>
@@ -8639,20 +12272,30 @@
               <a:buChar char="•"/>
             </a:pPr>
             <a:r>
-              <a:rPr lang="en-US" sz="2800" dirty="0">
-                <a:solidFill>
-                  <a:schemeClr val="tx1"/>
-                </a:solidFill>
-              </a:rPr>
+              <a:rPr lang="en-US" sz="2800" dirty="0"/>
               <a:t> </a:t>
             </a:r>
             <a:r>
-              <a:rPr lang="en-US" sz="2800" dirty="0" smtClean="0">
-                <a:solidFill>
-                  <a:schemeClr val="tx1"/>
-                </a:solidFill>
-              </a:rPr>
-              <a:t>Count-Min Sketch construction and updates</a:t>
+              <a:rPr lang="en-US" sz="2800" dirty="0" smtClean="0"/>
+              <a:t>Introduction</a:t>
+            </a:r>
+            <a:r>
+              <a:rPr lang="en-US" sz="2800" dirty="0"/>
+              <a:t>, Problem Statement, and Related </a:t>
+            </a:r>
+            <a:r>
+              <a:rPr lang="en-US" sz="2800" dirty="0" smtClean="0"/>
+              <a:t>Work</a:t>
+            </a:r>
+          </a:p>
+          <a:p>
+            <a:pPr>
+              <a:buFont typeface="Arial" charset="0"/>
+              <a:buChar char="•"/>
+            </a:pPr>
+            <a:r>
+              <a:rPr lang="en-US" sz="2800" dirty="0" smtClean="0"/>
+              <a:t> Count-Min Sketch construction and updates</a:t>
             </a:r>
           </a:p>
           <a:p>
@@ -9126,39 +12769,7 @@
                   <a:schemeClr val="tx1"/>
                 </a:solidFill>
               </a:rPr>
-              <a:t> </a:t>
-            </a:r>
-            <a:r>
-              <a:rPr lang="en-US" dirty="0" smtClean="0">
-                <a:solidFill>
-                  <a:schemeClr val="tx1"/>
-                </a:solidFill>
-              </a:rPr>
-              <a:t>19  </a:t>
-            </a:r>
-            <a:r>
-              <a:rPr lang="en-US" dirty="0" smtClean="0">
-                <a:solidFill>
-                  <a:schemeClr val="tx1"/>
-                </a:solidFill>
-              </a:rPr>
-              <a:t>21   </a:t>
-            </a:r>
-            <a:r>
-              <a:rPr lang="en-US" dirty="0" smtClean="0">
-                <a:solidFill>
-                  <a:schemeClr val="tx1"/>
-                </a:solidFill>
-              </a:rPr>
-              <a:t>68   </a:t>
-            </a:r>
-            <a:r>
-              <a:rPr lang="en-US" dirty="0" smtClean="0">
-                <a:solidFill>
-                  <a:schemeClr val="tx1"/>
-                </a:solidFill>
-              </a:rPr>
-              <a:t>66   42  80   95   4    18</a:t>
+              <a:t> 19  21   68   66   42  80   95   4    18</a:t>
             </a:r>
             <a:endParaRPr lang="en-US" dirty="0">
               <a:solidFill>
@@ -11274,6 +14885,194 @@
 </p:sld>
 </file>
 
+<file path=ppt/slides/slide9.xml><?xml version="1.0" encoding="utf-8"?>
+<p:sld xmlns:a="http://schemas.openxmlformats.org/drawingml/2006/main" xmlns:r="http://schemas.openxmlformats.org/officeDocument/2006/relationships" xmlns:p="http://schemas.openxmlformats.org/presentationml/2006/main">
+  <p:cSld>
+    <p:spTree>
+      <p:nvGrpSpPr>
+        <p:cNvPr id="1" name=""/>
+        <p:cNvGrpSpPr/>
+        <p:nvPr/>
+      </p:nvGrpSpPr>
+      <p:grpSpPr>
+        <a:xfrm>
+          <a:off x="0" y="0"/>
+          <a:ext cx="0" cy="0"/>
+          <a:chOff x="0" y="0"/>
+          <a:chExt cx="0" cy="0"/>
+        </a:xfrm>
+      </p:grpSpPr>
+      <p:sp>
+        <p:nvSpPr>
+          <p:cNvPr id="2" name="Title 1"/>
+          <p:cNvSpPr>
+            <a:spLocks noGrp="1"/>
+          </p:cNvSpPr>
+          <p:nvPr>
+            <p:ph type="title"/>
+          </p:nvPr>
+        </p:nvSpPr>
+        <p:spPr/>
+        <p:txBody>
+          <a:bodyPr/>
+          <a:lstStyle/>
+          <a:p>
+            <a:r>
+              <a:rPr lang="en-US" dirty="0" smtClean="0"/>
+              <a:t>Point Queries Error Bounds</a:t>
+            </a:r>
+            <a:endParaRPr lang="en-US" dirty="0"/>
+          </a:p>
+        </p:txBody>
+      </p:sp>
+      <p:pic>
+        <p:nvPicPr>
+          <p:cNvPr id="11" name="Picture 10"/>
+          <p:cNvPicPr>
+            <a:picLocks noChangeAspect="1"/>
+          </p:cNvPicPr>
+          <p:nvPr/>
+        </p:nvPicPr>
+        <p:blipFill>
+          <a:blip r:embed="rId2">
+            <a:extLst>
+              <a:ext uri="{28A0092B-C50C-407E-A947-70E740481C1C}">
+                <a14:useLocalDpi xmlns:a14="http://schemas.microsoft.com/office/drawing/2010/main" val="0"/>
+              </a:ext>
+            </a:extLst>
+          </a:blip>
+          <a:stretch>
+            <a:fillRect/>
+          </a:stretch>
+        </p:blipFill>
+        <p:spPr>
+          <a:xfrm>
+            <a:off x="1219200" y="3000088"/>
+            <a:ext cx="9204960" cy="860276"/>
+          </a:xfrm>
+          <a:prstGeom prst="rect">
+            <a:avLst/>
+          </a:prstGeom>
+        </p:spPr>
+      </p:pic>
+      <p:pic>
+        <p:nvPicPr>
+          <p:cNvPr id="12" name="Picture 11"/>
+          <p:cNvPicPr>
+            <a:picLocks noChangeAspect="1"/>
+          </p:cNvPicPr>
+          <p:nvPr/>
+        </p:nvPicPr>
+        <p:blipFill>
+          <a:blip r:embed="rId3">
+            <a:extLst>
+              <a:ext uri="{28A0092B-C50C-407E-A947-70E740481C1C}">
+                <a14:useLocalDpi xmlns:a14="http://schemas.microsoft.com/office/drawing/2010/main" val="0"/>
+              </a:ext>
+            </a:extLst>
+          </a:blip>
+          <a:stretch>
+            <a:fillRect/>
+          </a:stretch>
+        </p:blipFill>
+        <p:spPr>
+          <a:xfrm>
+            <a:off x="1097280" y="2107426"/>
+            <a:ext cx="2316480" cy="871793"/>
+          </a:xfrm>
+          <a:prstGeom prst="rect">
+            <a:avLst/>
+          </a:prstGeom>
+        </p:spPr>
+      </p:pic>
+    </p:spTree>
+    <p:extLst>
+      <p:ext uri="{BB962C8B-B14F-4D97-AF65-F5344CB8AC3E}">
+        <p14:creationId xmlns:p14="http://schemas.microsoft.com/office/powerpoint/2010/main" val="1728193782"/>
+      </p:ext>
+    </p:extLst>
+  </p:cSld>
+  <p:clrMapOvr>
+    <a:masterClrMapping/>
+  </p:clrMapOvr>
+  <p:timing>
+    <p:tnLst>
+      <p:par>
+        <p:cTn id="1" dur="indefinite" restart="never" nodeType="tmRoot">
+          <p:childTnLst>
+            <p:seq concurrent="1" nextAc="seek">
+              <p:cTn id="2" dur="indefinite" nodeType="mainSeq">
+                <p:childTnLst>
+                  <p:par>
+                    <p:cTn id="3" fill="hold">
+                      <p:stCondLst>
+                        <p:cond delay="indefinite"/>
+                      </p:stCondLst>
+                      <p:childTnLst>
+                        <p:par>
+                          <p:cTn id="4" fill="hold">
+                            <p:stCondLst>
+                              <p:cond delay="0"/>
+                            </p:stCondLst>
+                            <p:childTnLst>
+                              <p:par>
+                                <p:cTn id="5" presetID="1" presetClass="entr" presetSubtype="0" fill="hold" nodeType="clickEffect">
+                                  <p:stCondLst>
+                                    <p:cond delay="0"/>
+                                  </p:stCondLst>
+                                  <p:childTnLst>
+                                    <p:set>
+                                      <p:cBhvr>
+                                        <p:cTn id="6" dur="1" fill="hold">
+                                          <p:stCondLst>
+                                            <p:cond delay="0"/>
+                                          </p:stCondLst>
+                                        </p:cTn>
+                                        <p:tgtEl>
+                                          <p:spTgt spid="11"/>
+                                        </p:tgtEl>
+                                        <p:attrNameLst>
+                                          <p:attrName>style.visibility</p:attrName>
+                                        </p:attrNameLst>
+                                      </p:cBhvr>
+                                      <p:to>
+                                        <p:strVal val="visible"/>
+                                      </p:to>
+                                    </p:set>
+                                  </p:childTnLst>
+                                </p:cTn>
+                              </p:par>
+                            </p:childTnLst>
+                          </p:cTn>
+                        </p:par>
+                      </p:childTnLst>
+                    </p:cTn>
+                  </p:par>
+                </p:childTnLst>
+              </p:cTn>
+              <p:prevCondLst>
+                <p:cond evt="onPrev" delay="0">
+                  <p:tgtEl>
+                    <p:sldTgt/>
+                  </p:tgtEl>
+                </p:cond>
+              </p:prevCondLst>
+              <p:nextCondLst>
+                <p:cond evt="onNext" delay="0">
+                  <p:tgtEl>
+                    <p:sldTgt/>
+                  </p:tgtEl>
+                </p:cond>
+              </p:nextCondLst>
+            </p:seq>
+          </p:childTnLst>
+        </p:cTn>
+      </p:par>
+    </p:tnLst>
+  </p:timing>
+</p:sld>
+</file>
+
 <file path=ppt/theme/theme1.xml><?xml version="1.0" encoding="utf-8"?>
 <a:theme xmlns:a="http://schemas.openxmlformats.org/drawingml/2006/main" name="Retrospect">
   <a:themeElements>

</xml_diff>